<commit_message>
OT ppt updated for print.
</commit_message>
<xml_diff>
--- a/Show & Tell/OT-PPT.pptx
+++ b/Show & Tell/OT-PPT.pptx
@@ -4,6 +4,12 @@
   <p:sldMasterIdLst>
     <p:sldMasterId id="2147483648" r:id="rId1"/>
   </p:sldMasterIdLst>
+  <p:notesMasterIdLst>
+    <p:notesMasterId r:id="rId6"/>
+  </p:notesMasterIdLst>
+  <p:handoutMasterIdLst>
+    <p:handoutMasterId r:id="rId7"/>
+  </p:handoutMasterIdLst>
   <p:sldIdLst>
     <p:sldId id="256" r:id="rId2"/>
     <p:sldId id="257" r:id="rId3"/>
@@ -140,6 +146,521 @@
 </p:presentation>
 </file>
 
+<file path=ppt/handoutMasters/handoutMaster1.xml><?xml version="1.0" encoding="utf-8"?>
+<p:handoutMaster xmlns:a="http://schemas.openxmlformats.org/drawingml/2006/main" xmlns:r="http://schemas.openxmlformats.org/officeDocument/2006/relationships" xmlns:p="http://schemas.openxmlformats.org/presentationml/2006/main">
+  <p:cSld>
+    <p:bg>
+      <p:bgRef idx="1001">
+        <a:schemeClr val="bg1"/>
+      </p:bgRef>
+    </p:bg>
+    <p:spTree>
+      <p:nvGrpSpPr>
+        <p:cNvPr id="1" name=""/>
+        <p:cNvGrpSpPr/>
+        <p:nvPr/>
+      </p:nvGrpSpPr>
+      <p:grpSpPr>
+        <a:xfrm>
+          <a:off x="0" y="0"/>
+          <a:ext cx="0" cy="0"/>
+          <a:chOff x="0" y="0"/>
+          <a:chExt cx="0" cy="0"/>
+        </a:xfrm>
+      </p:grpSpPr>
+      <p:sp>
+        <p:nvSpPr>
+          <p:cNvPr id="2" name="Header Placeholder 1"/>
+          <p:cNvSpPr>
+            <a:spLocks noGrp="1"/>
+          </p:cNvSpPr>
+          <p:nvPr>
+            <p:ph type="hdr" sz="quarter"/>
+          </p:nvPr>
+        </p:nvSpPr>
+        <p:spPr>
+          <a:xfrm>
+            <a:off x="0" y="0"/>
+            <a:ext cx="2971800" cy="457200"/>
+          </a:xfrm>
+          <a:prstGeom prst="rect">
+            <a:avLst/>
+          </a:prstGeom>
+        </p:spPr>
+        <p:txBody>
+          <a:bodyPr vert="horz" lIns="91440" tIns="45720" rIns="91440" bIns="45720" rtlCol="0"/>
+          <a:lstStyle>
+            <a:lvl1pPr algn="l">
+              <a:defRPr sz="1200"/>
+            </a:lvl1pPr>
+          </a:lstStyle>
+          <a:p>
+            <a:endParaRPr lang="en-IN"/>
+          </a:p>
+        </p:txBody>
+      </p:sp>
+      <p:sp>
+        <p:nvSpPr>
+          <p:cNvPr id="3" name="Date Placeholder 2"/>
+          <p:cNvSpPr>
+            <a:spLocks noGrp="1"/>
+          </p:cNvSpPr>
+          <p:nvPr>
+            <p:ph type="dt" sz="quarter" idx="1"/>
+          </p:nvPr>
+        </p:nvSpPr>
+        <p:spPr>
+          <a:xfrm>
+            <a:off x="3884613" y="0"/>
+            <a:ext cx="2971800" cy="457200"/>
+          </a:xfrm>
+          <a:prstGeom prst="rect">
+            <a:avLst/>
+          </a:prstGeom>
+        </p:spPr>
+        <p:txBody>
+          <a:bodyPr vert="horz" lIns="91440" tIns="45720" rIns="91440" bIns="45720" rtlCol="0"/>
+          <a:lstStyle>
+            <a:lvl1pPr algn="r">
+              <a:defRPr sz="1200"/>
+            </a:lvl1pPr>
+          </a:lstStyle>
+          <a:p>
+            <a:fld id="{17EACF00-9743-472F-9927-E03D28C86050}" type="datetimeFigureOut">
+              <a:rPr lang="en-IN" smtClean="0"/>
+              <a:t>31-10-2022</a:t>
+            </a:fld>
+            <a:endParaRPr lang="en-IN"/>
+          </a:p>
+        </p:txBody>
+      </p:sp>
+      <p:sp>
+        <p:nvSpPr>
+          <p:cNvPr id="4" name="Footer Placeholder 3"/>
+          <p:cNvSpPr>
+            <a:spLocks noGrp="1"/>
+          </p:cNvSpPr>
+          <p:nvPr>
+            <p:ph type="ftr" sz="quarter" idx="2"/>
+          </p:nvPr>
+        </p:nvSpPr>
+        <p:spPr>
+          <a:xfrm>
+            <a:off x="0" y="8685213"/>
+            <a:ext cx="2971800" cy="457200"/>
+          </a:xfrm>
+          <a:prstGeom prst="rect">
+            <a:avLst/>
+          </a:prstGeom>
+        </p:spPr>
+        <p:txBody>
+          <a:bodyPr vert="horz" lIns="91440" tIns="45720" rIns="91440" bIns="45720" rtlCol="0" anchor="b"/>
+          <a:lstStyle>
+            <a:lvl1pPr algn="l">
+              <a:defRPr sz="1200"/>
+            </a:lvl1pPr>
+          </a:lstStyle>
+          <a:p>
+            <a:endParaRPr lang="en-IN"/>
+          </a:p>
+        </p:txBody>
+      </p:sp>
+      <p:sp>
+        <p:nvSpPr>
+          <p:cNvPr id="5" name="Slide Number Placeholder 4"/>
+          <p:cNvSpPr>
+            <a:spLocks noGrp="1"/>
+          </p:cNvSpPr>
+          <p:nvPr>
+            <p:ph type="sldNum" sz="quarter" idx="3"/>
+          </p:nvPr>
+        </p:nvSpPr>
+        <p:spPr>
+          <a:xfrm>
+            <a:off x="3884613" y="8685213"/>
+            <a:ext cx="2971800" cy="457200"/>
+          </a:xfrm>
+          <a:prstGeom prst="rect">
+            <a:avLst/>
+          </a:prstGeom>
+        </p:spPr>
+        <p:txBody>
+          <a:bodyPr vert="horz" lIns="91440" tIns="45720" rIns="91440" bIns="45720" rtlCol="0" anchor="b"/>
+          <a:lstStyle>
+            <a:lvl1pPr algn="r">
+              <a:defRPr sz="1200"/>
+            </a:lvl1pPr>
+          </a:lstStyle>
+          <a:p>
+            <a:fld id="{84D38674-48F8-433F-AF74-0158977F9348}" type="slidenum">
+              <a:rPr lang="en-IN" smtClean="0"/>
+              <a:t>‹#›</a:t>
+            </a:fld>
+            <a:endParaRPr lang="en-IN"/>
+          </a:p>
+        </p:txBody>
+      </p:sp>
+    </p:spTree>
+    <p:extLst>
+      <p:ext uri="{BB962C8B-B14F-4D97-AF65-F5344CB8AC3E}">
+        <p14:creationId xmlns:p14="http://schemas.microsoft.com/office/powerpoint/2010/main" val="3014565771"/>
+      </p:ext>
+    </p:extLst>
+  </p:cSld>
+  <p:clrMap bg1="lt1" tx1="dk1" bg2="lt2" tx2="dk2" accent1="accent1" accent2="accent2" accent3="accent3" accent4="accent4" accent5="accent5" accent6="accent6" hlink="hlink" folHlink="folHlink"/>
+</p:handoutMaster>
+</file>
+
+<file path=ppt/notesMasters/notesMaster1.xml><?xml version="1.0" encoding="utf-8"?>
+<p:notesMaster xmlns:a="http://schemas.openxmlformats.org/drawingml/2006/main" xmlns:r="http://schemas.openxmlformats.org/officeDocument/2006/relationships" xmlns:p="http://schemas.openxmlformats.org/presentationml/2006/main">
+  <p:cSld>
+    <p:bg>
+      <p:bgRef idx="1001">
+        <a:schemeClr val="bg1"/>
+      </p:bgRef>
+    </p:bg>
+    <p:spTree>
+      <p:nvGrpSpPr>
+        <p:cNvPr id="1" name=""/>
+        <p:cNvGrpSpPr/>
+        <p:nvPr/>
+      </p:nvGrpSpPr>
+      <p:grpSpPr>
+        <a:xfrm>
+          <a:off x="0" y="0"/>
+          <a:ext cx="0" cy="0"/>
+          <a:chOff x="0" y="0"/>
+          <a:chExt cx="0" cy="0"/>
+        </a:xfrm>
+      </p:grpSpPr>
+      <p:sp>
+        <p:nvSpPr>
+          <p:cNvPr id="2" name="Header Placeholder 1"/>
+          <p:cNvSpPr>
+            <a:spLocks noGrp="1"/>
+          </p:cNvSpPr>
+          <p:nvPr>
+            <p:ph type="hdr" sz="quarter"/>
+          </p:nvPr>
+        </p:nvSpPr>
+        <p:spPr>
+          <a:xfrm>
+            <a:off x="0" y="0"/>
+            <a:ext cx="2971800" cy="457200"/>
+          </a:xfrm>
+          <a:prstGeom prst="rect">
+            <a:avLst/>
+          </a:prstGeom>
+        </p:spPr>
+        <p:txBody>
+          <a:bodyPr vert="horz" lIns="91440" tIns="45720" rIns="91440" bIns="45720" rtlCol="0"/>
+          <a:lstStyle>
+            <a:lvl1pPr algn="l">
+              <a:defRPr sz="1200"/>
+            </a:lvl1pPr>
+          </a:lstStyle>
+          <a:p>
+            <a:endParaRPr lang="en-IN"/>
+          </a:p>
+        </p:txBody>
+      </p:sp>
+      <p:sp>
+        <p:nvSpPr>
+          <p:cNvPr id="3" name="Date Placeholder 2"/>
+          <p:cNvSpPr>
+            <a:spLocks noGrp="1"/>
+          </p:cNvSpPr>
+          <p:nvPr>
+            <p:ph type="dt" idx="1"/>
+          </p:nvPr>
+        </p:nvSpPr>
+        <p:spPr>
+          <a:xfrm>
+            <a:off x="3884613" y="0"/>
+            <a:ext cx="2971800" cy="457200"/>
+          </a:xfrm>
+          <a:prstGeom prst="rect">
+            <a:avLst/>
+          </a:prstGeom>
+        </p:spPr>
+        <p:txBody>
+          <a:bodyPr vert="horz" lIns="91440" tIns="45720" rIns="91440" bIns="45720" rtlCol="0"/>
+          <a:lstStyle>
+            <a:lvl1pPr algn="r">
+              <a:defRPr sz="1200"/>
+            </a:lvl1pPr>
+          </a:lstStyle>
+          <a:p>
+            <a:fld id="{94C71268-2E63-4FB5-B90B-E31E42DB2EA0}" type="datetimeFigureOut">
+              <a:rPr lang="en-IN" smtClean="0"/>
+              <a:t>31-10-2022</a:t>
+            </a:fld>
+            <a:endParaRPr lang="en-IN"/>
+          </a:p>
+        </p:txBody>
+      </p:sp>
+      <p:sp>
+        <p:nvSpPr>
+          <p:cNvPr id="4" name="Slide Image Placeholder 3"/>
+          <p:cNvSpPr>
+            <a:spLocks noGrp="1" noRot="1" noChangeAspect="1"/>
+          </p:cNvSpPr>
+          <p:nvPr>
+            <p:ph type="sldImg" idx="2"/>
+          </p:nvPr>
+        </p:nvSpPr>
+        <p:spPr>
+          <a:xfrm>
+            <a:off x="381000" y="685800"/>
+            <a:ext cx="6096000" cy="3429000"/>
+          </a:xfrm>
+          <a:prstGeom prst="rect">
+            <a:avLst/>
+          </a:prstGeom>
+          <a:noFill/>
+          <a:ln w="12700">
+            <a:solidFill>
+              <a:prstClr val="black"/>
+            </a:solidFill>
+          </a:ln>
+        </p:spPr>
+        <p:txBody>
+          <a:bodyPr vert="horz" lIns="91440" tIns="45720" rIns="91440" bIns="45720" rtlCol="0" anchor="ctr"/>
+          <a:lstStyle/>
+          <a:p>
+            <a:endParaRPr lang="en-IN"/>
+          </a:p>
+        </p:txBody>
+      </p:sp>
+      <p:sp>
+        <p:nvSpPr>
+          <p:cNvPr id="5" name="Notes Placeholder 4"/>
+          <p:cNvSpPr>
+            <a:spLocks noGrp="1"/>
+          </p:cNvSpPr>
+          <p:nvPr>
+            <p:ph type="body" sz="quarter" idx="3"/>
+          </p:nvPr>
+        </p:nvSpPr>
+        <p:spPr>
+          <a:xfrm>
+            <a:off x="685800" y="4343400"/>
+            <a:ext cx="5486400" cy="4114800"/>
+          </a:xfrm>
+          <a:prstGeom prst="rect">
+            <a:avLst/>
+          </a:prstGeom>
+        </p:spPr>
+        <p:txBody>
+          <a:bodyPr vert="horz" lIns="91440" tIns="45720" rIns="91440" bIns="45720" rtlCol="0"/>
+          <a:lstStyle/>
+          <a:p>
+            <a:pPr lvl="0"/>
+            <a:r>
+              <a:rPr lang="en-US" smtClean="0"/>
+              <a:t>Click to edit Master text styles</a:t>
+            </a:r>
+          </a:p>
+          <a:p>
+            <a:pPr lvl="1"/>
+            <a:r>
+              <a:rPr lang="en-US" smtClean="0"/>
+              <a:t>Second level</a:t>
+            </a:r>
+          </a:p>
+          <a:p>
+            <a:pPr lvl="2"/>
+            <a:r>
+              <a:rPr lang="en-US" smtClean="0"/>
+              <a:t>Third level</a:t>
+            </a:r>
+          </a:p>
+          <a:p>
+            <a:pPr lvl="3"/>
+            <a:r>
+              <a:rPr lang="en-US" smtClean="0"/>
+              <a:t>Fourth level</a:t>
+            </a:r>
+          </a:p>
+          <a:p>
+            <a:pPr lvl="4"/>
+            <a:r>
+              <a:rPr lang="en-US" smtClean="0"/>
+              <a:t>Fifth level</a:t>
+            </a:r>
+            <a:endParaRPr lang="en-IN"/>
+          </a:p>
+        </p:txBody>
+      </p:sp>
+      <p:sp>
+        <p:nvSpPr>
+          <p:cNvPr id="6" name="Footer Placeholder 5"/>
+          <p:cNvSpPr>
+            <a:spLocks noGrp="1"/>
+          </p:cNvSpPr>
+          <p:nvPr>
+            <p:ph type="ftr" sz="quarter" idx="4"/>
+          </p:nvPr>
+        </p:nvSpPr>
+        <p:spPr>
+          <a:xfrm>
+            <a:off x="0" y="8685213"/>
+            <a:ext cx="2971800" cy="457200"/>
+          </a:xfrm>
+          <a:prstGeom prst="rect">
+            <a:avLst/>
+          </a:prstGeom>
+        </p:spPr>
+        <p:txBody>
+          <a:bodyPr vert="horz" lIns="91440" tIns="45720" rIns="91440" bIns="45720" rtlCol="0" anchor="b"/>
+          <a:lstStyle>
+            <a:lvl1pPr algn="l">
+              <a:defRPr sz="1200"/>
+            </a:lvl1pPr>
+          </a:lstStyle>
+          <a:p>
+            <a:endParaRPr lang="en-IN"/>
+          </a:p>
+        </p:txBody>
+      </p:sp>
+      <p:sp>
+        <p:nvSpPr>
+          <p:cNvPr id="7" name="Slide Number Placeholder 6"/>
+          <p:cNvSpPr>
+            <a:spLocks noGrp="1"/>
+          </p:cNvSpPr>
+          <p:nvPr>
+            <p:ph type="sldNum" sz="quarter" idx="5"/>
+          </p:nvPr>
+        </p:nvSpPr>
+        <p:spPr>
+          <a:xfrm>
+            <a:off x="3884613" y="8685213"/>
+            <a:ext cx="2971800" cy="457200"/>
+          </a:xfrm>
+          <a:prstGeom prst="rect">
+            <a:avLst/>
+          </a:prstGeom>
+        </p:spPr>
+        <p:txBody>
+          <a:bodyPr vert="horz" lIns="91440" tIns="45720" rIns="91440" bIns="45720" rtlCol="0" anchor="b"/>
+          <a:lstStyle>
+            <a:lvl1pPr algn="r">
+              <a:defRPr sz="1200"/>
+            </a:lvl1pPr>
+          </a:lstStyle>
+          <a:p>
+            <a:fld id="{C8B9631D-B5C9-4B5E-9FB7-0DC7E62CC725}" type="slidenum">
+              <a:rPr lang="en-IN" smtClean="0"/>
+              <a:t>‹#›</a:t>
+            </a:fld>
+            <a:endParaRPr lang="en-IN"/>
+          </a:p>
+        </p:txBody>
+      </p:sp>
+    </p:spTree>
+    <p:extLst>
+      <p:ext uri="{BB962C8B-B14F-4D97-AF65-F5344CB8AC3E}">
+        <p14:creationId xmlns:p14="http://schemas.microsoft.com/office/powerpoint/2010/main" val="1425898869"/>
+      </p:ext>
+    </p:extLst>
+  </p:cSld>
+  <p:clrMap bg1="lt1" tx1="dk1" bg2="lt2" tx2="dk2" accent1="accent1" accent2="accent2" accent3="accent3" accent4="accent4" accent5="accent5" accent6="accent6" hlink="hlink" folHlink="folHlink"/>
+  <p:notesStyle>
+    <a:lvl1pPr marL="0" algn="l" defTabSz="914400" rtl="0" eaLnBrk="1" latinLnBrk="0" hangingPunct="1">
+      <a:defRPr sz="1200" kern="1200">
+        <a:solidFill>
+          <a:schemeClr val="tx1"/>
+        </a:solidFill>
+        <a:latin typeface="+mn-lt"/>
+        <a:ea typeface="+mn-ea"/>
+        <a:cs typeface="+mn-cs"/>
+      </a:defRPr>
+    </a:lvl1pPr>
+    <a:lvl2pPr marL="457200" algn="l" defTabSz="914400" rtl="0" eaLnBrk="1" latinLnBrk="0" hangingPunct="1">
+      <a:defRPr sz="1200" kern="1200">
+        <a:solidFill>
+          <a:schemeClr val="tx1"/>
+        </a:solidFill>
+        <a:latin typeface="+mn-lt"/>
+        <a:ea typeface="+mn-ea"/>
+        <a:cs typeface="+mn-cs"/>
+      </a:defRPr>
+    </a:lvl2pPr>
+    <a:lvl3pPr marL="914400" algn="l" defTabSz="914400" rtl="0" eaLnBrk="1" latinLnBrk="0" hangingPunct="1">
+      <a:defRPr sz="1200" kern="1200">
+        <a:solidFill>
+          <a:schemeClr val="tx1"/>
+        </a:solidFill>
+        <a:latin typeface="+mn-lt"/>
+        <a:ea typeface="+mn-ea"/>
+        <a:cs typeface="+mn-cs"/>
+      </a:defRPr>
+    </a:lvl3pPr>
+    <a:lvl4pPr marL="1371600" algn="l" defTabSz="914400" rtl="0" eaLnBrk="1" latinLnBrk="0" hangingPunct="1">
+      <a:defRPr sz="1200" kern="1200">
+        <a:solidFill>
+          <a:schemeClr val="tx1"/>
+        </a:solidFill>
+        <a:latin typeface="+mn-lt"/>
+        <a:ea typeface="+mn-ea"/>
+        <a:cs typeface="+mn-cs"/>
+      </a:defRPr>
+    </a:lvl4pPr>
+    <a:lvl5pPr marL="1828800" algn="l" defTabSz="914400" rtl="0" eaLnBrk="1" latinLnBrk="0" hangingPunct="1">
+      <a:defRPr sz="1200" kern="1200">
+        <a:solidFill>
+          <a:schemeClr val="tx1"/>
+        </a:solidFill>
+        <a:latin typeface="+mn-lt"/>
+        <a:ea typeface="+mn-ea"/>
+        <a:cs typeface="+mn-cs"/>
+      </a:defRPr>
+    </a:lvl5pPr>
+    <a:lvl6pPr marL="2286000" algn="l" defTabSz="914400" rtl="0" eaLnBrk="1" latinLnBrk="0" hangingPunct="1">
+      <a:defRPr sz="1200" kern="1200">
+        <a:solidFill>
+          <a:schemeClr val="tx1"/>
+        </a:solidFill>
+        <a:latin typeface="+mn-lt"/>
+        <a:ea typeface="+mn-ea"/>
+        <a:cs typeface="+mn-cs"/>
+      </a:defRPr>
+    </a:lvl6pPr>
+    <a:lvl7pPr marL="2743200" algn="l" defTabSz="914400" rtl="0" eaLnBrk="1" latinLnBrk="0" hangingPunct="1">
+      <a:defRPr sz="1200" kern="1200">
+        <a:solidFill>
+          <a:schemeClr val="tx1"/>
+        </a:solidFill>
+        <a:latin typeface="+mn-lt"/>
+        <a:ea typeface="+mn-ea"/>
+        <a:cs typeface="+mn-cs"/>
+      </a:defRPr>
+    </a:lvl7pPr>
+    <a:lvl8pPr marL="3200400" algn="l" defTabSz="914400" rtl="0" eaLnBrk="1" latinLnBrk="0" hangingPunct="1">
+      <a:defRPr sz="1200" kern="1200">
+        <a:solidFill>
+          <a:schemeClr val="tx1"/>
+        </a:solidFill>
+        <a:latin typeface="+mn-lt"/>
+        <a:ea typeface="+mn-ea"/>
+        <a:cs typeface="+mn-cs"/>
+      </a:defRPr>
+    </a:lvl8pPr>
+    <a:lvl9pPr marL="3657600" algn="l" defTabSz="914400" rtl="0" eaLnBrk="1" latinLnBrk="0" hangingPunct="1">
+      <a:defRPr sz="1200" kern="1200">
+        <a:solidFill>
+          <a:schemeClr val="tx1"/>
+        </a:solidFill>
+        <a:latin typeface="+mn-lt"/>
+        <a:ea typeface="+mn-ea"/>
+        <a:cs typeface="+mn-cs"/>
+      </a:defRPr>
+    </a:lvl9pPr>
+  </p:notesStyle>
+</p:notesMaster>
+</file>
+
 <file path=ppt/slideLayouts/slideLayout1.xml><?xml version="1.0" encoding="utf-8"?>
 <p:sldLayout xmlns:a="http://schemas.openxmlformats.org/drawingml/2006/main" xmlns:r="http://schemas.openxmlformats.org/officeDocument/2006/relationships" xmlns:p="http://schemas.openxmlformats.org/presentationml/2006/main" preserve="1" userDrawn="1">
   <p:cSld name="Title Slide">
@@ -191,12 +712,9 @@
             <a:pPr>
               <a:defRPr/>
             </a:pPr>
-            <a:fld id="{9828C666-F252-4489-A30F-25715631F753}" type="datetimeFigureOut">
-              <a:rPr lang="en-US"/>
-              <a:pPr>
-                <a:defRPr/>
-              </a:pPr>
-              <a:t>10/29/2022</a:t>
+            <a:fld id="{CF101EEC-C303-424A-86B7-23FE40A095B8}" type="datetime1">
+              <a:rPr lang="en-US" smtClean="0"/>
+              <a:t>10/31/2022</a:t>
             </a:fld>
             <a:endParaRPr lang="en-US"/>
           </a:p>
@@ -400,12 +918,9 @@
             <a:pPr>
               <a:defRPr/>
             </a:pPr>
-            <a:fld id="{E8EE1A9E-2801-4616-BA6C-B24A37F5027B}" type="datetimeFigureOut">
-              <a:rPr lang="en-US"/>
-              <a:pPr>
-                <a:defRPr/>
-              </a:pPr>
-              <a:t>10/29/2022</a:t>
+            <a:fld id="{8E236A36-A448-4EDF-B62B-747982797A4A}" type="datetime1">
+              <a:rPr lang="en-US" smtClean="0"/>
+              <a:t>10/31/2022</a:t>
             </a:fld>
             <a:endParaRPr lang="en-US"/>
           </a:p>
@@ -619,12 +1134,9 @@
             <a:pPr>
               <a:defRPr/>
             </a:pPr>
-            <a:fld id="{34429D4C-027F-43CF-BF87-E57EA73F5942}" type="datetimeFigureOut">
-              <a:rPr lang="en-US"/>
-              <a:pPr>
-                <a:defRPr/>
-              </a:pPr>
-              <a:t>10/29/2022</a:t>
+            <a:fld id="{138F19ED-55FF-45C8-A40A-B878DBE02B90}" type="datetime1">
+              <a:rPr lang="en-US" smtClean="0"/>
+              <a:t>10/31/2022</a:t>
             </a:fld>
             <a:endParaRPr lang="en-US"/>
           </a:p>
@@ -828,12 +1340,9 @@
             <a:pPr>
               <a:defRPr/>
             </a:pPr>
-            <a:fld id="{F224D7AF-F90A-45C3-8EBD-3C81F2766F70}" type="datetimeFigureOut">
-              <a:rPr lang="en-US"/>
-              <a:pPr>
-                <a:defRPr/>
-              </a:pPr>
-              <a:t>10/29/2022</a:t>
+            <a:fld id="{C53ED2D9-5D73-41E3-80E7-9BBE4A9E0EAA}" type="datetime1">
+              <a:rPr lang="en-US" smtClean="0"/>
+              <a:t>10/31/2022</a:t>
             </a:fld>
             <a:endParaRPr lang="en-US"/>
           </a:p>
@@ -1113,12 +1622,9 @@
             <a:pPr>
               <a:defRPr/>
             </a:pPr>
-            <a:fld id="{8EA9FC1D-DCFF-49EC-A26D-021CBEAA9BBB}" type="datetimeFigureOut">
-              <a:rPr lang="en-US"/>
-              <a:pPr>
-                <a:defRPr/>
-              </a:pPr>
-              <a:t>10/29/2022</a:t>
+            <a:fld id="{E7FA4B11-7718-4865-9C1E-C9C3E6EF2975}" type="datetime1">
+              <a:rPr lang="en-US" smtClean="0"/>
+              <a:t>10/31/2022</a:t>
             </a:fld>
             <a:endParaRPr lang="en-US"/>
           </a:p>
@@ -1440,12 +1946,9 @@
             <a:pPr>
               <a:defRPr/>
             </a:pPr>
-            <a:fld id="{2E8DDA77-1F7D-4945-BB95-40403A20902D}" type="datetimeFigureOut">
-              <a:rPr lang="en-US"/>
-              <a:pPr>
-                <a:defRPr/>
-              </a:pPr>
-              <a:t>10/29/2022</a:t>
+            <a:fld id="{EBE143BA-922B-49B9-8B64-E7BCE7D0AB96}" type="datetime1">
+              <a:rPr lang="en-US" smtClean="0"/>
+              <a:t>10/31/2022</a:t>
             </a:fld>
             <a:endParaRPr lang="en-US"/>
           </a:p>
@@ -1901,12 +2404,9 @@
             <a:pPr>
               <a:defRPr/>
             </a:pPr>
-            <a:fld id="{5DA1D3B0-E97E-4A4C-B0AD-9D66E1F0063F}" type="datetimeFigureOut">
-              <a:rPr lang="en-US"/>
-              <a:pPr>
-                <a:defRPr/>
-              </a:pPr>
-              <a:t>10/29/2022</a:t>
+            <a:fld id="{174B2622-5366-46C5-821D-C3590C691E40}" type="datetime1">
+              <a:rPr lang="en-US" smtClean="0"/>
+              <a:t>10/31/2022</a:t>
             </a:fld>
             <a:endParaRPr lang="en-US"/>
           </a:p>
@@ -2058,12 +2558,9 @@
             <a:pPr>
               <a:defRPr/>
             </a:pPr>
-            <a:fld id="{B9480573-C968-4824-8654-B51B15C60587}" type="datetimeFigureOut">
-              <a:rPr lang="en-US"/>
-              <a:pPr>
-                <a:defRPr/>
-              </a:pPr>
-              <a:t>10/29/2022</a:t>
+            <a:fld id="{BFEFAB42-3D38-420A-AFBF-FCAE97740FAE}" type="datetime1">
+              <a:rPr lang="en-US" smtClean="0"/>
+              <a:t>10/31/2022</a:t>
             </a:fld>
             <a:endParaRPr lang="en-US"/>
           </a:p>
@@ -2192,12 +2689,9 @@
             <a:pPr>
               <a:defRPr/>
             </a:pPr>
-            <a:fld id="{41BAA223-3D9A-4A6D-9569-4890679AFB41}" type="datetimeFigureOut">
-              <a:rPr lang="en-US"/>
-              <a:pPr>
-                <a:defRPr/>
-              </a:pPr>
-              <a:t>10/29/2022</a:t>
+            <a:fld id="{837ED3DE-3294-4DBB-BD80-4B1B6420C4F8}" type="datetime1">
+              <a:rPr lang="en-US" smtClean="0"/>
+              <a:t>10/31/2022</a:t>
             </a:fld>
             <a:endParaRPr lang="en-US"/>
           </a:p>
@@ -2508,12 +3002,9 @@
             <a:pPr>
               <a:defRPr/>
             </a:pPr>
-            <a:fld id="{2A3CD374-3FF3-4F53-8DDB-89062D42DCE7}" type="datetimeFigureOut">
-              <a:rPr lang="en-US"/>
-              <a:pPr>
-                <a:defRPr/>
-              </a:pPr>
-              <a:t>10/29/2022</a:t>
+            <a:fld id="{2B86E912-4B61-4ADD-86F9-429FC406AA3F}" type="datetime1">
+              <a:rPr lang="en-US" smtClean="0"/>
+              <a:t>10/31/2022</a:t>
             </a:fld>
             <a:endParaRPr lang="en-US"/>
           </a:p>
@@ -2807,12 +3298,9 @@
             <a:pPr>
               <a:defRPr/>
             </a:pPr>
-            <a:fld id="{D330E2B6-51B9-4667-A379-5A93E71543E7}" type="datetimeFigureOut">
-              <a:rPr lang="en-US"/>
-              <a:pPr>
-                <a:defRPr/>
-              </a:pPr>
-              <a:t>10/29/2022</a:t>
+            <a:fld id="{C0783B60-58AB-406F-B264-A1E098EE8648}" type="datetime1">
+              <a:rPr lang="en-US" smtClean="0"/>
+              <a:t>10/31/2022</a:t>
             </a:fld>
             <a:endParaRPr lang="en-US"/>
           </a:p>
@@ -3105,12 +3593,9 @@
             <a:pPr>
               <a:defRPr/>
             </a:pPr>
-            <a:fld id="{68B1B920-02BD-49CA-BA92-193E62AA7975}" type="datetimeFigureOut">
-              <a:rPr lang="en-US"/>
-              <a:pPr>
-                <a:defRPr/>
-              </a:pPr>
-              <a:t>10/29/2022</a:t>
+            <a:fld id="{563FE660-E19E-4E92-B833-A81126E74189}" type="datetime1">
+              <a:rPr lang="en-US" smtClean="0"/>
+              <a:t>10/31/2022</a:t>
             </a:fld>
             <a:endParaRPr lang="en-US"/>
           </a:p>
@@ -3235,6 +3720,7 @@
     <p:sldLayoutId id="2147483680" r:id="rId10"/>
     <p:sldLayoutId id="2147483681" r:id="rId11"/>
   </p:sldLayoutIdLst>
+  <p:hf hdr="0" ftr="0" dt="0"/>
   <p:txStyles>
     <p:titleStyle>
       <a:lvl1pPr algn="ctr" rtl="0" eaLnBrk="1" fontAlgn="base" hangingPunct="1">
@@ -3634,6 +4120,35 @@
           <a:chExt cx="0" cy="0"/>
         </a:xfrm>
       </p:grpSpPr>
+      <p:sp>
+        <p:nvSpPr>
+          <p:cNvPr id="2" name="Slide Number Placeholder 1"/>
+          <p:cNvSpPr>
+            <a:spLocks noGrp="1"/>
+          </p:cNvSpPr>
+          <p:nvPr>
+            <p:ph type="sldNum" sz="quarter" idx="12"/>
+          </p:nvPr>
+        </p:nvSpPr>
+        <p:spPr/>
+        <p:txBody>
+          <a:bodyPr/>
+          <a:lstStyle/>
+          <a:p>
+            <a:pPr>
+              <a:defRPr/>
+            </a:pPr>
+            <a:fld id="{2482ED7B-B54D-416C-95D3-81078A8F7372}" type="slidenum">
+              <a:rPr lang="en-US" smtClean="0"/>
+              <a:pPr>
+                <a:defRPr/>
+              </a:pPr>
+              <a:t>1</a:t>
+            </a:fld>
+            <a:endParaRPr lang="en-US"/>
+          </a:p>
+        </p:txBody>
+      </p:sp>
     </p:spTree>
   </p:cSld>
   <p:clrMapOvr>
@@ -3694,7 +4209,6 @@
               <a:rPr lang="en-US" altLang="en-US" dirty="0" smtClean="0"/>
               <a:t> Training </a:t>
             </a:r>
-            <a:endParaRPr lang="en-US" altLang="en-US" dirty="0" smtClean="0"/>
           </a:p>
         </p:txBody>
       </p:sp>
@@ -3876,6 +4390,35 @@
           </a:graphicData>
         </a:graphic>
       </p:graphicFrame>
+      <p:sp>
+        <p:nvSpPr>
+          <p:cNvPr id="3" name="Slide Number Placeholder 2"/>
+          <p:cNvSpPr>
+            <a:spLocks noGrp="1"/>
+          </p:cNvSpPr>
+          <p:nvPr>
+            <p:ph type="sldNum" sz="quarter" idx="12"/>
+          </p:nvPr>
+        </p:nvSpPr>
+        <p:spPr/>
+        <p:txBody>
+          <a:bodyPr/>
+          <a:lstStyle/>
+          <a:p>
+            <a:pPr>
+              <a:defRPr/>
+            </a:pPr>
+            <a:fld id="{E6AE2B1A-DD0D-4385-B3EF-7FA9FFFD01AF}" type="slidenum">
+              <a:rPr lang="en-US" smtClean="0"/>
+              <a:pPr>
+                <a:defRPr/>
+              </a:pPr>
+              <a:t>2</a:t>
+            </a:fld>
+            <a:endParaRPr lang="en-US"/>
+          </a:p>
+        </p:txBody>
+      </p:sp>
     </p:spTree>
   </p:cSld>
   <p:clrMapOvr>
@@ -4418,6 +4961,35 @@
               <a:t>Project Task</a:t>
             </a:r>
             <a:endParaRPr lang="en-IN" sz="1100" dirty="0"/>
+          </a:p>
+        </p:txBody>
+      </p:sp>
+      <p:sp>
+        <p:nvSpPr>
+          <p:cNvPr id="2" name="Slide Number Placeholder 1"/>
+          <p:cNvSpPr>
+            <a:spLocks noGrp="1"/>
+          </p:cNvSpPr>
+          <p:nvPr>
+            <p:ph type="sldNum" sz="quarter" idx="12"/>
+          </p:nvPr>
+        </p:nvSpPr>
+        <p:spPr/>
+        <p:txBody>
+          <a:bodyPr/>
+          <a:lstStyle/>
+          <a:p>
+            <a:pPr>
+              <a:defRPr/>
+            </a:pPr>
+            <a:fld id="{E6AE2B1A-DD0D-4385-B3EF-7FA9FFFD01AF}" type="slidenum">
+              <a:rPr lang="en-US" smtClean="0"/>
+              <a:pPr>
+                <a:defRPr/>
+              </a:pPr>
+              <a:t>3</a:t>
+            </a:fld>
+            <a:endParaRPr lang="en-US"/>
           </a:p>
         </p:txBody>
       </p:sp>
@@ -4922,6 +5494,35 @@
           </a:extLst>
         </p:spPr>
       </p:pic>
+      <p:sp>
+        <p:nvSpPr>
+          <p:cNvPr id="5" name="Slide Number Placeholder 4"/>
+          <p:cNvSpPr>
+            <a:spLocks noGrp="1"/>
+          </p:cNvSpPr>
+          <p:nvPr>
+            <p:ph type="sldNum" sz="quarter" idx="12"/>
+          </p:nvPr>
+        </p:nvSpPr>
+        <p:spPr/>
+        <p:txBody>
+          <a:bodyPr/>
+          <a:lstStyle/>
+          <a:p>
+            <a:pPr>
+              <a:defRPr/>
+            </a:pPr>
+            <a:fld id="{E6AE2B1A-DD0D-4385-B3EF-7FA9FFFD01AF}" type="slidenum">
+              <a:rPr lang="en-US" smtClean="0"/>
+              <a:pPr>
+                <a:defRPr/>
+              </a:pPr>
+              <a:t>4</a:t>
+            </a:fld>
+            <a:endParaRPr lang="en-US"/>
+          </a:p>
+        </p:txBody>
+      </p:sp>
     </p:spTree>
   </p:cSld>
   <p:clrMapOvr>
@@ -5218,4 +5819,574 @@
   <a:objectDefaults/>
   <a:extraClrSchemeLst/>
 </a:theme>
+</file>
+
+<file path=ppt/theme/theme2.xml><?xml version="1.0" encoding="utf-8"?>
+<a:theme xmlns:a="http://schemas.openxmlformats.org/drawingml/2006/main" name="Office Theme">
+  <a:themeElements>
+    <a:clrScheme name="Office">
+      <a:dk1>
+        <a:sysClr val="windowText" lastClr="000000"/>
+      </a:dk1>
+      <a:lt1>
+        <a:sysClr val="window" lastClr="FFFFFF"/>
+      </a:lt1>
+      <a:dk2>
+        <a:srgbClr val="1F497D"/>
+      </a:dk2>
+      <a:lt2>
+        <a:srgbClr val="EEECE1"/>
+      </a:lt2>
+      <a:accent1>
+        <a:srgbClr val="4F81BD"/>
+      </a:accent1>
+      <a:accent2>
+        <a:srgbClr val="C0504D"/>
+      </a:accent2>
+      <a:accent3>
+        <a:srgbClr val="9BBB59"/>
+      </a:accent3>
+      <a:accent4>
+        <a:srgbClr val="8064A2"/>
+      </a:accent4>
+      <a:accent5>
+        <a:srgbClr val="4BACC6"/>
+      </a:accent5>
+      <a:accent6>
+        <a:srgbClr val="F79646"/>
+      </a:accent6>
+      <a:hlink>
+        <a:srgbClr val="0000FF"/>
+      </a:hlink>
+      <a:folHlink>
+        <a:srgbClr val="800080"/>
+      </a:folHlink>
+    </a:clrScheme>
+    <a:fontScheme name="Office">
+      <a:majorFont>
+        <a:latin typeface="Calibri"/>
+        <a:ea typeface=""/>
+        <a:cs typeface=""/>
+        <a:font script="Jpan" typeface="ＭＳ Ｐゴシック"/>
+        <a:font script="Hang" typeface="맑은 고딕"/>
+        <a:font script="Hans" typeface="宋体"/>
+        <a:font script="Hant" typeface="新細明體"/>
+        <a:font script="Arab" typeface="Times New Roman"/>
+        <a:font script="Hebr" typeface="Times New Roman"/>
+        <a:font script="Thai" typeface="Angsana New"/>
+        <a:font script="Ethi" typeface="Nyala"/>
+        <a:font script="Beng" typeface="Vrinda"/>
+        <a:font script="Gujr" typeface="Shruti"/>
+        <a:font script="Khmr" typeface="MoolBoran"/>
+        <a:font script="Knda" typeface="Tunga"/>
+        <a:font script="Guru" typeface="Raavi"/>
+        <a:font script="Cans" typeface="Euphemia"/>
+        <a:font script="Cher" typeface="Plantagenet Cherokee"/>
+        <a:font script="Yiii" typeface="Microsoft Yi Baiti"/>
+        <a:font script="Tibt" typeface="Microsoft Himalaya"/>
+        <a:font script="Thaa" typeface="MV Boli"/>
+        <a:font script="Deva" typeface="Mangal"/>
+        <a:font script="Telu" typeface="Gautami"/>
+        <a:font script="Taml" typeface="Latha"/>
+        <a:font script="Syrc" typeface="Estrangelo Edessa"/>
+        <a:font script="Orya" typeface="Kalinga"/>
+        <a:font script="Mlym" typeface="Kartika"/>
+        <a:font script="Laoo" typeface="DokChampa"/>
+        <a:font script="Sinh" typeface="Iskoola Pota"/>
+        <a:font script="Mong" typeface="Mongolian Baiti"/>
+        <a:font script="Viet" typeface="Times New Roman"/>
+        <a:font script="Uigh" typeface="Microsoft Uighur"/>
+        <a:font script="Geor" typeface="Sylfaen"/>
+      </a:majorFont>
+      <a:minorFont>
+        <a:latin typeface="Calibri"/>
+        <a:ea typeface=""/>
+        <a:cs typeface=""/>
+        <a:font script="Jpan" typeface="ＭＳ Ｐゴシック"/>
+        <a:font script="Hang" typeface="맑은 고딕"/>
+        <a:font script="Hans" typeface="宋体"/>
+        <a:font script="Hant" typeface="新細明體"/>
+        <a:font script="Arab" typeface="Arial"/>
+        <a:font script="Hebr" typeface="Arial"/>
+        <a:font script="Thai" typeface="Cordia New"/>
+        <a:font script="Ethi" typeface="Nyala"/>
+        <a:font script="Beng" typeface="Vrinda"/>
+        <a:font script="Gujr" typeface="Shruti"/>
+        <a:font script="Khmr" typeface="DaunPenh"/>
+        <a:font script="Knda" typeface="Tunga"/>
+        <a:font script="Guru" typeface="Raavi"/>
+        <a:font script="Cans" typeface="Euphemia"/>
+        <a:font script="Cher" typeface="Plantagenet Cherokee"/>
+        <a:font script="Yiii" typeface="Microsoft Yi Baiti"/>
+        <a:font script="Tibt" typeface="Microsoft Himalaya"/>
+        <a:font script="Thaa" typeface="MV Boli"/>
+        <a:font script="Deva" typeface="Mangal"/>
+        <a:font script="Telu" typeface="Gautami"/>
+        <a:font script="Taml" typeface="Latha"/>
+        <a:font script="Syrc" typeface="Estrangelo Edessa"/>
+        <a:font script="Orya" typeface="Kalinga"/>
+        <a:font script="Mlym" typeface="Kartika"/>
+        <a:font script="Laoo" typeface="DokChampa"/>
+        <a:font script="Sinh" typeface="Iskoola Pota"/>
+        <a:font script="Mong" typeface="Mongolian Baiti"/>
+        <a:font script="Viet" typeface="Arial"/>
+        <a:font script="Uigh" typeface="Microsoft Uighur"/>
+        <a:font script="Geor" typeface="Sylfaen"/>
+      </a:minorFont>
+    </a:fontScheme>
+    <a:fmtScheme name="Office">
+      <a:fillStyleLst>
+        <a:solidFill>
+          <a:schemeClr val="phClr"/>
+        </a:solidFill>
+        <a:gradFill rotWithShape="1">
+          <a:gsLst>
+            <a:gs pos="0">
+              <a:schemeClr val="phClr">
+                <a:tint val="50000"/>
+                <a:satMod val="300000"/>
+              </a:schemeClr>
+            </a:gs>
+            <a:gs pos="35000">
+              <a:schemeClr val="phClr">
+                <a:tint val="37000"/>
+                <a:satMod val="300000"/>
+              </a:schemeClr>
+            </a:gs>
+            <a:gs pos="100000">
+              <a:schemeClr val="phClr">
+                <a:tint val="15000"/>
+                <a:satMod val="350000"/>
+              </a:schemeClr>
+            </a:gs>
+          </a:gsLst>
+          <a:lin ang="16200000" scaled="1"/>
+        </a:gradFill>
+        <a:gradFill rotWithShape="1">
+          <a:gsLst>
+            <a:gs pos="0">
+              <a:schemeClr val="phClr">
+                <a:shade val="51000"/>
+                <a:satMod val="130000"/>
+              </a:schemeClr>
+            </a:gs>
+            <a:gs pos="80000">
+              <a:schemeClr val="phClr">
+                <a:shade val="93000"/>
+                <a:satMod val="130000"/>
+              </a:schemeClr>
+            </a:gs>
+            <a:gs pos="100000">
+              <a:schemeClr val="phClr">
+                <a:shade val="94000"/>
+                <a:satMod val="135000"/>
+              </a:schemeClr>
+            </a:gs>
+          </a:gsLst>
+          <a:lin ang="16200000" scaled="0"/>
+        </a:gradFill>
+      </a:fillStyleLst>
+      <a:lnStyleLst>
+        <a:ln w="9525" cap="flat" cmpd="sng" algn="ctr">
+          <a:solidFill>
+            <a:schemeClr val="phClr">
+              <a:shade val="95000"/>
+              <a:satMod val="105000"/>
+            </a:schemeClr>
+          </a:solidFill>
+          <a:prstDash val="solid"/>
+        </a:ln>
+        <a:ln w="25400" cap="flat" cmpd="sng" algn="ctr">
+          <a:solidFill>
+            <a:schemeClr val="phClr"/>
+          </a:solidFill>
+          <a:prstDash val="solid"/>
+        </a:ln>
+        <a:ln w="38100" cap="flat" cmpd="sng" algn="ctr">
+          <a:solidFill>
+            <a:schemeClr val="phClr"/>
+          </a:solidFill>
+          <a:prstDash val="solid"/>
+        </a:ln>
+      </a:lnStyleLst>
+      <a:effectStyleLst>
+        <a:effectStyle>
+          <a:effectLst>
+            <a:outerShdw blurRad="40000" dist="20000" dir="5400000" rotWithShape="0">
+              <a:srgbClr val="000000">
+                <a:alpha val="38000"/>
+              </a:srgbClr>
+            </a:outerShdw>
+          </a:effectLst>
+        </a:effectStyle>
+        <a:effectStyle>
+          <a:effectLst>
+            <a:outerShdw blurRad="40000" dist="23000" dir="5400000" rotWithShape="0">
+              <a:srgbClr val="000000">
+                <a:alpha val="35000"/>
+              </a:srgbClr>
+            </a:outerShdw>
+          </a:effectLst>
+        </a:effectStyle>
+        <a:effectStyle>
+          <a:effectLst>
+            <a:outerShdw blurRad="40000" dist="23000" dir="5400000" rotWithShape="0">
+              <a:srgbClr val="000000">
+                <a:alpha val="35000"/>
+              </a:srgbClr>
+            </a:outerShdw>
+          </a:effectLst>
+          <a:scene3d>
+            <a:camera prst="orthographicFront">
+              <a:rot lat="0" lon="0" rev="0"/>
+            </a:camera>
+            <a:lightRig rig="threePt" dir="t">
+              <a:rot lat="0" lon="0" rev="1200000"/>
+            </a:lightRig>
+          </a:scene3d>
+          <a:sp3d>
+            <a:bevelT w="63500" h="25400"/>
+          </a:sp3d>
+        </a:effectStyle>
+      </a:effectStyleLst>
+      <a:bgFillStyleLst>
+        <a:solidFill>
+          <a:schemeClr val="phClr"/>
+        </a:solidFill>
+        <a:gradFill rotWithShape="1">
+          <a:gsLst>
+            <a:gs pos="0">
+              <a:schemeClr val="phClr">
+                <a:tint val="40000"/>
+                <a:satMod val="350000"/>
+              </a:schemeClr>
+            </a:gs>
+            <a:gs pos="40000">
+              <a:schemeClr val="phClr">
+                <a:tint val="45000"/>
+                <a:shade val="99000"/>
+                <a:satMod val="350000"/>
+              </a:schemeClr>
+            </a:gs>
+            <a:gs pos="100000">
+              <a:schemeClr val="phClr">
+                <a:shade val="20000"/>
+                <a:satMod val="255000"/>
+              </a:schemeClr>
+            </a:gs>
+          </a:gsLst>
+          <a:path path="circle">
+            <a:fillToRect l="50000" t="-80000" r="50000" b="180000"/>
+          </a:path>
+        </a:gradFill>
+        <a:gradFill rotWithShape="1">
+          <a:gsLst>
+            <a:gs pos="0">
+              <a:schemeClr val="phClr">
+                <a:tint val="80000"/>
+                <a:satMod val="300000"/>
+              </a:schemeClr>
+            </a:gs>
+            <a:gs pos="100000">
+              <a:schemeClr val="phClr">
+                <a:shade val="30000"/>
+                <a:satMod val="200000"/>
+              </a:schemeClr>
+            </a:gs>
+          </a:gsLst>
+          <a:path path="circle">
+            <a:fillToRect l="50000" t="50000" r="50000" b="50000"/>
+          </a:path>
+        </a:gradFill>
+      </a:bgFillStyleLst>
+    </a:fmtScheme>
+  </a:themeElements>
+  <a:objectDefaults/>
+  <a:extraClrSchemeLst/>
+</a:theme>
+</file>
+
+<file path=ppt/theme/theme3.xml><?xml version="1.0" encoding="utf-8"?>
+<a:theme xmlns:a="http://schemas.openxmlformats.org/drawingml/2006/main" name="Office Theme">
+  <a:themeElements>
+    <a:clrScheme name="Office">
+      <a:dk1>
+        <a:sysClr val="windowText" lastClr="000000"/>
+      </a:dk1>
+      <a:lt1>
+        <a:sysClr val="window" lastClr="FFFFFF"/>
+      </a:lt1>
+      <a:dk2>
+        <a:srgbClr val="1F497D"/>
+      </a:dk2>
+      <a:lt2>
+        <a:srgbClr val="EEECE1"/>
+      </a:lt2>
+      <a:accent1>
+        <a:srgbClr val="4F81BD"/>
+      </a:accent1>
+      <a:accent2>
+        <a:srgbClr val="C0504D"/>
+      </a:accent2>
+      <a:accent3>
+        <a:srgbClr val="9BBB59"/>
+      </a:accent3>
+      <a:accent4>
+        <a:srgbClr val="8064A2"/>
+      </a:accent4>
+      <a:accent5>
+        <a:srgbClr val="4BACC6"/>
+      </a:accent5>
+      <a:accent6>
+        <a:srgbClr val="F79646"/>
+      </a:accent6>
+      <a:hlink>
+        <a:srgbClr val="0000FF"/>
+      </a:hlink>
+      <a:folHlink>
+        <a:srgbClr val="800080"/>
+      </a:folHlink>
+    </a:clrScheme>
+    <a:fontScheme name="Office">
+      <a:majorFont>
+        <a:latin typeface="Calibri"/>
+        <a:ea typeface=""/>
+        <a:cs typeface=""/>
+        <a:font script="Jpan" typeface="ＭＳ Ｐゴシック"/>
+        <a:font script="Hang" typeface="맑은 고딕"/>
+        <a:font script="Hans" typeface="宋体"/>
+        <a:font script="Hant" typeface="新細明體"/>
+        <a:font script="Arab" typeface="Times New Roman"/>
+        <a:font script="Hebr" typeface="Times New Roman"/>
+        <a:font script="Thai" typeface="Angsana New"/>
+        <a:font script="Ethi" typeface="Nyala"/>
+        <a:font script="Beng" typeface="Vrinda"/>
+        <a:font script="Gujr" typeface="Shruti"/>
+        <a:font script="Khmr" typeface="MoolBoran"/>
+        <a:font script="Knda" typeface="Tunga"/>
+        <a:font script="Guru" typeface="Raavi"/>
+        <a:font script="Cans" typeface="Euphemia"/>
+        <a:font script="Cher" typeface="Plantagenet Cherokee"/>
+        <a:font script="Yiii" typeface="Microsoft Yi Baiti"/>
+        <a:font script="Tibt" typeface="Microsoft Himalaya"/>
+        <a:font script="Thaa" typeface="MV Boli"/>
+        <a:font script="Deva" typeface="Mangal"/>
+        <a:font script="Telu" typeface="Gautami"/>
+        <a:font script="Taml" typeface="Latha"/>
+        <a:font script="Syrc" typeface="Estrangelo Edessa"/>
+        <a:font script="Orya" typeface="Kalinga"/>
+        <a:font script="Mlym" typeface="Kartika"/>
+        <a:font script="Laoo" typeface="DokChampa"/>
+        <a:font script="Sinh" typeface="Iskoola Pota"/>
+        <a:font script="Mong" typeface="Mongolian Baiti"/>
+        <a:font script="Viet" typeface="Times New Roman"/>
+        <a:font script="Uigh" typeface="Microsoft Uighur"/>
+        <a:font script="Geor" typeface="Sylfaen"/>
+      </a:majorFont>
+      <a:minorFont>
+        <a:latin typeface="Calibri"/>
+        <a:ea typeface=""/>
+        <a:cs typeface=""/>
+        <a:font script="Jpan" typeface="ＭＳ Ｐゴシック"/>
+        <a:font script="Hang" typeface="맑은 고딕"/>
+        <a:font script="Hans" typeface="宋体"/>
+        <a:font script="Hant" typeface="新細明體"/>
+        <a:font script="Arab" typeface="Arial"/>
+        <a:font script="Hebr" typeface="Arial"/>
+        <a:font script="Thai" typeface="Cordia New"/>
+        <a:font script="Ethi" typeface="Nyala"/>
+        <a:font script="Beng" typeface="Vrinda"/>
+        <a:font script="Gujr" typeface="Shruti"/>
+        <a:font script="Khmr" typeface="DaunPenh"/>
+        <a:font script="Knda" typeface="Tunga"/>
+        <a:font script="Guru" typeface="Raavi"/>
+        <a:font script="Cans" typeface="Euphemia"/>
+        <a:font script="Cher" typeface="Plantagenet Cherokee"/>
+        <a:font script="Yiii" typeface="Microsoft Yi Baiti"/>
+        <a:font script="Tibt" typeface="Microsoft Himalaya"/>
+        <a:font script="Thaa" typeface="MV Boli"/>
+        <a:font script="Deva" typeface="Mangal"/>
+        <a:font script="Telu" typeface="Gautami"/>
+        <a:font script="Taml" typeface="Latha"/>
+        <a:font script="Syrc" typeface="Estrangelo Edessa"/>
+        <a:font script="Orya" typeface="Kalinga"/>
+        <a:font script="Mlym" typeface="Kartika"/>
+        <a:font script="Laoo" typeface="DokChampa"/>
+        <a:font script="Sinh" typeface="Iskoola Pota"/>
+        <a:font script="Mong" typeface="Mongolian Baiti"/>
+        <a:font script="Viet" typeface="Arial"/>
+        <a:font script="Uigh" typeface="Microsoft Uighur"/>
+        <a:font script="Geor" typeface="Sylfaen"/>
+      </a:minorFont>
+    </a:fontScheme>
+    <a:fmtScheme name="Office">
+      <a:fillStyleLst>
+        <a:solidFill>
+          <a:schemeClr val="phClr"/>
+        </a:solidFill>
+        <a:gradFill rotWithShape="1">
+          <a:gsLst>
+            <a:gs pos="0">
+              <a:schemeClr val="phClr">
+                <a:tint val="50000"/>
+                <a:satMod val="300000"/>
+              </a:schemeClr>
+            </a:gs>
+            <a:gs pos="35000">
+              <a:schemeClr val="phClr">
+                <a:tint val="37000"/>
+                <a:satMod val="300000"/>
+              </a:schemeClr>
+            </a:gs>
+            <a:gs pos="100000">
+              <a:schemeClr val="phClr">
+                <a:tint val="15000"/>
+                <a:satMod val="350000"/>
+              </a:schemeClr>
+            </a:gs>
+          </a:gsLst>
+          <a:lin ang="16200000" scaled="1"/>
+        </a:gradFill>
+        <a:gradFill rotWithShape="1">
+          <a:gsLst>
+            <a:gs pos="0">
+              <a:schemeClr val="phClr">
+                <a:shade val="51000"/>
+                <a:satMod val="130000"/>
+              </a:schemeClr>
+            </a:gs>
+            <a:gs pos="80000">
+              <a:schemeClr val="phClr">
+                <a:shade val="93000"/>
+                <a:satMod val="130000"/>
+              </a:schemeClr>
+            </a:gs>
+            <a:gs pos="100000">
+              <a:schemeClr val="phClr">
+                <a:shade val="94000"/>
+                <a:satMod val="135000"/>
+              </a:schemeClr>
+            </a:gs>
+          </a:gsLst>
+          <a:lin ang="16200000" scaled="0"/>
+        </a:gradFill>
+      </a:fillStyleLst>
+      <a:lnStyleLst>
+        <a:ln w="9525" cap="flat" cmpd="sng" algn="ctr">
+          <a:solidFill>
+            <a:schemeClr val="phClr">
+              <a:shade val="95000"/>
+              <a:satMod val="105000"/>
+            </a:schemeClr>
+          </a:solidFill>
+          <a:prstDash val="solid"/>
+        </a:ln>
+        <a:ln w="25400" cap="flat" cmpd="sng" algn="ctr">
+          <a:solidFill>
+            <a:schemeClr val="phClr"/>
+          </a:solidFill>
+          <a:prstDash val="solid"/>
+        </a:ln>
+        <a:ln w="38100" cap="flat" cmpd="sng" algn="ctr">
+          <a:solidFill>
+            <a:schemeClr val="phClr"/>
+          </a:solidFill>
+          <a:prstDash val="solid"/>
+        </a:ln>
+      </a:lnStyleLst>
+      <a:effectStyleLst>
+        <a:effectStyle>
+          <a:effectLst>
+            <a:outerShdw blurRad="40000" dist="20000" dir="5400000" rotWithShape="0">
+              <a:srgbClr val="000000">
+                <a:alpha val="38000"/>
+              </a:srgbClr>
+            </a:outerShdw>
+          </a:effectLst>
+        </a:effectStyle>
+        <a:effectStyle>
+          <a:effectLst>
+            <a:outerShdw blurRad="40000" dist="23000" dir="5400000" rotWithShape="0">
+              <a:srgbClr val="000000">
+                <a:alpha val="35000"/>
+              </a:srgbClr>
+            </a:outerShdw>
+          </a:effectLst>
+        </a:effectStyle>
+        <a:effectStyle>
+          <a:effectLst>
+            <a:outerShdw blurRad="40000" dist="23000" dir="5400000" rotWithShape="0">
+              <a:srgbClr val="000000">
+                <a:alpha val="35000"/>
+              </a:srgbClr>
+            </a:outerShdw>
+          </a:effectLst>
+          <a:scene3d>
+            <a:camera prst="orthographicFront">
+              <a:rot lat="0" lon="0" rev="0"/>
+            </a:camera>
+            <a:lightRig rig="threePt" dir="t">
+              <a:rot lat="0" lon="0" rev="1200000"/>
+            </a:lightRig>
+          </a:scene3d>
+          <a:sp3d>
+            <a:bevelT w="63500" h="25400"/>
+          </a:sp3d>
+        </a:effectStyle>
+      </a:effectStyleLst>
+      <a:bgFillStyleLst>
+        <a:solidFill>
+          <a:schemeClr val="phClr"/>
+        </a:solidFill>
+        <a:gradFill rotWithShape="1">
+          <a:gsLst>
+            <a:gs pos="0">
+              <a:schemeClr val="phClr">
+                <a:tint val="40000"/>
+                <a:satMod val="350000"/>
+              </a:schemeClr>
+            </a:gs>
+            <a:gs pos="40000">
+              <a:schemeClr val="phClr">
+                <a:tint val="45000"/>
+                <a:shade val="99000"/>
+                <a:satMod val="350000"/>
+              </a:schemeClr>
+            </a:gs>
+            <a:gs pos="100000">
+              <a:schemeClr val="phClr">
+                <a:shade val="20000"/>
+                <a:satMod val="255000"/>
+              </a:schemeClr>
+            </a:gs>
+          </a:gsLst>
+          <a:path path="circle">
+            <a:fillToRect l="50000" t="-80000" r="50000" b="180000"/>
+          </a:path>
+        </a:gradFill>
+        <a:gradFill rotWithShape="1">
+          <a:gsLst>
+            <a:gs pos="0">
+              <a:schemeClr val="phClr">
+                <a:tint val="80000"/>
+                <a:satMod val="300000"/>
+              </a:schemeClr>
+            </a:gs>
+            <a:gs pos="100000">
+              <a:schemeClr val="phClr">
+                <a:shade val="30000"/>
+                <a:satMod val="200000"/>
+              </a:schemeClr>
+            </a:gs>
+          </a:gsLst>
+          <a:path path="circle">
+            <a:fillToRect l="50000" t="50000" r="50000" b="50000"/>
+          </a:path>
+        </a:gradFill>
+      </a:bgFillStyleLst>
+    </a:fmtScheme>
+  </a:themeElements>
+  <a:objectDefaults/>
+  <a:extraClrSchemeLst/>
+</a:theme>
 </file>
</xml_diff>

<commit_message>
PPTs pdf files added.
</commit_message>
<xml_diff>
--- a/Show & Tell/OT-PPT.pptx
+++ b/Show & Tell/OT-PPT.pptx
@@ -5,16 +5,17 @@
     <p:sldMasterId id="2147483648" r:id="rId1"/>
   </p:sldMasterIdLst>
   <p:notesMasterIdLst>
-    <p:notesMasterId r:id="rId6"/>
+    <p:notesMasterId r:id="rId7"/>
   </p:notesMasterIdLst>
   <p:handoutMasterIdLst>
-    <p:handoutMasterId r:id="rId7"/>
+    <p:handoutMasterId r:id="rId8"/>
   </p:handoutMasterIdLst>
   <p:sldIdLst>
     <p:sldId id="256" r:id="rId2"/>
-    <p:sldId id="257" r:id="rId3"/>
-    <p:sldId id="258" r:id="rId4"/>
-    <p:sldId id="259" r:id="rId5"/>
+    <p:sldId id="260" r:id="rId3"/>
+    <p:sldId id="261" r:id="rId4"/>
+    <p:sldId id="262" r:id="rId5"/>
+    <p:sldId id="263" r:id="rId6"/>
   </p:sldIdLst>
   <p:sldSz cx="9144000" cy="5143500" type="screen16x9"/>
   <p:notesSz cx="6858000" cy="9144000"/>
@@ -712,7 +713,7 @@
             <a:pPr>
               <a:defRPr/>
             </a:pPr>
-            <a:fld id="{CF101EEC-C303-424A-86B7-23FE40A095B8}" type="datetime1">
+            <a:fld id="{B4096766-A6D3-4E65-9F31-67ED6BCB3ECC}" type="datetime1">
               <a:rPr lang="en-US" smtClean="0"/>
               <a:t>10/31/2022</a:t>
             </a:fld>
@@ -918,7 +919,7 @@
             <a:pPr>
               <a:defRPr/>
             </a:pPr>
-            <a:fld id="{8E236A36-A448-4EDF-B62B-747982797A4A}" type="datetime1">
+            <a:fld id="{325AA255-3A15-45F3-A830-C47418BC7B3C}" type="datetime1">
               <a:rPr lang="en-US" smtClean="0"/>
               <a:t>10/31/2022</a:t>
             </a:fld>
@@ -1134,7 +1135,7 @@
             <a:pPr>
               <a:defRPr/>
             </a:pPr>
-            <a:fld id="{138F19ED-55FF-45C8-A40A-B878DBE02B90}" type="datetime1">
+            <a:fld id="{3DB5623C-6929-4187-BD5B-26500F767F8E}" type="datetime1">
               <a:rPr lang="en-US" smtClean="0"/>
               <a:t>10/31/2022</a:t>
             </a:fld>
@@ -1340,7 +1341,7 @@
             <a:pPr>
               <a:defRPr/>
             </a:pPr>
-            <a:fld id="{C53ED2D9-5D73-41E3-80E7-9BBE4A9E0EAA}" type="datetime1">
+            <a:fld id="{6A526C60-CA8B-48D8-BDE4-D66FCBB10C5F}" type="datetime1">
               <a:rPr lang="en-US" smtClean="0"/>
               <a:t>10/31/2022</a:t>
             </a:fld>
@@ -1622,7 +1623,7 @@
             <a:pPr>
               <a:defRPr/>
             </a:pPr>
-            <a:fld id="{E7FA4B11-7718-4865-9C1E-C9C3E6EF2975}" type="datetime1">
+            <a:fld id="{A9B41BE4-8996-41ED-B469-DD5242405A28}" type="datetime1">
               <a:rPr lang="en-US" smtClean="0"/>
               <a:t>10/31/2022</a:t>
             </a:fld>
@@ -1946,7 +1947,7 @@
             <a:pPr>
               <a:defRPr/>
             </a:pPr>
-            <a:fld id="{EBE143BA-922B-49B9-8B64-E7BCE7D0AB96}" type="datetime1">
+            <a:fld id="{CA68C020-0D12-4624-9A07-C42A25353450}" type="datetime1">
               <a:rPr lang="en-US" smtClean="0"/>
               <a:t>10/31/2022</a:t>
             </a:fld>
@@ -2404,7 +2405,7 @@
             <a:pPr>
               <a:defRPr/>
             </a:pPr>
-            <a:fld id="{174B2622-5366-46C5-821D-C3590C691E40}" type="datetime1">
+            <a:fld id="{2B3B34F2-5AF7-4B3F-85AC-AC11AF32F6DF}" type="datetime1">
               <a:rPr lang="en-US" smtClean="0"/>
               <a:t>10/31/2022</a:t>
             </a:fld>
@@ -2558,7 +2559,7 @@
             <a:pPr>
               <a:defRPr/>
             </a:pPr>
-            <a:fld id="{BFEFAB42-3D38-420A-AFBF-FCAE97740FAE}" type="datetime1">
+            <a:fld id="{68D09F5F-DDC2-4BCB-B318-7DC29C3589A8}" type="datetime1">
               <a:rPr lang="en-US" smtClean="0"/>
               <a:t>10/31/2022</a:t>
             </a:fld>
@@ -2689,7 +2690,7 @@
             <a:pPr>
               <a:defRPr/>
             </a:pPr>
-            <a:fld id="{837ED3DE-3294-4DBB-BD80-4B1B6420C4F8}" type="datetime1">
+            <a:fld id="{87D379BA-CC30-4DF7-A786-13ECC34476B0}" type="datetime1">
               <a:rPr lang="en-US" smtClean="0"/>
               <a:t>10/31/2022</a:t>
             </a:fld>
@@ -3002,7 +3003,7 @@
             <a:pPr>
               <a:defRPr/>
             </a:pPr>
-            <a:fld id="{2B86E912-4B61-4ADD-86F9-429FC406AA3F}" type="datetime1">
+            <a:fld id="{324A113B-F00E-4F36-913D-998038BCCC7D}" type="datetime1">
               <a:rPr lang="en-US" smtClean="0"/>
               <a:t>10/31/2022</a:t>
             </a:fld>
@@ -3298,7 +3299,7 @@
             <a:pPr>
               <a:defRPr/>
             </a:pPr>
-            <a:fld id="{C0783B60-58AB-406F-B264-A1E098EE8648}" type="datetime1">
+            <a:fld id="{142C5081-A737-4B2D-BE0F-5C37DE05C549}" type="datetime1">
               <a:rPr lang="en-US" smtClean="0"/>
               <a:t>10/31/2022</a:t>
             </a:fld>
@@ -3593,7 +3594,7 @@
             <a:pPr>
               <a:defRPr/>
             </a:pPr>
-            <a:fld id="{563FE660-E19E-4E92-B833-A81126E74189}" type="datetime1">
+            <a:fld id="{AB3F2C3F-F27F-4B29-AE71-E99E75D16AB7}" type="datetime1">
               <a:rPr lang="en-US" smtClean="0"/>
               <a:t>10/31/2022</a:t>
             </a:fld>
@@ -4122,7 +4123,7 @@
       </p:grpSpPr>
       <p:sp>
         <p:nvSpPr>
-          <p:cNvPr id="2" name="Slide Number Placeholder 1"/>
+          <p:cNvPr id="3" name="Slide Number Placeholder 2"/>
           <p:cNvSpPr>
             <a:spLocks noGrp="1"/>
           </p:cNvSpPr>
@@ -4325,7 +4326,7 @@
           <p:nvPr>
             <p:extLst>
               <p:ext uri="{D42A27DB-BD31-4B8C-83A1-F6EECF244321}">
-                <p14:modId xmlns:p14="http://schemas.microsoft.com/office/powerpoint/2010/main" val="2880229904"/>
+                <p14:modId xmlns:p14="http://schemas.microsoft.com/office/powerpoint/2010/main" val="2767614606"/>
               </p:ext>
             </p:extLst>
           </p:nvPr>
@@ -4420,6 +4421,11 @@
         </p:txBody>
       </p:sp>
     </p:spTree>
+    <p:extLst>
+      <p:ext uri="{BB962C8B-B14F-4D97-AF65-F5344CB8AC3E}">
+        <p14:creationId xmlns:p14="http://schemas.microsoft.com/office/powerpoint/2010/main" val="2415720854"/>
+      </p:ext>
+    </p:extLst>
   </p:cSld>
   <p:clrMapOvr>
     <a:masterClrMapping/>
@@ -4512,7 +4518,7 @@
         <p:spPr bwMode="auto">
           <a:xfrm>
             <a:off x="249977" y="589981"/>
-            <a:ext cx="3961983" cy="1985519"/>
+            <a:ext cx="2809855" cy="1928981"/>
           </a:xfrm>
           <a:prstGeom prst="rect">
             <a:avLst/>
@@ -4552,8 +4558,8 @@
         </p:nvSpPr>
         <p:spPr bwMode="auto">
           <a:xfrm>
-            <a:off x="4430987" y="195486"/>
-            <a:ext cx="3885429" cy="504055"/>
+            <a:off x="4625163" y="2594636"/>
+            <a:ext cx="4051293" cy="359738"/>
           </a:xfrm>
           <a:prstGeom prst="rect">
             <a:avLst/>
@@ -4739,7 +4745,7 @@
         </p:blipFill>
         <p:spPr bwMode="auto">
           <a:xfrm>
-            <a:off x="4283968" y="627534"/>
+            <a:off x="4572000" y="2954581"/>
             <a:ext cx="4265775" cy="1986687"/>
           </a:xfrm>
           <a:prstGeom prst="rect">
@@ -4830,8 +4836,8 @@
         </p:nvSpPr>
         <p:spPr>
           <a:xfrm>
-            <a:off x="211560" y="2614221"/>
-            <a:ext cx="2664296" cy="261610"/>
+            <a:off x="269789" y="2614221"/>
+            <a:ext cx="3870163" cy="261610"/>
           </a:xfrm>
           <a:prstGeom prst="rect">
             <a:avLst/>
@@ -4884,8 +4890,8 @@
         </p:blipFill>
         <p:spPr bwMode="auto">
           <a:xfrm>
-            <a:off x="4399014" y="2966056"/>
-            <a:ext cx="3917402" cy="1963737"/>
+            <a:off x="6177694" y="555225"/>
+            <a:ext cx="2498761" cy="1963737"/>
           </a:xfrm>
           <a:prstGeom prst="rect">
             <a:avLst/>
@@ -4933,8 +4939,8 @@
         </p:nvSpPr>
         <p:spPr>
           <a:xfrm>
-            <a:off x="4572000" y="2679842"/>
-            <a:ext cx="1785715" cy="261610"/>
+            <a:off x="6160810" y="242232"/>
+            <a:ext cx="1778681" cy="276999"/>
           </a:xfrm>
           <a:prstGeom prst="rect">
             <a:avLst/>
@@ -4957,10 +4963,247 @@
               <a:buChar char="ü"/>
             </a:pPr>
             <a:r>
-              <a:rPr lang="en-IN" sz="1100" dirty="0" smtClean="0"/>
+              <a:rPr lang="en-IN" sz="1200" dirty="0" smtClean="0"/>
               <a:t>Project Task</a:t>
             </a:r>
-            <a:endParaRPr lang="en-IN" sz="1100" dirty="0"/>
+          </a:p>
+        </p:txBody>
+      </p:sp>
+      <p:pic>
+        <p:nvPicPr>
+          <p:cNvPr id="3074" name="Picture 2"/>
+          <p:cNvPicPr>
+            <a:picLocks noChangeAspect="1" noChangeArrowheads="1"/>
+          </p:cNvPicPr>
+          <p:nvPr/>
+        </p:nvPicPr>
+        <p:blipFill rotWithShape="1">
+          <a:blip r:embed="rId6" cstate="print">
+            <a:extLst>
+              <a:ext uri="{28A0092B-C50C-407E-A947-70E740481C1C}">
+                <a14:useLocalDpi xmlns:a14="http://schemas.microsoft.com/office/drawing/2010/main" val="0"/>
+              </a:ext>
+            </a:extLst>
+          </a:blip>
+          <a:srcRect l="14035" t="10133" r="2832" b="5894"/>
+          <a:stretch/>
+        </p:blipFill>
+        <p:spPr bwMode="auto">
+          <a:xfrm>
+            <a:off x="3203848" y="635273"/>
+            <a:ext cx="2880320" cy="1860697"/>
+          </a:xfrm>
+          <a:prstGeom prst="rect">
+            <a:avLst/>
+          </a:prstGeom>
+          <a:noFill/>
+          <a:ln>
+            <a:noFill/>
+          </a:ln>
+          <a:extLst>
+            <a:ext uri="{909E8E84-426E-40DD-AFC4-6F175D3DCCD1}">
+              <a14:hiddenFill xmlns:a14="http://schemas.microsoft.com/office/drawing/2010/main">
+                <a:solidFill>
+                  <a:schemeClr val="accent1"/>
+                </a:solidFill>
+              </a14:hiddenFill>
+            </a:ext>
+            <a:ext uri="{91240B29-F687-4F45-9708-019B960494DF}">
+              <a14:hiddenLine xmlns:a14="http://schemas.microsoft.com/office/drawing/2010/main" w="9525">
+                <a:solidFill>
+                  <a:schemeClr val="tx1"/>
+                </a:solidFill>
+                <a:miter lim="800000"/>
+                <a:headEnd/>
+                <a:tailEnd/>
+              </a14:hiddenLine>
+            </a:ext>
+          </a:extLst>
+        </p:spPr>
+      </p:pic>
+      <p:sp>
+        <p:nvSpPr>
+          <p:cNvPr id="13" name="Title 1"/>
+          <p:cNvSpPr txBox="1">
+            <a:spLocks/>
+          </p:cNvSpPr>
+          <p:nvPr/>
+        </p:nvSpPr>
+        <p:spPr bwMode="auto">
+          <a:xfrm>
+            <a:off x="3203848" y="235492"/>
+            <a:ext cx="2213980" cy="341658"/>
+          </a:xfrm>
+          <a:prstGeom prst="rect">
+            <a:avLst/>
+          </a:prstGeom>
+          <a:solidFill>
+            <a:schemeClr val="accent5">
+              <a:lumMod val="40000"/>
+              <a:lumOff val="60000"/>
+            </a:schemeClr>
+          </a:solidFill>
+          <a:ln>
+            <a:noFill/>
+          </a:ln>
+          <a:extLst>
+            <a:ext uri="{91240B29-F687-4F45-9708-019B960494DF}">
+              <a14:hiddenLine xmlns:a14="http://schemas.microsoft.com/office/drawing/2010/main" w="9525">
+                <a:solidFill>
+                  <a:srgbClr val="000000"/>
+                </a:solidFill>
+                <a:miter lim="800000"/>
+                <a:headEnd/>
+                <a:tailEnd/>
+              </a14:hiddenLine>
+            </a:ext>
+          </a:extLst>
+        </p:spPr>
+        <p:txBody>
+          <a:bodyPr vert="horz" wrap="square" lIns="91440" tIns="45720" rIns="91440" bIns="45720" numCol="1" anchor="ctr" anchorCtr="0" compatLnSpc="1">
+            <a:prstTxWarp prst="textNoShape">
+              <a:avLst/>
+            </a:prstTxWarp>
+          </a:bodyPr>
+          <a:lstStyle>
+            <a:lvl1pPr algn="ctr" rtl="0" eaLnBrk="1" fontAlgn="base" hangingPunct="1">
+              <a:spcBef>
+                <a:spcPct val="0"/>
+              </a:spcBef>
+              <a:spcAft>
+                <a:spcPct val="0"/>
+              </a:spcAft>
+              <a:defRPr sz="4400" kern="1200">
+                <a:solidFill>
+                  <a:schemeClr val="tx1"/>
+                </a:solidFill>
+                <a:latin typeface="+mj-lt"/>
+                <a:ea typeface="+mj-ea"/>
+                <a:cs typeface="+mj-cs"/>
+              </a:defRPr>
+            </a:lvl1pPr>
+            <a:lvl2pPr algn="ctr" rtl="0" eaLnBrk="1" fontAlgn="base" hangingPunct="1">
+              <a:spcBef>
+                <a:spcPct val="0"/>
+              </a:spcBef>
+              <a:spcAft>
+                <a:spcPct val="0"/>
+              </a:spcAft>
+              <a:defRPr sz="4400">
+                <a:solidFill>
+                  <a:schemeClr val="tx1"/>
+                </a:solidFill>
+                <a:latin typeface="Calibri" pitchFamily="34" charset="0"/>
+              </a:defRPr>
+            </a:lvl2pPr>
+            <a:lvl3pPr algn="ctr" rtl="0" eaLnBrk="1" fontAlgn="base" hangingPunct="1">
+              <a:spcBef>
+                <a:spcPct val="0"/>
+              </a:spcBef>
+              <a:spcAft>
+                <a:spcPct val="0"/>
+              </a:spcAft>
+              <a:defRPr sz="4400">
+                <a:solidFill>
+                  <a:schemeClr val="tx1"/>
+                </a:solidFill>
+                <a:latin typeface="Calibri" pitchFamily="34" charset="0"/>
+              </a:defRPr>
+            </a:lvl3pPr>
+            <a:lvl4pPr algn="ctr" rtl="0" eaLnBrk="1" fontAlgn="base" hangingPunct="1">
+              <a:spcBef>
+                <a:spcPct val="0"/>
+              </a:spcBef>
+              <a:spcAft>
+                <a:spcPct val="0"/>
+              </a:spcAft>
+              <a:defRPr sz="4400">
+                <a:solidFill>
+                  <a:schemeClr val="tx1"/>
+                </a:solidFill>
+                <a:latin typeface="Calibri" pitchFamily="34" charset="0"/>
+              </a:defRPr>
+            </a:lvl4pPr>
+            <a:lvl5pPr algn="ctr" rtl="0" eaLnBrk="1" fontAlgn="base" hangingPunct="1">
+              <a:spcBef>
+                <a:spcPct val="0"/>
+              </a:spcBef>
+              <a:spcAft>
+                <a:spcPct val="0"/>
+              </a:spcAft>
+              <a:defRPr sz="4400">
+                <a:solidFill>
+                  <a:schemeClr val="tx1"/>
+                </a:solidFill>
+                <a:latin typeface="Calibri" pitchFamily="34" charset="0"/>
+              </a:defRPr>
+            </a:lvl5pPr>
+            <a:lvl6pPr marL="457200" algn="ctr" rtl="0" eaLnBrk="1" fontAlgn="base" hangingPunct="1">
+              <a:spcBef>
+                <a:spcPct val="0"/>
+              </a:spcBef>
+              <a:spcAft>
+                <a:spcPct val="0"/>
+              </a:spcAft>
+              <a:defRPr sz="4400">
+                <a:solidFill>
+                  <a:schemeClr val="tx1"/>
+                </a:solidFill>
+                <a:latin typeface="Calibri" pitchFamily="34" charset="0"/>
+              </a:defRPr>
+            </a:lvl6pPr>
+            <a:lvl7pPr marL="914400" algn="ctr" rtl="0" eaLnBrk="1" fontAlgn="base" hangingPunct="1">
+              <a:spcBef>
+                <a:spcPct val="0"/>
+              </a:spcBef>
+              <a:spcAft>
+                <a:spcPct val="0"/>
+              </a:spcAft>
+              <a:defRPr sz="4400">
+                <a:solidFill>
+                  <a:schemeClr val="tx1"/>
+                </a:solidFill>
+                <a:latin typeface="Calibri" pitchFamily="34" charset="0"/>
+              </a:defRPr>
+            </a:lvl7pPr>
+            <a:lvl8pPr marL="1371600" algn="ctr" rtl="0" eaLnBrk="1" fontAlgn="base" hangingPunct="1">
+              <a:spcBef>
+                <a:spcPct val="0"/>
+              </a:spcBef>
+              <a:spcAft>
+                <a:spcPct val="0"/>
+              </a:spcAft>
+              <a:defRPr sz="4400">
+                <a:solidFill>
+                  <a:schemeClr val="tx1"/>
+                </a:solidFill>
+                <a:latin typeface="Calibri" pitchFamily="34" charset="0"/>
+              </a:defRPr>
+            </a:lvl8pPr>
+            <a:lvl9pPr marL="1828800" algn="ctr" rtl="0" eaLnBrk="1" fontAlgn="base" hangingPunct="1">
+              <a:spcBef>
+                <a:spcPct val="0"/>
+              </a:spcBef>
+              <a:spcAft>
+                <a:spcPct val="0"/>
+              </a:spcAft>
+              <a:defRPr sz="4400">
+                <a:solidFill>
+                  <a:schemeClr val="tx1"/>
+                </a:solidFill>
+                <a:latin typeface="Calibri" pitchFamily="34" charset="0"/>
+              </a:defRPr>
+            </a:lvl9pPr>
+          </a:lstStyle>
+          <a:p>
+            <a:pPr marL="285750" indent="-285750" algn="l">
+              <a:buFont typeface="Wingdings" panose="05000000000000000000" pitchFamily="2" charset="2"/>
+              <a:buChar char="ü"/>
+            </a:pPr>
+            <a:r>
+              <a:rPr lang="en-US" altLang="en-US" sz="1200" dirty="0" smtClean="0"/>
+              <a:t>Project Overview</a:t>
+            </a:r>
           </a:p>
         </p:txBody>
       </p:sp>
@@ -4994,6 +5237,11 @@
         </p:txBody>
       </p:sp>
     </p:spTree>
+    <p:extLst>
+      <p:ext uri="{BB962C8B-B14F-4D97-AF65-F5344CB8AC3E}">
+        <p14:creationId xmlns:p14="http://schemas.microsoft.com/office/powerpoint/2010/main" val="2368799311"/>
+      </p:ext>
+    </p:extLst>
   </p:cSld>
   <p:clrMapOvr>
     <a:masterClrMapping/>
@@ -5027,6 +5275,3744 @@
       </p:grpSpPr>
       <p:sp>
         <p:nvSpPr>
+          <p:cNvPr id="2" name="Title 1"/>
+          <p:cNvSpPr>
+            <a:spLocks noGrp="1"/>
+          </p:cNvSpPr>
+          <p:nvPr>
+            <p:ph type="title"/>
+          </p:nvPr>
+        </p:nvSpPr>
+        <p:spPr>
+          <a:xfrm>
+            <a:off x="179512" y="177589"/>
+            <a:ext cx="2664296" cy="316504"/>
+          </a:xfrm>
+          <a:solidFill>
+            <a:schemeClr val="tx2">
+              <a:lumMod val="20000"/>
+              <a:lumOff val="80000"/>
+            </a:schemeClr>
+          </a:solidFill>
+        </p:spPr>
+        <p:txBody>
+          <a:bodyPr/>
+          <a:lstStyle/>
+          <a:p>
+            <a:pPr marL="171450" indent="-171450" algn="l">
+              <a:buFont typeface="Wingdings" panose="05000000000000000000" pitchFamily="2" charset="2"/>
+              <a:buChar char="ü"/>
+            </a:pPr>
+            <a:r>
+              <a:rPr lang="en-IN" sz="1200" b="1" dirty="0" smtClean="0">
+                <a:latin typeface="+mn-lt"/>
+              </a:rPr>
+              <a:t>Organise training Event</a:t>
+            </a:r>
+            <a:endParaRPr lang="en-IN" sz="1600" b="1" dirty="0">
+              <a:latin typeface="+mn-lt"/>
+            </a:endParaRPr>
+          </a:p>
+        </p:txBody>
+      </p:sp>
+      <p:pic>
+        <p:nvPicPr>
+          <p:cNvPr id="2050" name="Picture 2"/>
+          <p:cNvPicPr>
+            <a:picLocks noChangeAspect="1" noChangeArrowheads="1"/>
+          </p:cNvPicPr>
+          <p:nvPr/>
+        </p:nvPicPr>
+        <p:blipFill rotWithShape="1">
+          <a:blip r:embed="rId2" cstate="print">
+            <a:extLst>
+              <a:ext uri="{28A0092B-C50C-407E-A947-70E740481C1C}">
+                <a14:useLocalDpi xmlns:a14="http://schemas.microsoft.com/office/drawing/2010/main" val="0"/>
+              </a:ext>
+            </a:extLst>
+          </a:blip>
+          <a:srcRect l="13905" t="9640" r="2116" b="5717"/>
+          <a:stretch/>
+        </p:blipFill>
+        <p:spPr bwMode="auto">
+          <a:xfrm>
+            <a:off x="179512" y="555526"/>
+            <a:ext cx="3888432" cy="2115880"/>
+          </a:xfrm>
+          <a:prstGeom prst="rect">
+            <a:avLst/>
+          </a:prstGeom>
+          <a:noFill/>
+          <a:ln>
+            <a:noFill/>
+          </a:ln>
+          <a:extLst>
+            <a:ext uri="{909E8E84-426E-40DD-AFC4-6F175D3DCCD1}">
+              <a14:hiddenFill xmlns:a14="http://schemas.microsoft.com/office/drawing/2010/main">
+                <a:solidFill>
+                  <a:schemeClr val="accent1"/>
+                </a:solidFill>
+              </a14:hiddenFill>
+            </a:ext>
+            <a:ext uri="{91240B29-F687-4F45-9708-019B960494DF}">
+              <a14:hiddenLine xmlns:a14="http://schemas.microsoft.com/office/drawing/2010/main" w="9525">
+                <a:solidFill>
+                  <a:schemeClr val="tx1"/>
+                </a:solidFill>
+                <a:miter lim="800000"/>
+                <a:headEnd/>
+                <a:tailEnd/>
+              </a14:hiddenLine>
+            </a:ext>
+          </a:extLst>
+        </p:spPr>
+      </p:pic>
+      <p:sp>
+        <p:nvSpPr>
+          <p:cNvPr id="4" name="TextBox 3"/>
+          <p:cNvSpPr txBox="1"/>
+          <p:nvPr/>
+        </p:nvSpPr>
+        <p:spPr>
+          <a:xfrm>
+            <a:off x="4216398" y="198989"/>
+            <a:ext cx="2834706" cy="276999"/>
+          </a:xfrm>
+          <a:prstGeom prst="rect">
+            <a:avLst/>
+          </a:prstGeom>
+          <a:solidFill>
+            <a:schemeClr val="tx2">
+              <a:lumMod val="20000"/>
+              <a:lumOff val="80000"/>
+            </a:schemeClr>
+          </a:solidFill>
+        </p:spPr>
+        <p:txBody>
+          <a:bodyPr wrap="square" rtlCol="0">
+            <a:spAutoFit/>
+          </a:bodyPr>
+          <a:lstStyle/>
+          <a:p>
+            <a:pPr marL="285750" indent="-285750">
+              <a:buFont typeface="Wingdings" panose="05000000000000000000" pitchFamily="2" charset="2"/>
+              <a:buChar char="ü"/>
+            </a:pPr>
+            <a:r>
+              <a:rPr lang="en-IN" sz="1200" b="1" dirty="0">
+                <a:latin typeface="+mn-lt"/>
+                <a:ea typeface="+mj-ea"/>
+                <a:cs typeface="+mj-cs"/>
+              </a:rPr>
+              <a:t>Attendance </a:t>
+            </a:r>
+            <a:r>
+              <a:rPr lang="en-IN" sz="1200" b="1" dirty="0" smtClean="0">
+                <a:latin typeface="+mn-lt"/>
+                <a:ea typeface="+mj-ea"/>
+                <a:cs typeface="+mj-cs"/>
+              </a:rPr>
+              <a:t>Sheet </a:t>
+            </a:r>
+            <a:endParaRPr lang="en-IN" sz="1200" b="1" dirty="0">
+              <a:latin typeface="+mn-lt"/>
+              <a:ea typeface="+mj-ea"/>
+              <a:cs typeface="+mj-cs"/>
+            </a:endParaRPr>
+          </a:p>
+        </p:txBody>
+      </p:sp>
+      <p:pic>
+        <p:nvPicPr>
+          <p:cNvPr id="2052" name="Picture 4"/>
+          <p:cNvPicPr>
+            <a:picLocks noChangeAspect="1" noChangeArrowheads="1"/>
+          </p:cNvPicPr>
+          <p:nvPr/>
+        </p:nvPicPr>
+        <p:blipFill rotWithShape="1">
+          <a:blip r:embed="rId3">
+            <a:extLst>
+              <a:ext uri="{28A0092B-C50C-407E-A947-70E740481C1C}">
+                <a14:useLocalDpi xmlns:a14="http://schemas.microsoft.com/office/drawing/2010/main" val="0"/>
+              </a:ext>
+            </a:extLst>
+          </a:blip>
+          <a:srcRect t="21772" r="32630" b="20870"/>
+          <a:stretch/>
+        </p:blipFill>
+        <p:spPr bwMode="auto">
+          <a:xfrm>
+            <a:off x="4216398" y="549570"/>
+            <a:ext cx="3811986" cy="2091104"/>
+          </a:xfrm>
+          <a:prstGeom prst="rect">
+            <a:avLst/>
+          </a:prstGeom>
+          <a:noFill/>
+          <a:ln>
+            <a:noFill/>
+          </a:ln>
+          <a:extLst>
+            <a:ext uri="{909E8E84-426E-40DD-AFC4-6F175D3DCCD1}">
+              <a14:hiddenFill xmlns:a14="http://schemas.microsoft.com/office/drawing/2010/main">
+                <a:solidFill>
+                  <a:schemeClr val="accent1"/>
+                </a:solidFill>
+              </a14:hiddenFill>
+            </a:ext>
+            <a:ext uri="{91240B29-F687-4F45-9708-019B960494DF}">
+              <a14:hiddenLine xmlns:a14="http://schemas.microsoft.com/office/drawing/2010/main" w="9525">
+                <a:solidFill>
+                  <a:schemeClr val="tx1"/>
+                </a:solidFill>
+                <a:miter lim="800000"/>
+                <a:headEnd/>
+                <a:tailEnd/>
+              </a14:hiddenLine>
+            </a:ext>
+          </a:extLst>
+        </p:spPr>
+      </p:pic>
+      <p:graphicFrame>
+        <p:nvGraphicFramePr>
+          <p:cNvPr id="5" name="Table 4"/>
+          <p:cNvGraphicFramePr>
+            <a:graphicFrameLocks noGrp="1"/>
+          </p:cNvGraphicFramePr>
+          <p:nvPr>
+            <p:extLst>
+              <p:ext uri="{D42A27DB-BD31-4B8C-83A1-F6EECF244321}">
+                <p14:modId xmlns:p14="http://schemas.microsoft.com/office/powerpoint/2010/main" val="681460870"/>
+              </p:ext>
+            </p:extLst>
+          </p:nvPr>
+        </p:nvGraphicFramePr>
+        <p:xfrm>
+          <a:off x="179505" y="2948405"/>
+          <a:ext cx="8712974" cy="1896276"/>
+        </p:xfrm>
+        <a:graphic>
+          <a:graphicData uri="http://schemas.openxmlformats.org/drawingml/2006/table">
+            <a:tbl>
+              <a:tblPr/>
+              <a:tblGrid>
+                <a:gridCol w="629247"/>
+                <a:gridCol w="629247"/>
+                <a:gridCol w="910310"/>
+                <a:gridCol w="432084"/>
+                <a:gridCol w="239114"/>
+                <a:gridCol w="629247"/>
+                <a:gridCol w="289454"/>
+                <a:gridCol w="289454"/>
+                <a:gridCol w="289454"/>
+                <a:gridCol w="289454"/>
+                <a:gridCol w="289454"/>
+                <a:gridCol w="289454"/>
+                <a:gridCol w="289454"/>
+                <a:gridCol w="285258"/>
+                <a:gridCol w="423691"/>
+                <a:gridCol w="629247"/>
+                <a:gridCol w="629247"/>
+                <a:gridCol w="629247"/>
+                <a:gridCol w="331403"/>
+                <a:gridCol w="289454"/>
+              </a:tblGrid>
+              <a:tr h="756106">
+                <a:tc>
+                  <a:txBody>
+                    <a:bodyPr/>
+                    <a:lstStyle/>
+                    <a:p>
+                      <a:pPr rtl="0" fontAlgn="b"/>
+                      <a:r>
+                        <a:rPr lang="en-IN" sz="700" b="1" dirty="0">
+                          <a:effectLst/>
+                        </a:rPr>
+                        <a:t>Timestamp</a:t>
+                      </a:r>
+                    </a:p>
+                  </a:txBody>
+                  <a:tcPr marL="11887" marR="11887" marT="7925" marB="7925" anchor="b">
+                    <a:lnL w="9525" cap="flat" cmpd="sng" algn="ctr">
+                      <a:solidFill>
+                        <a:srgbClr val="CCCCCC"/>
+                      </a:solidFill>
+                      <a:prstDash val="solid"/>
+                      <a:round/>
+                      <a:headEnd type="none" w="med" len="med"/>
+                      <a:tailEnd type="none" w="med" len="med"/>
+                    </a:lnL>
+                    <a:lnR w="9525" cap="flat" cmpd="sng" algn="ctr">
+                      <a:solidFill>
+                        <a:srgbClr val="CCCCCC"/>
+                      </a:solidFill>
+                      <a:prstDash val="solid"/>
+                      <a:round/>
+                      <a:headEnd type="none" w="med" len="med"/>
+                      <a:tailEnd type="none" w="med" len="med"/>
+                    </a:lnR>
+                    <a:lnT w="9525" cap="flat" cmpd="sng" algn="ctr">
+                      <a:solidFill>
+                        <a:srgbClr val="CCCCCC"/>
+                      </a:solidFill>
+                      <a:prstDash val="solid"/>
+                      <a:round/>
+                      <a:headEnd type="none" w="med" len="med"/>
+                      <a:tailEnd type="none" w="med" len="med"/>
+                    </a:lnT>
+                    <a:lnB w="9525" cap="flat" cmpd="sng" algn="ctr">
+                      <a:solidFill>
+                        <a:srgbClr val="CCCCCC"/>
+                      </a:solidFill>
+                      <a:prstDash val="solid"/>
+                      <a:round/>
+                      <a:headEnd type="none" w="med" len="med"/>
+                      <a:tailEnd type="none" w="med" len="med"/>
+                    </a:lnB>
+                    <a:solidFill>
+                      <a:srgbClr val="BDBDBD"/>
+                    </a:solidFill>
+                  </a:tcPr>
+                </a:tc>
+                <a:tc>
+                  <a:txBody>
+                    <a:bodyPr/>
+                    <a:lstStyle/>
+                    <a:p>
+                      <a:pPr rtl="0" fontAlgn="b"/>
+                      <a:r>
+                        <a:rPr lang="en-IN" sz="700" b="1" dirty="0">
+                          <a:effectLst/>
+                        </a:rPr>
+                        <a:t>Email Address</a:t>
+                      </a:r>
+                    </a:p>
+                  </a:txBody>
+                  <a:tcPr marL="11887" marR="11887" marT="7925" marB="7925" anchor="b">
+                    <a:lnL w="9525" cap="flat" cmpd="sng" algn="ctr">
+                      <a:solidFill>
+                        <a:srgbClr val="CCCCCC"/>
+                      </a:solidFill>
+                      <a:prstDash val="solid"/>
+                      <a:round/>
+                      <a:headEnd type="none" w="med" len="med"/>
+                      <a:tailEnd type="none" w="med" len="med"/>
+                    </a:lnL>
+                    <a:lnR w="9525" cap="flat" cmpd="sng" algn="ctr">
+                      <a:solidFill>
+                        <a:srgbClr val="CCCCCC"/>
+                      </a:solidFill>
+                      <a:prstDash val="solid"/>
+                      <a:round/>
+                      <a:headEnd type="none" w="med" len="med"/>
+                      <a:tailEnd type="none" w="med" len="med"/>
+                    </a:lnR>
+                    <a:lnT w="9525" cap="flat" cmpd="sng" algn="ctr">
+                      <a:solidFill>
+                        <a:srgbClr val="CCCCCC"/>
+                      </a:solidFill>
+                      <a:prstDash val="solid"/>
+                      <a:round/>
+                      <a:headEnd type="none" w="med" len="med"/>
+                      <a:tailEnd type="none" w="med" len="med"/>
+                    </a:lnT>
+                    <a:lnB w="9525" cap="flat" cmpd="sng" algn="ctr">
+                      <a:solidFill>
+                        <a:srgbClr val="CCCCCC"/>
+                      </a:solidFill>
+                      <a:prstDash val="solid"/>
+                      <a:round/>
+                      <a:headEnd type="none" w="med" len="med"/>
+                      <a:tailEnd type="none" w="med" len="med"/>
+                    </a:lnB>
+                    <a:solidFill>
+                      <a:srgbClr val="BDBDBD"/>
+                    </a:solidFill>
+                  </a:tcPr>
+                </a:tc>
+                <a:tc>
+                  <a:txBody>
+                    <a:bodyPr/>
+                    <a:lstStyle/>
+                    <a:p>
+                      <a:pPr rtl="0" fontAlgn="b"/>
+                      <a:r>
+                        <a:rPr lang="en-IN" sz="700" b="1" dirty="0">
+                          <a:effectLst/>
+                        </a:rPr>
+                        <a:t>Training Name</a:t>
+                      </a:r>
+                    </a:p>
+                  </a:txBody>
+                  <a:tcPr marL="11887" marR="11887" marT="7925" marB="7925" anchor="b">
+                    <a:lnL w="9525" cap="flat" cmpd="sng" algn="ctr">
+                      <a:solidFill>
+                        <a:srgbClr val="CCCCCC"/>
+                      </a:solidFill>
+                      <a:prstDash val="solid"/>
+                      <a:round/>
+                      <a:headEnd type="none" w="med" len="med"/>
+                      <a:tailEnd type="none" w="med" len="med"/>
+                    </a:lnL>
+                    <a:lnR w="9525" cap="flat" cmpd="sng" algn="ctr">
+                      <a:solidFill>
+                        <a:srgbClr val="CCCCCC"/>
+                      </a:solidFill>
+                      <a:prstDash val="solid"/>
+                      <a:round/>
+                      <a:headEnd type="none" w="med" len="med"/>
+                      <a:tailEnd type="none" w="med" len="med"/>
+                    </a:lnR>
+                    <a:lnT w="9525" cap="flat" cmpd="sng" algn="ctr">
+                      <a:solidFill>
+                        <a:srgbClr val="CCCCCC"/>
+                      </a:solidFill>
+                      <a:prstDash val="solid"/>
+                      <a:round/>
+                      <a:headEnd type="none" w="med" len="med"/>
+                      <a:tailEnd type="none" w="med" len="med"/>
+                    </a:lnT>
+                    <a:lnB w="9525" cap="flat" cmpd="sng" algn="ctr">
+                      <a:solidFill>
+                        <a:srgbClr val="CCCCCC"/>
+                      </a:solidFill>
+                      <a:prstDash val="solid"/>
+                      <a:round/>
+                      <a:headEnd type="none" w="med" len="med"/>
+                      <a:tailEnd type="none" w="med" len="med"/>
+                    </a:lnB>
+                    <a:solidFill>
+                      <a:srgbClr val="BDBDBD"/>
+                    </a:solidFill>
+                  </a:tcPr>
+                </a:tc>
+                <a:tc>
+                  <a:txBody>
+                    <a:bodyPr/>
+                    <a:lstStyle/>
+                    <a:p>
+                      <a:pPr rtl="0" fontAlgn="b"/>
+                      <a:r>
+                        <a:rPr lang="en-IN" sz="700" b="1" dirty="0">
+                          <a:effectLst/>
+                        </a:rPr>
+                        <a:t>Employee Name</a:t>
+                      </a:r>
+                    </a:p>
+                  </a:txBody>
+                  <a:tcPr marL="11887" marR="11887" marT="7925" marB="7925" anchor="b">
+                    <a:lnL w="9525" cap="flat" cmpd="sng" algn="ctr">
+                      <a:solidFill>
+                        <a:srgbClr val="CCCCCC"/>
+                      </a:solidFill>
+                      <a:prstDash val="solid"/>
+                      <a:round/>
+                      <a:headEnd type="none" w="med" len="med"/>
+                      <a:tailEnd type="none" w="med" len="med"/>
+                    </a:lnL>
+                    <a:lnR w="9525" cap="flat" cmpd="sng" algn="ctr">
+                      <a:solidFill>
+                        <a:srgbClr val="CCCCCC"/>
+                      </a:solidFill>
+                      <a:prstDash val="solid"/>
+                      <a:round/>
+                      <a:headEnd type="none" w="med" len="med"/>
+                      <a:tailEnd type="none" w="med" len="med"/>
+                    </a:lnR>
+                    <a:lnT w="9525" cap="flat" cmpd="sng" algn="ctr">
+                      <a:solidFill>
+                        <a:srgbClr val="CCCCCC"/>
+                      </a:solidFill>
+                      <a:prstDash val="solid"/>
+                      <a:round/>
+                      <a:headEnd type="none" w="med" len="med"/>
+                      <a:tailEnd type="none" w="med" len="med"/>
+                    </a:lnT>
+                    <a:lnB w="9525" cap="flat" cmpd="sng" algn="ctr">
+                      <a:solidFill>
+                        <a:srgbClr val="CCCCCC"/>
+                      </a:solidFill>
+                      <a:prstDash val="solid"/>
+                      <a:round/>
+                      <a:headEnd type="none" w="med" len="med"/>
+                      <a:tailEnd type="none" w="med" len="med"/>
+                    </a:lnB>
+                    <a:solidFill>
+                      <a:srgbClr val="BDBDBD"/>
+                    </a:solidFill>
+                  </a:tcPr>
+                </a:tc>
+                <a:tc>
+                  <a:txBody>
+                    <a:bodyPr/>
+                    <a:lstStyle/>
+                    <a:p>
+                      <a:pPr rtl="0" fontAlgn="b"/>
+                      <a:r>
+                        <a:rPr lang="en-IN" sz="700" b="1" dirty="0">
+                          <a:effectLst/>
+                        </a:rPr>
+                        <a:t>Employee Code</a:t>
+                      </a:r>
+                    </a:p>
+                  </a:txBody>
+                  <a:tcPr marL="11887" marR="11887" marT="7925" marB="7925" anchor="b">
+                    <a:lnL w="9525" cap="flat" cmpd="sng" algn="ctr">
+                      <a:solidFill>
+                        <a:srgbClr val="CCCCCC"/>
+                      </a:solidFill>
+                      <a:prstDash val="solid"/>
+                      <a:round/>
+                      <a:headEnd type="none" w="med" len="med"/>
+                      <a:tailEnd type="none" w="med" len="med"/>
+                    </a:lnL>
+                    <a:lnR w="9525" cap="flat" cmpd="sng" algn="ctr">
+                      <a:solidFill>
+                        <a:srgbClr val="CCCCCC"/>
+                      </a:solidFill>
+                      <a:prstDash val="solid"/>
+                      <a:round/>
+                      <a:headEnd type="none" w="med" len="med"/>
+                      <a:tailEnd type="none" w="med" len="med"/>
+                    </a:lnR>
+                    <a:lnT w="9525" cap="flat" cmpd="sng" algn="ctr">
+                      <a:solidFill>
+                        <a:srgbClr val="CCCCCC"/>
+                      </a:solidFill>
+                      <a:prstDash val="solid"/>
+                      <a:round/>
+                      <a:headEnd type="none" w="med" len="med"/>
+                      <a:tailEnd type="none" w="med" len="med"/>
+                    </a:lnT>
+                    <a:lnB w="9525" cap="flat" cmpd="sng" algn="ctr">
+                      <a:solidFill>
+                        <a:srgbClr val="CCCCCC"/>
+                      </a:solidFill>
+                      <a:prstDash val="solid"/>
+                      <a:round/>
+                      <a:headEnd type="none" w="med" len="med"/>
+                      <a:tailEnd type="none" w="med" len="med"/>
+                    </a:lnB>
+                    <a:solidFill>
+                      <a:srgbClr val="BDBDBD"/>
+                    </a:solidFill>
+                  </a:tcPr>
+                </a:tc>
+                <a:tc>
+                  <a:txBody>
+                    <a:bodyPr/>
+                    <a:lstStyle/>
+                    <a:p>
+                      <a:pPr rtl="0" fontAlgn="b"/>
+                      <a:r>
+                        <a:rPr lang="en-IN" sz="700" b="1" dirty="0">
+                          <a:effectLst/>
+                        </a:rPr>
+                        <a:t>Designation </a:t>
+                      </a:r>
+                    </a:p>
+                  </a:txBody>
+                  <a:tcPr marL="11887" marR="11887" marT="7925" marB="7925" anchor="b">
+                    <a:lnL w="9525" cap="flat" cmpd="sng" algn="ctr">
+                      <a:solidFill>
+                        <a:srgbClr val="CCCCCC"/>
+                      </a:solidFill>
+                      <a:prstDash val="solid"/>
+                      <a:round/>
+                      <a:headEnd type="none" w="med" len="med"/>
+                      <a:tailEnd type="none" w="med" len="med"/>
+                    </a:lnL>
+                    <a:lnR w="9525" cap="flat" cmpd="sng" algn="ctr">
+                      <a:solidFill>
+                        <a:srgbClr val="CCCCCC"/>
+                      </a:solidFill>
+                      <a:prstDash val="solid"/>
+                      <a:round/>
+                      <a:headEnd type="none" w="med" len="med"/>
+                      <a:tailEnd type="none" w="med" len="med"/>
+                    </a:lnR>
+                    <a:lnT w="9525" cap="flat" cmpd="sng" algn="ctr">
+                      <a:solidFill>
+                        <a:srgbClr val="CCCCCC"/>
+                      </a:solidFill>
+                      <a:prstDash val="solid"/>
+                      <a:round/>
+                      <a:headEnd type="none" w="med" len="med"/>
+                      <a:tailEnd type="none" w="med" len="med"/>
+                    </a:lnT>
+                    <a:lnB w="9525" cap="flat" cmpd="sng" algn="ctr">
+                      <a:solidFill>
+                        <a:srgbClr val="CCCCCC"/>
+                      </a:solidFill>
+                      <a:prstDash val="solid"/>
+                      <a:round/>
+                      <a:headEnd type="none" w="med" len="med"/>
+                      <a:tailEnd type="none" w="med" len="med"/>
+                    </a:lnB>
+                    <a:solidFill>
+                      <a:srgbClr val="BDBDBD"/>
+                    </a:solidFill>
+                  </a:tcPr>
+                </a:tc>
+                <a:tc>
+                  <a:txBody>
+                    <a:bodyPr/>
+                    <a:lstStyle/>
+                    <a:p>
+                      <a:pPr rtl="0" fontAlgn="b"/>
+                      <a:r>
+                        <a:rPr lang="en-IN" sz="700" b="1" dirty="0">
+                          <a:effectLst/>
+                        </a:rPr>
+                        <a:t>Training </a:t>
+                      </a:r>
+                      <a:r>
+                        <a:rPr lang="en-IN" sz="700" b="1" dirty="0" err="1">
+                          <a:effectLst/>
+                        </a:rPr>
+                        <a:t>Manhours</a:t>
+                      </a:r>
+                      <a:r>
+                        <a:rPr lang="en-IN" sz="700" b="1" dirty="0">
+                          <a:effectLst/>
+                        </a:rPr>
+                        <a:t> </a:t>
+                      </a:r>
+                    </a:p>
+                  </a:txBody>
+                  <a:tcPr marL="11887" marR="11887" marT="7925" marB="7925" anchor="b">
+                    <a:lnL w="9525" cap="flat" cmpd="sng" algn="ctr">
+                      <a:solidFill>
+                        <a:srgbClr val="CCCCCC"/>
+                      </a:solidFill>
+                      <a:prstDash val="solid"/>
+                      <a:round/>
+                      <a:headEnd type="none" w="med" len="med"/>
+                      <a:tailEnd type="none" w="med" len="med"/>
+                    </a:lnL>
+                    <a:lnR w="9525" cap="flat" cmpd="sng" algn="ctr">
+                      <a:solidFill>
+                        <a:srgbClr val="CCCCCC"/>
+                      </a:solidFill>
+                      <a:prstDash val="solid"/>
+                      <a:round/>
+                      <a:headEnd type="none" w="med" len="med"/>
+                      <a:tailEnd type="none" w="med" len="med"/>
+                    </a:lnR>
+                    <a:lnT w="9525" cap="flat" cmpd="sng" algn="ctr">
+                      <a:solidFill>
+                        <a:srgbClr val="CCCCCC"/>
+                      </a:solidFill>
+                      <a:prstDash val="solid"/>
+                      <a:round/>
+                      <a:headEnd type="none" w="med" len="med"/>
+                      <a:tailEnd type="none" w="med" len="med"/>
+                    </a:lnT>
+                    <a:lnB w="9525" cap="flat" cmpd="sng" algn="ctr">
+                      <a:solidFill>
+                        <a:srgbClr val="CCCCCC"/>
+                      </a:solidFill>
+                      <a:prstDash val="solid"/>
+                      <a:round/>
+                      <a:headEnd type="none" w="med" len="med"/>
+                      <a:tailEnd type="none" w="med" len="med"/>
+                    </a:lnB>
+                    <a:solidFill>
+                      <a:srgbClr val="BDBDBD"/>
+                    </a:solidFill>
+                  </a:tcPr>
+                </a:tc>
+                <a:tc>
+                  <a:txBody>
+                    <a:bodyPr/>
+                    <a:lstStyle/>
+                    <a:p>
+                      <a:pPr rtl="0" fontAlgn="b"/>
+                      <a:r>
+                        <a:rPr lang="en-IN" sz="700" b="1" dirty="0">
+                          <a:effectLst/>
+                        </a:rPr>
+                        <a:t>Contents</a:t>
+                      </a:r>
+                    </a:p>
+                  </a:txBody>
+                  <a:tcPr marL="11887" marR="11887" marT="7925" marB="7925" anchor="b">
+                    <a:lnL w="9525" cap="flat" cmpd="sng" algn="ctr">
+                      <a:solidFill>
+                        <a:srgbClr val="CCCCCC"/>
+                      </a:solidFill>
+                      <a:prstDash val="solid"/>
+                      <a:round/>
+                      <a:headEnd type="none" w="med" len="med"/>
+                      <a:tailEnd type="none" w="med" len="med"/>
+                    </a:lnL>
+                    <a:lnR w="9525" cap="flat" cmpd="sng" algn="ctr">
+                      <a:solidFill>
+                        <a:srgbClr val="CCCCCC"/>
+                      </a:solidFill>
+                      <a:prstDash val="solid"/>
+                      <a:round/>
+                      <a:headEnd type="none" w="med" len="med"/>
+                      <a:tailEnd type="none" w="med" len="med"/>
+                    </a:lnR>
+                    <a:lnT w="9525" cap="flat" cmpd="sng" algn="ctr">
+                      <a:solidFill>
+                        <a:srgbClr val="CCCCCC"/>
+                      </a:solidFill>
+                      <a:prstDash val="solid"/>
+                      <a:round/>
+                      <a:headEnd type="none" w="med" len="med"/>
+                      <a:tailEnd type="none" w="med" len="med"/>
+                    </a:lnT>
+                    <a:lnB w="9525" cap="flat" cmpd="sng" algn="ctr">
+                      <a:solidFill>
+                        <a:srgbClr val="CCCCCC"/>
+                      </a:solidFill>
+                      <a:prstDash val="solid"/>
+                      <a:round/>
+                      <a:headEnd type="none" w="med" len="med"/>
+                      <a:tailEnd type="none" w="med" len="med"/>
+                    </a:lnB>
+                    <a:solidFill>
+                      <a:srgbClr val="BDBDBD"/>
+                    </a:solidFill>
+                  </a:tcPr>
+                </a:tc>
+                <a:tc>
+                  <a:txBody>
+                    <a:bodyPr/>
+                    <a:lstStyle/>
+                    <a:p>
+                      <a:pPr rtl="0" fontAlgn="b"/>
+                      <a:r>
+                        <a:rPr lang="en-IN" sz="700" b="1" dirty="0">
+                          <a:effectLst/>
+                        </a:rPr>
+                        <a:t>Could the facilitator generate interaction </a:t>
+                      </a:r>
+                    </a:p>
+                  </a:txBody>
+                  <a:tcPr marL="11887" marR="11887" marT="7925" marB="7925" anchor="b">
+                    <a:lnL w="9525" cap="flat" cmpd="sng" algn="ctr">
+                      <a:solidFill>
+                        <a:srgbClr val="CCCCCC"/>
+                      </a:solidFill>
+                      <a:prstDash val="solid"/>
+                      <a:round/>
+                      <a:headEnd type="none" w="med" len="med"/>
+                      <a:tailEnd type="none" w="med" len="med"/>
+                    </a:lnL>
+                    <a:lnR w="9525" cap="flat" cmpd="sng" algn="ctr">
+                      <a:solidFill>
+                        <a:srgbClr val="CCCCCC"/>
+                      </a:solidFill>
+                      <a:prstDash val="solid"/>
+                      <a:round/>
+                      <a:headEnd type="none" w="med" len="med"/>
+                      <a:tailEnd type="none" w="med" len="med"/>
+                    </a:lnR>
+                    <a:lnT w="9525" cap="flat" cmpd="sng" algn="ctr">
+                      <a:solidFill>
+                        <a:srgbClr val="CCCCCC"/>
+                      </a:solidFill>
+                      <a:prstDash val="solid"/>
+                      <a:round/>
+                      <a:headEnd type="none" w="med" len="med"/>
+                      <a:tailEnd type="none" w="med" len="med"/>
+                    </a:lnT>
+                    <a:lnB w="9525" cap="flat" cmpd="sng" algn="ctr">
+                      <a:solidFill>
+                        <a:srgbClr val="CCCCCC"/>
+                      </a:solidFill>
+                      <a:prstDash val="solid"/>
+                      <a:round/>
+                      <a:headEnd type="none" w="med" len="med"/>
+                      <a:tailEnd type="none" w="med" len="med"/>
+                    </a:lnB>
+                    <a:solidFill>
+                      <a:srgbClr val="BDBDBD"/>
+                    </a:solidFill>
+                  </a:tcPr>
+                </a:tc>
+                <a:tc>
+                  <a:txBody>
+                    <a:bodyPr/>
+                    <a:lstStyle/>
+                    <a:p>
+                      <a:pPr rtl="0" fontAlgn="b"/>
+                      <a:r>
+                        <a:rPr lang="en-IN" sz="700" b="1" dirty="0">
+                          <a:effectLst/>
+                        </a:rPr>
+                        <a:t>Facilitators Knowledge on the subject</a:t>
+                      </a:r>
+                    </a:p>
+                  </a:txBody>
+                  <a:tcPr marL="11887" marR="11887" marT="7925" marB="7925" anchor="b">
+                    <a:lnL w="9525" cap="flat" cmpd="sng" algn="ctr">
+                      <a:solidFill>
+                        <a:srgbClr val="CCCCCC"/>
+                      </a:solidFill>
+                      <a:prstDash val="solid"/>
+                      <a:round/>
+                      <a:headEnd type="none" w="med" len="med"/>
+                      <a:tailEnd type="none" w="med" len="med"/>
+                    </a:lnL>
+                    <a:lnR w="9525" cap="flat" cmpd="sng" algn="ctr">
+                      <a:solidFill>
+                        <a:srgbClr val="CCCCCC"/>
+                      </a:solidFill>
+                      <a:prstDash val="solid"/>
+                      <a:round/>
+                      <a:headEnd type="none" w="med" len="med"/>
+                      <a:tailEnd type="none" w="med" len="med"/>
+                    </a:lnR>
+                    <a:lnT w="9525" cap="flat" cmpd="sng" algn="ctr">
+                      <a:solidFill>
+                        <a:srgbClr val="CCCCCC"/>
+                      </a:solidFill>
+                      <a:prstDash val="solid"/>
+                      <a:round/>
+                      <a:headEnd type="none" w="med" len="med"/>
+                      <a:tailEnd type="none" w="med" len="med"/>
+                    </a:lnT>
+                    <a:lnB w="9525" cap="flat" cmpd="sng" algn="ctr">
+                      <a:solidFill>
+                        <a:srgbClr val="CCCCCC"/>
+                      </a:solidFill>
+                      <a:prstDash val="solid"/>
+                      <a:round/>
+                      <a:headEnd type="none" w="med" len="med"/>
+                      <a:tailEnd type="none" w="med" len="med"/>
+                    </a:lnB>
+                    <a:solidFill>
+                      <a:srgbClr val="BDBDBD"/>
+                    </a:solidFill>
+                  </a:tcPr>
+                </a:tc>
+                <a:tc>
+                  <a:txBody>
+                    <a:bodyPr/>
+                    <a:lstStyle/>
+                    <a:p>
+                      <a:pPr rtl="0" fontAlgn="b"/>
+                      <a:r>
+                        <a:rPr lang="en-IN" sz="700" b="1" dirty="0">
+                          <a:effectLst/>
+                        </a:rPr>
+                        <a:t>Quality of course material</a:t>
+                      </a:r>
+                    </a:p>
+                  </a:txBody>
+                  <a:tcPr marL="11887" marR="11887" marT="7925" marB="7925" anchor="b">
+                    <a:lnL w="9525" cap="flat" cmpd="sng" algn="ctr">
+                      <a:solidFill>
+                        <a:srgbClr val="CCCCCC"/>
+                      </a:solidFill>
+                      <a:prstDash val="solid"/>
+                      <a:round/>
+                      <a:headEnd type="none" w="med" len="med"/>
+                      <a:tailEnd type="none" w="med" len="med"/>
+                    </a:lnL>
+                    <a:lnR w="9525" cap="flat" cmpd="sng" algn="ctr">
+                      <a:solidFill>
+                        <a:srgbClr val="CCCCCC"/>
+                      </a:solidFill>
+                      <a:prstDash val="solid"/>
+                      <a:round/>
+                      <a:headEnd type="none" w="med" len="med"/>
+                      <a:tailEnd type="none" w="med" len="med"/>
+                    </a:lnR>
+                    <a:lnT w="9525" cap="flat" cmpd="sng" algn="ctr">
+                      <a:solidFill>
+                        <a:srgbClr val="CCCCCC"/>
+                      </a:solidFill>
+                      <a:prstDash val="solid"/>
+                      <a:round/>
+                      <a:headEnd type="none" w="med" len="med"/>
+                      <a:tailEnd type="none" w="med" len="med"/>
+                    </a:lnT>
+                    <a:lnB w="9525" cap="flat" cmpd="sng" algn="ctr">
+                      <a:solidFill>
+                        <a:srgbClr val="CCCCCC"/>
+                      </a:solidFill>
+                      <a:prstDash val="solid"/>
+                      <a:round/>
+                      <a:headEnd type="none" w="med" len="med"/>
+                      <a:tailEnd type="none" w="med" len="med"/>
+                    </a:lnB>
+                    <a:solidFill>
+                      <a:srgbClr val="BDBDBD"/>
+                    </a:solidFill>
+                  </a:tcPr>
+                </a:tc>
+                <a:tc>
+                  <a:txBody>
+                    <a:bodyPr/>
+                    <a:lstStyle/>
+                    <a:p>
+                      <a:pPr rtl="0" fontAlgn="b"/>
+                      <a:r>
+                        <a:rPr lang="en-IN" sz="700" b="1" dirty="0">
+                          <a:effectLst/>
+                        </a:rPr>
+                        <a:t>The Content relevance </a:t>
+                      </a:r>
+                    </a:p>
+                  </a:txBody>
+                  <a:tcPr marL="11887" marR="11887" marT="7925" marB="7925" anchor="b">
+                    <a:lnL w="9525" cap="flat" cmpd="sng" algn="ctr">
+                      <a:solidFill>
+                        <a:srgbClr val="CCCCCC"/>
+                      </a:solidFill>
+                      <a:prstDash val="solid"/>
+                      <a:round/>
+                      <a:headEnd type="none" w="med" len="med"/>
+                      <a:tailEnd type="none" w="med" len="med"/>
+                    </a:lnL>
+                    <a:lnR w="9525" cap="flat" cmpd="sng" algn="ctr">
+                      <a:solidFill>
+                        <a:srgbClr val="CCCCCC"/>
+                      </a:solidFill>
+                      <a:prstDash val="solid"/>
+                      <a:round/>
+                      <a:headEnd type="none" w="med" len="med"/>
+                      <a:tailEnd type="none" w="med" len="med"/>
+                    </a:lnR>
+                    <a:lnT w="9525" cap="flat" cmpd="sng" algn="ctr">
+                      <a:solidFill>
+                        <a:srgbClr val="CCCCCC"/>
+                      </a:solidFill>
+                      <a:prstDash val="solid"/>
+                      <a:round/>
+                      <a:headEnd type="none" w="med" len="med"/>
+                      <a:tailEnd type="none" w="med" len="med"/>
+                    </a:lnT>
+                    <a:lnB w="9525" cap="flat" cmpd="sng" algn="ctr">
+                      <a:solidFill>
+                        <a:srgbClr val="CCCCCC"/>
+                      </a:solidFill>
+                      <a:prstDash val="solid"/>
+                      <a:round/>
+                      <a:headEnd type="none" w="med" len="med"/>
+                      <a:tailEnd type="none" w="med" len="med"/>
+                    </a:lnB>
+                    <a:solidFill>
+                      <a:srgbClr val="BDBDBD"/>
+                    </a:solidFill>
+                  </a:tcPr>
+                </a:tc>
+                <a:tc>
+                  <a:txBody>
+                    <a:bodyPr/>
+                    <a:lstStyle/>
+                    <a:p>
+                      <a:pPr rtl="0" fontAlgn="b"/>
+                      <a:r>
+                        <a:rPr lang="en-IN" sz="700" b="1" dirty="0">
+                          <a:effectLst/>
+                        </a:rPr>
+                        <a:t>Quality of presentation</a:t>
+                      </a:r>
+                    </a:p>
+                  </a:txBody>
+                  <a:tcPr marL="11887" marR="11887" marT="7925" marB="7925" anchor="b">
+                    <a:lnL w="9525" cap="flat" cmpd="sng" algn="ctr">
+                      <a:solidFill>
+                        <a:srgbClr val="CCCCCC"/>
+                      </a:solidFill>
+                      <a:prstDash val="solid"/>
+                      <a:round/>
+                      <a:headEnd type="none" w="med" len="med"/>
+                      <a:tailEnd type="none" w="med" len="med"/>
+                    </a:lnL>
+                    <a:lnR w="9525" cap="flat" cmpd="sng" algn="ctr">
+                      <a:solidFill>
+                        <a:srgbClr val="CCCCCC"/>
+                      </a:solidFill>
+                      <a:prstDash val="solid"/>
+                      <a:round/>
+                      <a:headEnd type="none" w="med" len="med"/>
+                      <a:tailEnd type="none" w="med" len="med"/>
+                    </a:lnR>
+                    <a:lnT w="9525" cap="flat" cmpd="sng" algn="ctr">
+                      <a:solidFill>
+                        <a:srgbClr val="CCCCCC"/>
+                      </a:solidFill>
+                      <a:prstDash val="solid"/>
+                      <a:round/>
+                      <a:headEnd type="none" w="med" len="med"/>
+                      <a:tailEnd type="none" w="med" len="med"/>
+                    </a:lnT>
+                    <a:lnB w="9525" cap="flat" cmpd="sng" algn="ctr">
+                      <a:solidFill>
+                        <a:srgbClr val="CCCCCC"/>
+                      </a:solidFill>
+                      <a:prstDash val="solid"/>
+                      <a:round/>
+                      <a:headEnd type="none" w="med" len="med"/>
+                      <a:tailEnd type="none" w="med" len="med"/>
+                    </a:lnB>
+                    <a:solidFill>
+                      <a:srgbClr val="BDBDBD"/>
+                    </a:solidFill>
+                  </a:tcPr>
+                </a:tc>
+                <a:tc>
+                  <a:txBody>
+                    <a:bodyPr/>
+                    <a:lstStyle/>
+                    <a:p>
+                      <a:pPr algn="ctr" rtl="0" fontAlgn="b"/>
+                      <a:r>
+                        <a:rPr lang="en-IN" sz="700" b="1" dirty="0">
+                          <a:effectLst/>
+                        </a:rPr>
+                        <a:t>Average (Individual)</a:t>
+                      </a:r>
+                    </a:p>
+                  </a:txBody>
+                  <a:tcPr marL="11887" marR="11887" marT="7925" marB="7925" anchor="b">
+                    <a:lnL w="9525" cap="flat" cmpd="sng" algn="ctr">
+                      <a:solidFill>
+                        <a:srgbClr val="CCCCCC"/>
+                      </a:solidFill>
+                      <a:prstDash val="solid"/>
+                      <a:round/>
+                      <a:headEnd type="none" w="med" len="med"/>
+                      <a:tailEnd type="none" w="med" len="med"/>
+                    </a:lnL>
+                    <a:lnR w="9525" cap="flat" cmpd="sng" algn="ctr">
+                      <a:solidFill>
+                        <a:srgbClr val="CCCCCC"/>
+                      </a:solidFill>
+                      <a:prstDash val="solid"/>
+                      <a:round/>
+                      <a:headEnd type="none" w="med" len="med"/>
+                      <a:tailEnd type="none" w="med" len="med"/>
+                    </a:lnR>
+                    <a:lnT w="9525" cap="flat" cmpd="sng" algn="ctr">
+                      <a:solidFill>
+                        <a:srgbClr val="CCCCCC"/>
+                      </a:solidFill>
+                      <a:prstDash val="solid"/>
+                      <a:round/>
+                      <a:headEnd type="none" w="med" len="med"/>
+                      <a:tailEnd type="none" w="med" len="med"/>
+                    </a:lnT>
+                    <a:lnB w="9525" cap="flat" cmpd="sng" algn="ctr">
+                      <a:solidFill>
+                        <a:srgbClr val="CCCCCC"/>
+                      </a:solidFill>
+                      <a:prstDash val="solid"/>
+                      <a:round/>
+                      <a:headEnd type="none" w="med" len="med"/>
+                      <a:tailEnd type="none" w="med" len="med"/>
+                    </a:lnB>
+                    <a:solidFill>
+                      <a:srgbClr val="BDBDBD"/>
+                    </a:solidFill>
+                  </a:tcPr>
+                </a:tc>
+                <a:tc>
+                  <a:txBody>
+                    <a:bodyPr/>
+                    <a:lstStyle/>
+                    <a:p>
+                      <a:pPr rtl="0" fontAlgn="b"/>
+                      <a:r>
+                        <a:rPr lang="en-IN" sz="700" b="1" dirty="0">
+                          <a:effectLst/>
+                        </a:rPr>
+                        <a:t>Strength of the program</a:t>
+                      </a:r>
+                    </a:p>
+                  </a:txBody>
+                  <a:tcPr marL="11887" marR="11887" marT="7925" marB="7925" anchor="b">
+                    <a:lnL w="9525" cap="flat" cmpd="sng" algn="ctr">
+                      <a:solidFill>
+                        <a:srgbClr val="CCCCCC"/>
+                      </a:solidFill>
+                      <a:prstDash val="solid"/>
+                      <a:round/>
+                      <a:headEnd type="none" w="med" len="med"/>
+                      <a:tailEnd type="none" w="med" len="med"/>
+                    </a:lnL>
+                    <a:lnR w="9525" cap="flat" cmpd="sng" algn="ctr">
+                      <a:solidFill>
+                        <a:srgbClr val="CCCCCC"/>
+                      </a:solidFill>
+                      <a:prstDash val="solid"/>
+                      <a:round/>
+                      <a:headEnd type="none" w="med" len="med"/>
+                      <a:tailEnd type="none" w="med" len="med"/>
+                    </a:lnR>
+                    <a:lnT w="9525" cap="flat" cmpd="sng" algn="ctr">
+                      <a:solidFill>
+                        <a:srgbClr val="CCCCCC"/>
+                      </a:solidFill>
+                      <a:prstDash val="solid"/>
+                      <a:round/>
+                      <a:headEnd type="none" w="med" len="med"/>
+                      <a:tailEnd type="none" w="med" len="med"/>
+                    </a:lnT>
+                    <a:lnB w="9525" cap="flat" cmpd="sng" algn="ctr">
+                      <a:solidFill>
+                        <a:srgbClr val="CCCCCC"/>
+                      </a:solidFill>
+                      <a:prstDash val="solid"/>
+                      <a:round/>
+                      <a:headEnd type="none" w="med" len="med"/>
+                      <a:tailEnd type="none" w="med" len="med"/>
+                    </a:lnB>
+                    <a:solidFill>
+                      <a:srgbClr val="BDBDBD"/>
+                    </a:solidFill>
+                  </a:tcPr>
+                </a:tc>
+                <a:tc>
+                  <a:txBody>
+                    <a:bodyPr/>
+                    <a:lstStyle/>
+                    <a:p>
+                      <a:pPr rtl="0" fontAlgn="b"/>
+                      <a:r>
+                        <a:rPr lang="en-IN" sz="700" b="1" dirty="0">
+                          <a:effectLst/>
+                        </a:rPr>
+                        <a:t>Areas of improvement of the program</a:t>
+                      </a:r>
+                    </a:p>
+                  </a:txBody>
+                  <a:tcPr marL="11887" marR="11887" marT="7925" marB="7925" anchor="b">
+                    <a:lnL w="9525" cap="flat" cmpd="sng" algn="ctr">
+                      <a:solidFill>
+                        <a:srgbClr val="CCCCCC"/>
+                      </a:solidFill>
+                      <a:prstDash val="solid"/>
+                      <a:round/>
+                      <a:headEnd type="none" w="med" len="med"/>
+                      <a:tailEnd type="none" w="med" len="med"/>
+                    </a:lnL>
+                    <a:lnR w="9525" cap="flat" cmpd="sng" algn="ctr">
+                      <a:solidFill>
+                        <a:srgbClr val="CCCCCC"/>
+                      </a:solidFill>
+                      <a:prstDash val="solid"/>
+                      <a:round/>
+                      <a:headEnd type="none" w="med" len="med"/>
+                      <a:tailEnd type="none" w="med" len="med"/>
+                    </a:lnR>
+                    <a:lnT w="9525" cap="flat" cmpd="sng" algn="ctr">
+                      <a:solidFill>
+                        <a:srgbClr val="CCCCCC"/>
+                      </a:solidFill>
+                      <a:prstDash val="solid"/>
+                      <a:round/>
+                      <a:headEnd type="none" w="med" len="med"/>
+                      <a:tailEnd type="none" w="med" len="med"/>
+                    </a:lnT>
+                    <a:lnB w="9525" cap="flat" cmpd="sng" algn="ctr">
+                      <a:solidFill>
+                        <a:srgbClr val="CCCCCC"/>
+                      </a:solidFill>
+                      <a:prstDash val="solid"/>
+                      <a:round/>
+                      <a:headEnd type="none" w="med" len="med"/>
+                      <a:tailEnd type="none" w="med" len="med"/>
+                    </a:lnB>
+                    <a:solidFill>
+                      <a:srgbClr val="BDBDBD"/>
+                    </a:solidFill>
+                  </a:tcPr>
+                </a:tc>
+                <a:tc>
+                  <a:txBody>
+                    <a:bodyPr/>
+                    <a:lstStyle/>
+                    <a:p>
+                      <a:pPr rtl="0" fontAlgn="b"/>
+                      <a:r>
+                        <a:rPr lang="en-IN" sz="700" b="1" dirty="0">
+                          <a:effectLst/>
+                        </a:rPr>
+                        <a:t>Learning </a:t>
+                      </a:r>
+                    </a:p>
+                  </a:txBody>
+                  <a:tcPr marL="11887" marR="11887" marT="7925" marB="7925" anchor="b">
+                    <a:lnL w="9525" cap="flat" cmpd="sng" algn="ctr">
+                      <a:solidFill>
+                        <a:srgbClr val="CCCCCC"/>
+                      </a:solidFill>
+                      <a:prstDash val="solid"/>
+                      <a:round/>
+                      <a:headEnd type="none" w="med" len="med"/>
+                      <a:tailEnd type="none" w="med" len="med"/>
+                    </a:lnL>
+                    <a:lnR w="9525" cap="flat" cmpd="sng" algn="ctr">
+                      <a:solidFill>
+                        <a:srgbClr val="CCCCCC"/>
+                      </a:solidFill>
+                      <a:prstDash val="solid"/>
+                      <a:round/>
+                      <a:headEnd type="none" w="med" len="med"/>
+                      <a:tailEnd type="none" w="med" len="med"/>
+                    </a:lnR>
+                    <a:lnT w="9525" cap="flat" cmpd="sng" algn="ctr">
+                      <a:solidFill>
+                        <a:srgbClr val="CCCCCC"/>
+                      </a:solidFill>
+                      <a:prstDash val="solid"/>
+                      <a:round/>
+                      <a:headEnd type="none" w="med" len="med"/>
+                      <a:tailEnd type="none" w="med" len="med"/>
+                    </a:lnT>
+                    <a:lnB w="9525" cap="flat" cmpd="sng" algn="ctr">
+                      <a:solidFill>
+                        <a:srgbClr val="CCCCCC"/>
+                      </a:solidFill>
+                      <a:prstDash val="solid"/>
+                      <a:round/>
+                      <a:headEnd type="none" w="med" len="med"/>
+                      <a:tailEnd type="none" w="med" len="med"/>
+                    </a:lnB>
+                    <a:solidFill>
+                      <a:srgbClr val="BDBDBD"/>
+                    </a:solidFill>
+                  </a:tcPr>
+                </a:tc>
+                <a:tc>
+                  <a:txBody>
+                    <a:bodyPr/>
+                    <a:lstStyle/>
+                    <a:p>
+                      <a:pPr rtl="0" fontAlgn="b"/>
+                      <a:r>
+                        <a:rPr lang="en-IN" sz="700" b="1" dirty="0">
+                          <a:effectLst/>
+                        </a:rPr>
+                        <a:t>Trainer/</a:t>
+                      </a:r>
+                      <a:r>
+                        <a:rPr lang="en-IN" sz="700" b="1" dirty="0" err="1">
+                          <a:effectLst/>
+                        </a:rPr>
+                        <a:t>Fasilitator</a:t>
+                      </a:r>
+                      <a:r>
+                        <a:rPr lang="en-IN" sz="700" b="1" dirty="0">
+                          <a:effectLst/>
+                        </a:rPr>
+                        <a:t> Name</a:t>
+                      </a:r>
+                    </a:p>
+                  </a:txBody>
+                  <a:tcPr marL="11887" marR="11887" marT="7925" marB="7925" anchor="b">
+                    <a:lnL w="9525" cap="flat" cmpd="sng" algn="ctr">
+                      <a:solidFill>
+                        <a:srgbClr val="CCCCCC"/>
+                      </a:solidFill>
+                      <a:prstDash val="solid"/>
+                      <a:round/>
+                      <a:headEnd type="none" w="med" len="med"/>
+                      <a:tailEnd type="none" w="med" len="med"/>
+                    </a:lnL>
+                    <a:lnR w="9525" cap="flat" cmpd="sng" algn="ctr">
+                      <a:solidFill>
+                        <a:srgbClr val="CCCCCC"/>
+                      </a:solidFill>
+                      <a:prstDash val="solid"/>
+                      <a:round/>
+                      <a:headEnd type="none" w="med" len="med"/>
+                      <a:tailEnd type="none" w="med" len="med"/>
+                    </a:lnR>
+                    <a:lnT w="9525" cap="flat" cmpd="sng" algn="ctr">
+                      <a:solidFill>
+                        <a:srgbClr val="CCCCCC"/>
+                      </a:solidFill>
+                      <a:prstDash val="solid"/>
+                      <a:round/>
+                      <a:headEnd type="none" w="med" len="med"/>
+                      <a:tailEnd type="none" w="med" len="med"/>
+                    </a:lnT>
+                    <a:lnB w="9525" cap="flat" cmpd="sng" algn="ctr">
+                      <a:solidFill>
+                        <a:srgbClr val="CCCCCC"/>
+                      </a:solidFill>
+                      <a:prstDash val="solid"/>
+                      <a:round/>
+                      <a:headEnd type="none" w="med" len="med"/>
+                      <a:tailEnd type="none" w="med" len="med"/>
+                    </a:lnB>
+                    <a:solidFill>
+                      <a:srgbClr val="BDBDBD"/>
+                    </a:solidFill>
+                  </a:tcPr>
+                </a:tc>
+                <a:tc>
+                  <a:txBody>
+                    <a:bodyPr/>
+                    <a:lstStyle/>
+                    <a:p>
+                      <a:pPr rtl="0" fontAlgn="b"/>
+                      <a:r>
+                        <a:rPr lang="en-IN" sz="700" b="1" dirty="0">
+                          <a:effectLst/>
+                        </a:rPr>
+                        <a:t>Name/Employee Code</a:t>
+                      </a:r>
+                    </a:p>
+                  </a:txBody>
+                  <a:tcPr marL="11887" marR="11887" marT="7925" marB="7925" anchor="b">
+                    <a:lnL w="9525" cap="flat" cmpd="sng" algn="ctr">
+                      <a:solidFill>
+                        <a:srgbClr val="CCCCCC"/>
+                      </a:solidFill>
+                      <a:prstDash val="solid"/>
+                      <a:round/>
+                      <a:headEnd type="none" w="med" len="med"/>
+                      <a:tailEnd type="none" w="med" len="med"/>
+                    </a:lnL>
+                    <a:lnR w="9525" cap="flat" cmpd="sng" algn="ctr">
+                      <a:solidFill>
+                        <a:srgbClr val="CCCCCC"/>
+                      </a:solidFill>
+                      <a:prstDash val="solid"/>
+                      <a:round/>
+                      <a:headEnd type="none" w="med" len="med"/>
+                      <a:tailEnd type="none" w="med" len="med"/>
+                    </a:lnR>
+                    <a:lnT w="9525" cap="flat" cmpd="sng" algn="ctr">
+                      <a:solidFill>
+                        <a:srgbClr val="CCCCCC"/>
+                      </a:solidFill>
+                      <a:prstDash val="solid"/>
+                      <a:round/>
+                      <a:headEnd type="none" w="med" len="med"/>
+                      <a:tailEnd type="none" w="med" len="med"/>
+                    </a:lnT>
+                    <a:lnB w="9525" cap="flat" cmpd="sng" algn="ctr">
+                      <a:solidFill>
+                        <a:srgbClr val="CCCCCC"/>
+                      </a:solidFill>
+                      <a:prstDash val="solid"/>
+                      <a:round/>
+                      <a:headEnd type="none" w="med" len="med"/>
+                      <a:tailEnd type="none" w="med" len="med"/>
+                    </a:lnB>
+                    <a:solidFill>
+                      <a:srgbClr val="BDBDBD"/>
+                    </a:solidFill>
+                  </a:tcPr>
+                </a:tc>
+                <a:tc>
+                  <a:txBody>
+                    <a:bodyPr/>
+                    <a:lstStyle/>
+                    <a:p>
+                      <a:pPr rtl="0" fontAlgn="b"/>
+                      <a:r>
+                        <a:rPr lang="en-IN" sz="700" b="1" dirty="0">
+                          <a:effectLst/>
+                        </a:rPr>
+                        <a:t>TRG ID</a:t>
+                      </a:r>
+                    </a:p>
+                  </a:txBody>
+                  <a:tcPr marL="11887" marR="11887" marT="7925" marB="7925" anchor="b">
+                    <a:lnL w="9525" cap="flat" cmpd="sng" algn="ctr">
+                      <a:solidFill>
+                        <a:srgbClr val="CCCCCC"/>
+                      </a:solidFill>
+                      <a:prstDash val="solid"/>
+                      <a:round/>
+                      <a:headEnd type="none" w="med" len="med"/>
+                      <a:tailEnd type="none" w="med" len="med"/>
+                    </a:lnL>
+                    <a:lnR w="9525" cap="flat" cmpd="sng" algn="ctr">
+                      <a:solidFill>
+                        <a:srgbClr val="CCCCCC"/>
+                      </a:solidFill>
+                      <a:prstDash val="solid"/>
+                      <a:round/>
+                      <a:headEnd type="none" w="med" len="med"/>
+                      <a:tailEnd type="none" w="med" len="med"/>
+                    </a:lnR>
+                    <a:lnT w="9525" cap="flat" cmpd="sng" algn="ctr">
+                      <a:solidFill>
+                        <a:srgbClr val="CCCCCC"/>
+                      </a:solidFill>
+                      <a:prstDash val="solid"/>
+                      <a:round/>
+                      <a:headEnd type="none" w="med" len="med"/>
+                      <a:tailEnd type="none" w="med" len="med"/>
+                    </a:lnT>
+                    <a:lnB w="9525" cap="flat" cmpd="sng" algn="ctr">
+                      <a:solidFill>
+                        <a:srgbClr val="CCCCCC"/>
+                      </a:solidFill>
+                      <a:prstDash val="solid"/>
+                      <a:round/>
+                      <a:headEnd type="none" w="med" len="med"/>
+                      <a:tailEnd type="none" w="med" len="med"/>
+                    </a:lnB>
+                    <a:solidFill>
+                      <a:srgbClr val="BDBDBD"/>
+                    </a:solidFill>
+                  </a:tcPr>
+                </a:tc>
+              </a:tr>
+              <a:tr h="477736">
+                <a:tc>
+                  <a:txBody>
+                    <a:bodyPr/>
+                    <a:lstStyle/>
+                    <a:p>
+                      <a:pPr algn="r" rtl="0" fontAlgn="b"/>
+                      <a:r>
+                        <a:rPr lang="en-IN" sz="700">
+                          <a:effectLst/>
+                        </a:rPr>
+                        <a:t>5/20/2022 18:02:37</a:t>
+                      </a:r>
+                    </a:p>
+                  </a:txBody>
+                  <a:tcPr marL="11887" marR="11887" marT="7925" marB="7925" anchor="b">
+                    <a:lnL w="9525" cap="flat" cmpd="sng" algn="ctr">
+                      <a:solidFill>
+                        <a:srgbClr val="CCCCCC"/>
+                      </a:solidFill>
+                      <a:prstDash val="solid"/>
+                      <a:round/>
+                      <a:headEnd type="none" w="med" len="med"/>
+                      <a:tailEnd type="none" w="med" len="med"/>
+                    </a:lnL>
+                    <a:lnR w="9525" cap="flat" cmpd="sng" algn="ctr">
+                      <a:solidFill>
+                        <a:srgbClr val="CCCCCC"/>
+                      </a:solidFill>
+                      <a:prstDash val="solid"/>
+                      <a:round/>
+                      <a:headEnd type="none" w="med" len="med"/>
+                      <a:tailEnd type="none" w="med" len="med"/>
+                    </a:lnR>
+                    <a:lnT w="9525" cap="flat" cmpd="sng" algn="ctr">
+                      <a:solidFill>
+                        <a:srgbClr val="CCCCCC"/>
+                      </a:solidFill>
+                      <a:prstDash val="solid"/>
+                      <a:round/>
+                      <a:headEnd type="none" w="med" len="med"/>
+                      <a:tailEnd type="none" w="med" len="med"/>
+                    </a:lnT>
+                    <a:lnB w="9525" cap="flat" cmpd="sng" algn="ctr">
+                      <a:solidFill>
+                        <a:srgbClr val="CCCCCC"/>
+                      </a:solidFill>
+                      <a:prstDash val="solid"/>
+                      <a:round/>
+                      <a:headEnd type="none" w="med" len="med"/>
+                      <a:tailEnd type="none" w="med" len="med"/>
+                    </a:lnB>
+                    <a:solidFill>
+                      <a:srgbClr val="FFFFFF"/>
+                    </a:solidFill>
+                  </a:tcPr>
+                </a:tc>
+                <a:tc>
+                  <a:txBody>
+                    <a:bodyPr/>
+                    <a:lstStyle/>
+                    <a:p>
+                      <a:pPr rtl="0" fontAlgn="b"/>
+                      <a:r>
+                        <a:rPr lang="en-IN" sz="700">
+                          <a:effectLst/>
+                        </a:rPr>
+                        <a:t>syoji.sharma@genusinnovation.com</a:t>
+                      </a:r>
+                    </a:p>
+                  </a:txBody>
+                  <a:tcPr marL="11887" marR="11887" marT="7925" marB="7925" anchor="b">
+                    <a:lnL w="9525" cap="flat" cmpd="sng" algn="ctr">
+                      <a:solidFill>
+                        <a:srgbClr val="CCCCCC"/>
+                      </a:solidFill>
+                      <a:prstDash val="solid"/>
+                      <a:round/>
+                      <a:headEnd type="none" w="med" len="med"/>
+                      <a:tailEnd type="none" w="med" len="med"/>
+                    </a:lnL>
+                    <a:lnR w="9525" cap="flat" cmpd="sng" algn="ctr">
+                      <a:solidFill>
+                        <a:srgbClr val="CCCCCC"/>
+                      </a:solidFill>
+                      <a:prstDash val="solid"/>
+                      <a:round/>
+                      <a:headEnd type="none" w="med" len="med"/>
+                      <a:tailEnd type="none" w="med" len="med"/>
+                    </a:lnR>
+                    <a:lnT w="9525" cap="flat" cmpd="sng" algn="ctr">
+                      <a:solidFill>
+                        <a:srgbClr val="CCCCCC"/>
+                      </a:solidFill>
+                      <a:prstDash val="solid"/>
+                      <a:round/>
+                      <a:headEnd type="none" w="med" len="med"/>
+                      <a:tailEnd type="none" w="med" len="med"/>
+                    </a:lnT>
+                    <a:lnB w="9525" cap="flat" cmpd="sng" algn="ctr">
+                      <a:solidFill>
+                        <a:srgbClr val="CCCCCC"/>
+                      </a:solidFill>
+                      <a:prstDash val="solid"/>
+                      <a:round/>
+                      <a:headEnd type="none" w="med" len="med"/>
+                      <a:tailEnd type="none" w="med" len="med"/>
+                    </a:lnB>
+                    <a:solidFill>
+                      <a:srgbClr val="FFFFFF"/>
+                    </a:solidFill>
+                  </a:tcPr>
+                </a:tc>
+                <a:tc>
+                  <a:txBody>
+                    <a:bodyPr/>
+                    <a:lstStyle/>
+                    <a:p>
+                      <a:pPr rtl="0" fontAlgn="b"/>
+                      <a:r>
+                        <a:rPr lang="en-IN" sz="700">
+                          <a:effectLst/>
+                        </a:rPr>
+                        <a:t>Ext-001 Training on Buck &amp; boost technology by TI</a:t>
+                      </a:r>
+                    </a:p>
+                  </a:txBody>
+                  <a:tcPr marL="11887" marR="11887" marT="7925" marB="7925" anchor="b">
+                    <a:lnL w="9525" cap="flat" cmpd="sng" algn="ctr">
+                      <a:solidFill>
+                        <a:srgbClr val="CCCCCC"/>
+                      </a:solidFill>
+                      <a:prstDash val="solid"/>
+                      <a:round/>
+                      <a:headEnd type="none" w="med" len="med"/>
+                      <a:tailEnd type="none" w="med" len="med"/>
+                    </a:lnL>
+                    <a:lnR w="9525" cap="flat" cmpd="sng" algn="ctr">
+                      <a:solidFill>
+                        <a:srgbClr val="CCCCCC"/>
+                      </a:solidFill>
+                      <a:prstDash val="solid"/>
+                      <a:round/>
+                      <a:headEnd type="none" w="med" len="med"/>
+                      <a:tailEnd type="none" w="med" len="med"/>
+                    </a:lnR>
+                    <a:lnT w="9525" cap="flat" cmpd="sng" algn="ctr">
+                      <a:solidFill>
+                        <a:srgbClr val="CCCCCC"/>
+                      </a:solidFill>
+                      <a:prstDash val="solid"/>
+                      <a:round/>
+                      <a:headEnd type="none" w="med" len="med"/>
+                      <a:tailEnd type="none" w="med" len="med"/>
+                    </a:lnT>
+                    <a:lnB w="9525" cap="flat" cmpd="sng" algn="ctr">
+                      <a:solidFill>
+                        <a:srgbClr val="CCCCCC"/>
+                      </a:solidFill>
+                      <a:prstDash val="solid"/>
+                      <a:round/>
+                      <a:headEnd type="none" w="med" len="med"/>
+                      <a:tailEnd type="none" w="med" len="med"/>
+                    </a:lnB>
+                    <a:solidFill>
+                      <a:srgbClr val="FFFFFF"/>
+                    </a:solidFill>
+                  </a:tcPr>
+                </a:tc>
+                <a:tc>
+                  <a:txBody>
+                    <a:bodyPr/>
+                    <a:lstStyle/>
+                    <a:p>
+                      <a:pPr rtl="0" fontAlgn="b"/>
+                      <a:r>
+                        <a:rPr lang="en-IN" sz="700">
+                          <a:effectLst/>
+                        </a:rPr>
+                        <a:t>syoji</a:t>
+                      </a:r>
+                    </a:p>
+                  </a:txBody>
+                  <a:tcPr marL="11887" marR="11887" marT="7925" marB="7925" anchor="b">
+                    <a:lnL w="9525" cap="flat" cmpd="sng" algn="ctr">
+                      <a:solidFill>
+                        <a:srgbClr val="CCCCCC"/>
+                      </a:solidFill>
+                      <a:prstDash val="solid"/>
+                      <a:round/>
+                      <a:headEnd type="none" w="med" len="med"/>
+                      <a:tailEnd type="none" w="med" len="med"/>
+                    </a:lnL>
+                    <a:lnR w="9525" cap="flat" cmpd="sng" algn="ctr">
+                      <a:solidFill>
+                        <a:srgbClr val="CCCCCC"/>
+                      </a:solidFill>
+                      <a:prstDash val="solid"/>
+                      <a:round/>
+                      <a:headEnd type="none" w="med" len="med"/>
+                      <a:tailEnd type="none" w="med" len="med"/>
+                    </a:lnR>
+                    <a:lnT w="9525" cap="flat" cmpd="sng" algn="ctr">
+                      <a:solidFill>
+                        <a:srgbClr val="CCCCCC"/>
+                      </a:solidFill>
+                      <a:prstDash val="solid"/>
+                      <a:round/>
+                      <a:headEnd type="none" w="med" len="med"/>
+                      <a:tailEnd type="none" w="med" len="med"/>
+                    </a:lnT>
+                    <a:lnB w="9525" cap="flat" cmpd="sng" algn="ctr">
+                      <a:solidFill>
+                        <a:srgbClr val="CCCCCC"/>
+                      </a:solidFill>
+                      <a:prstDash val="solid"/>
+                      <a:round/>
+                      <a:headEnd type="none" w="med" len="med"/>
+                      <a:tailEnd type="none" w="med" len="med"/>
+                    </a:lnB>
+                    <a:solidFill>
+                      <a:srgbClr val="FFFFFF"/>
+                    </a:solidFill>
+                  </a:tcPr>
+                </a:tc>
+                <a:tc>
+                  <a:txBody>
+                    <a:bodyPr/>
+                    <a:lstStyle/>
+                    <a:p>
+                      <a:pPr algn="r" rtl="0" fontAlgn="b"/>
+                      <a:r>
+                        <a:rPr lang="en-IN" sz="700">
+                          <a:effectLst/>
+                        </a:rPr>
+                        <a:t>15008</a:t>
+                      </a:r>
+                    </a:p>
+                  </a:txBody>
+                  <a:tcPr marL="11887" marR="11887" marT="7925" marB="7925" anchor="b">
+                    <a:lnL w="9525" cap="flat" cmpd="sng" algn="ctr">
+                      <a:solidFill>
+                        <a:srgbClr val="CCCCCC"/>
+                      </a:solidFill>
+                      <a:prstDash val="solid"/>
+                      <a:round/>
+                      <a:headEnd type="none" w="med" len="med"/>
+                      <a:tailEnd type="none" w="med" len="med"/>
+                    </a:lnL>
+                    <a:lnR w="9525" cap="flat" cmpd="sng" algn="ctr">
+                      <a:solidFill>
+                        <a:srgbClr val="CCCCCC"/>
+                      </a:solidFill>
+                      <a:prstDash val="solid"/>
+                      <a:round/>
+                      <a:headEnd type="none" w="med" len="med"/>
+                      <a:tailEnd type="none" w="med" len="med"/>
+                    </a:lnR>
+                    <a:lnT w="9525" cap="flat" cmpd="sng" algn="ctr">
+                      <a:solidFill>
+                        <a:srgbClr val="CCCCCC"/>
+                      </a:solidFill>
+                      <a:prstDash val="solid"/>
+                      <a:round/>
+                      <a:headEnd type="none" w="med" len="med"/>
+                      <a:tailEnd type="none" w="med" len="med"/>
+                    </a:lnT>
+                    <a:lnB w="9525" cap="flat" cmpd="sng" algn="ctr">
+                      <a:solidFill>
+                        <a:srgbClr val="CCCCCC"/>
+                      </a:solidFill>
+                      <a:prstDash val="solid"/>
+                      <a:round/>
+                      <a:headEnd type="none" w="med" len="med"/>
+                      <a:tailEnd type="none" w="med" len="med"/>
+                    </a:lnB>
+                    <a:solidFill>
+                      <a:srgbClr val="FFFFFF"/>
+                    </a:solidFill>
+                  </a:tcPr>
+                </a:tc>
+                <a:tc>
+                  <a:txBody>
+                    <a:bodyPr/>
+                    <a:lstStyle/>
+                    <a:p>
+                      <a:pPr rtl="0" fontAlgn="b"/>
+                      <a:r>
+                        <a:rPr lang="en-IN" sz="700">
+                          <a:effectLst/>
+                        </a:rPr>
+                        <a:t>assistant Manager</a:t>
+                      </a:r>
+                    </a:p>
+                  </a:txBody>
+                  <a:tcPr marL="11887" marR="11887" marT="7925" marB="7925" anchor="b">
+                    <a:lnL w="9525" cap="flat" cmpd="sng" algn="ctr">
+                      <a:solidFill>
+                        <a:srgbClr val="CCCCCC"/>
+                      </a:solidFill>
+                      <a:prstDash val="solid"/>
+                      <a:round/>
+                      <a:headEnd type="none" w="med" len="med"/>
+                      <a:tailEnd type="none" w="med" len="med"/>
+                    </a:lnL>
+                    <a:lnR w="9525" cap="flat" cmpd="sng" algn="ctr">
+                      <a:solidFill>
+                        <a:srgbClr val="CCCCCC"/>
+                      </a:solidFill>
+                      <a:prstDash val="solid"/>
+                      <a:round/>
+                      <a:headEnd type="none" w="med" len="med"/>
+                      <a:tailEnd type="none" w="med" len="med"/>
+                    </a:lnR>
+                    <a:lnT w="9525" cap="flat" cmpd="sng" algn="ctr">
+                      <a:solidFill>
+                        <a:srgbClr val="CCCCCC"/>
+                      </a:solidFill>
+                      <a:prstDash val="solid"/>
+                      <a:round/>
+                      <a:headEnd type="none" w="med" len="med"/>
+                      <a:tailEnd type="none" w="med" len="med"/>
+                    </a:lnT>
+                    <a:lnB w="9525" cap="flat" cmpd="sng" algn="ctr">
+                      <a:solidFill>
+                        <a:srgbClr val="CCCCCC"/>
+                      </a:solidFill>
+                      <a:prstDash val="solid"/>
+                      <a:round/>
+                      <a:headEnd type="none" w="med" len="med"/>
+                      <a:tailEnd type="none" w="med" len="med"/>
+                    </a:lnB>
+                    <a:solidFill>
+                      <a:srgbClr val="FFFFFF"/>
+                    </a:solidFill>
+                  </a:tcPr>
+                </a:tc>
+                <a:tc>
+                  <a:txBody>
+                    <a:bodyPr/>
+                    <a:lstStyle/>
+                    <a:p>
+                      <a:pPr algn="r" rtl="0" fontAlgn="b"/>
+                      <a:r>
+                        <a:rPr lang="en-IN" sz="700">
+                          <a:effectLst/>
+                        </a:rPr>
+                        <a:t>2</a:t>
+                      </a:r>
+                    </a:p>
+                  </a:txBody>
+                  <a:tcPr marL="11887" marR="11887" marT="7925" marB="7925" anchor="b">
+                    <a:lnL w="9525" cap="flat" cmpd="sng" algn="ctr">
+                      <a:solidFill>
+                        <a:srgbClr val="CCCCCC"/>
+                      </a:solidFill>
+                      <a:prstDash val="solid"/>
+                      <a:round/>
+                      <a:headEnd type="none" w="med" len="med"/>
+                      <a:tailEnd type="none" w="med" len="med"/>
+                    </a:lnL>
+                    <a:lnR w="9525" cap="flat" cmpd="sng" algn="ctr">
+                      <a:solidFill>
+                        <a:srgbClr val="CCCCCC"/>
+                      </a:solidFill>
+                      <a:prstDash val="solid"/>
+                      <a:round/>
+                      <a:headEnd type="none" w="med" len="med"/>
+                      <a:tailEnd type="none" w="med" len="med"/>
+                    </a:lnR>
+                    <a:lnT w="9525" cap="flat" cmpd="sng" algn="ctr">
+                      <a:solidFill>
+                        <a:srgbClr val="CCCCCC"/>
+                      </a:solidFill>
+                      <a:prstDash val="solid"/>
+                      <a:round/>
+                      <a:headEnd type="none" w="med" len="med"/>
+                      <a:tailEnd type="none" w="med" len="med"/>
+                    </a:lnT>
+                    <a:lnB w="9525" cap="flat" cmpd="sng" algn="ctr">
+                      <a:solidFill>
+                        <a:srgbClr val="CCCCCC"/>
+                      </a:solidFill>
+                      <a:prstDash val="solid"/>
+                      <a:round/>
+                      <a:headEnd type="none" w="med" len="med"/>
+                      <a:tailEnd type="none" w="med" len="med"/>
+                    </a:lnB>
+                    <a:solidFill>
+                      <a:srgbClr val="FFFFFF"/>
+                    </a:solidFill>
+                  </a:tcPr>
+                </a:tc>
+                <a:tc>
+                  <a:txBody>
+                    <a:bodyPr/>
+                    <a:lstStyle/>
+                    <a:p>
+                      <a:pPr algn="r" rtl="0" fontAlgn="b"/>
+                      <a:r>
+                        <a:rPr lang="en-IN" sz="700">
+                          <a:effectLst/>
+                        </a:rPr>
+                        <a:t>2</a:t>
+                      </a:r>
+                    </a:p>
+                  </a:txBody>
+                  <a:tcPr marL="11887" marR="11887" marT="7925" marB="7925" anchor="b">
+                    <a:lnL w="9525" cap="flat" cmpd="sng" algn="ctr">
+                      <a:solidFill>
+                        <a:srgbClr val="CCCCCC"/>
+                      </a:solidFill>
+                      <a:prstDash val="solid"/>
+                      <a:round/>
+                      <a:headEnd type="none" w="med" len="med"/>
+                      <a:tailEnd type="none" w="med" len="med"/>
+                    </a:lnL>
+                    <a:lnR w="9525" cap="flat" cmpd="sng" algn="ctr">
+                      <a:solidFill>
+                        <a:srgbClr val="CCCCCC"/>
+                      </a:solidFill>
+                      <a:prstDash val="solid"/>
+                      <a:round/>
+                      <a:headEnd type="none" w="med" len="med"/>
+                      <a:tailEnd type="none" w="med" len="med"/>
+                    </a:lnR>
+                    <a:lnT w="9525" cap="flat" cmpd="sng" algn="ctr">
+                      <a:solidFill>
+                        <a:srgbClr val="CCCCCC"/>
+                      </a:solidFill>
+                      <a:prstDash val="solid"/>
+                      <a:round/>
+                      <a:headEnd type="none" w="med" len="med"/>
+                      <a:tailEnd type="none" w="med" len="med"/>
+                    </a:lnT>
+                    <a:lnB w="9525" cap="flat" cmpd="sng" algn="ctr">
+                      <a:solidFill>
+                        <a:srgbClr val="CCCCCC"/>
+                      </a:solidFill>
+                      <a:prstDash val="solid"/>
+                      <a:round/>
+                      <a:headEnd type="none" w="med" len="med"/>
+                      <a:tailEnd type="none" w="med" len="med"/>
+                    </a:lnB>
+                    <a:solidFill>
+                      <a:srgbClr val="FFFFFF"/>
+                    </a:solidFill>
+                  </a:tcPr>
+                </a:tc>
+                <a:tc>
+                  <a:txBody>
+                    <a:bodyPr/>
+                    <a:lstStyle/>
+                    <a:p>
+                      <a:pPr algn="r" rtl="0" fontAlgn="b"/>
+                      <a:r>
+                        <a:rPr lang="en-IN" sz="700">
+                          <a:effectLst/>
+                        </a:rPr>
+                        <a:t>4</a:t>
+                      </a:r>
+                    </a:p>
+                  </a:txBody>
+                  <a:tcPr marL="11887" marR="11887" marT="7925" marB="7925" anchor="b">
+                    <a:lnL w="9525" cap="flat" cmpd="sng" algn="ctr">
+                      <a:solidFill>
+                        <a:srgbClr val="CCCCCC"/>
+                      </a:solidFill>
+                      <a:prstDash val="solid"/>
+                      <a:round/>
+                      <a:headEnd type="none" w="med" len="med"/>
+                      <a:tailEnd type="none" w="med" len="med"/>
+                    </a:lnL>
+                    <a:lnR w="9525" cap="flat" cmpd="sng" algn="ctr">
+                      <a:solidFill>
+                        <a:srgbClr val="CCCCCC"/>
+                      </a:solidFill>
+                      <a:prstDash val="solid"/>
+                      <a:round/>
+                      <a:headEnd type="none" w="med" len="med"/>
+                      <a:tailEnd type="none" w="med" len="med"/>
+                    </a:lnR>
+                    <a:lnT w="9525" cap="flat" cmpd="sng" algn="ctr">
+                      <a:solidFill>
+                        <a:srgbClr val="CCCCCC"/>
+                      </a:solidFill>
+                      <a:prstDash val="solid"/>
+                      <a:round/>
+                      <a:headEnd type="none" w="med" len="med"/>
+                      <a:tailEnd type="none" w="med" len="med"/>
+                    </a:lnT>
+                    <a:lnB w="9525" cap="flat" cmpd="sng" algn="ctr">
+                      <a:solidFill>
+                        <a:srgbClr val="CCCCCC"/>
+                      </a:solidFill>
+                      <a:prstDash val="solid"/>
+                      <a:round/>
+                      <a:headEnd type="none" w="med" len="med"/>
+                      <a:tailEnd type="none" w="med" len="med"/>
+                    </a:lnB>
+                    <a:solidFill>
+                      <a:srgbClr val="FFFFFF"/>
+                    </a:solidFill>
+                  </a:tcPr>
+                </a:tc>
+                <a:tc>
+                  <a:txBody>
+                    <a:bodyPr/>
+                    <a:lstStyle/>
+                    <a:p>
+                      <a:pPr algn="r" rtl="0" fontAlgn="b"/>
+                      <a:r>
+                        <a:rPr lang="en-IN" sz="700" dirty="0">
+                          <a:effectLst/>
+                        </a:rPr>
+                        <a:t>8</a:t>
+                      </a:r>
+                    </a:p>
+                  </a:txBody>
+                  <a:tcPr marL="11887" marR="11887" marT="7925" marB="7925" anchor="b">
+                    <a:lnL w="9525" cap="flat" cmpd="sng" algn="ctr">
+                      <a:solidFill>
+                        <a:srgbClr val="CCCCCC"/>
+                      </a:solidFill>
+                      <a:prstDash val="solid"/>
+                      <a:round/>
+                      <a:headEnd type="none" w="med" len="med"/>
+                      <a:tailEnd type="none" w="med" len="med"/>
+                    </a:lnL>
+                    <a:lnR w="9525" cap="flat" cmpd="sng" algn="ctr">
+                      <a:solidFill>
+                        <a:srgbClr val="CCCCCC"/>
+                      </a:solidFill>
+                      <a:prstDash val="solid"/>
+                      <a:round/>
+                      <a:headEnd type="none" w="med" len="med"/>
+                      <a:tailEnd type="none" w="med" len="med"/>
+                    </a:lnR>
+                    <a:lnT w="9525" cap="flat" cmpd="sng" algn="ctr">
+                      <a:solidFill>
+                        <a:srgbClr val="CCCCCC"/>
+                      </a:solidFill>
+                      <a:prstDash val="solid"/>
+                      <a:round/>
+                      <a:headEnd type="none" w="med" len="med"/>
+                      <a:tailEnd type="none" w="med" len="med"/>
+                    </a:lnT>
+                    <a:lnB w="9525" cap="flat" cmpd="sng" algn="ctr">
+                      <a:solidFill>
+                        <a:srgbClr val="CCCCCC"/>
+                      </a:solidFill>
+                      <a:prstDash val="solid"/>
+                      <a:round/>
+                      <a:headEnd type="none" w="med" len="med"/>
+                      <a:tailEnd type="none" w="med" len="med"/>
+                    </a:lnB>
+                    <a:solidFill>
+                      <a:srgbClr val="FFFFFF"/>
+                    </a:solidFill>
+                  </a:tcPr>
+                </a:tc>
+                <a:tc>
+                  <a:txBody>
+                    <a:bodyPr/>
+                    <a:lstStyle/>
+                    <a:p>
+                      <a:pPr algn="r" rtl="0" fontAlgn="b"/>
+                      <a:r>
+                        <a:rPr lang="en-IN" sz="700">
+                          <a:effectLst/>
+                        </a:rPr>
+                        <a:t>8</a:t>
+                      </a:r>
+                    </a:p>
+                  </a:txBody>
+                  <a:tcPr marL="11887" marR="11887" marT="7925" marB="7925" anchor="b">
+                    <a:lnL w="9525" cap="flat" cmpd="sng" algn="ctr">
+                      <a:solidFill>
+                        <a:srgbClr val="CCCCCC"/>
+                      </a:solidFill>
+                      <a:prstDash val="solid"/>
+                      <a:round/>
+                      <a:headEnd type="none" w="med" len="med"/>
+                      <a:tailEnd type="none" w="med" len="med"/>
+                    </a:lnL>
+                    <a:lnR w="9525" cap="flat" cmpd="sng" algn="ctr">
+                      <a:solidFill>
+                        <a:srgbClr val="CCCCCC"/>
+                      </a:solidFill>
+                      <a:prstDash val="solid"/>
+                      <a:round/>
+                      <a:headEnd type="none" w="med" len="med"/>
+                      <a:tailEnd type="none" w="med" len="med"/>
+                    </a:lnR>
+                    <a:lnT w="9525" cap="flat" cmpd="sng" algn="ctr">
+                      <a:solidFill>
+                        <a:srgbClr val="CCCCCC"/>
+                      </a:solidFill>
+                      <a:prstDash val="solid"/>
+                      <a:round/>
+                      <a:headEnd type="none" w="med" len="med"/>
+                      <a:tailEnd type="none" w="med" len="med"/>
+                    </a:lnT>
+                    <a:lnB w="9525" cap="flat" cmpd="sng" algn="ctr">
+                      <a:solidFill>
+                        <a:srgbClr val="CCCCCC"/>
+                      </a:solidFill>
+                      <a:prstDash val="solid"/>
+                      <a:round/>
+                      <a:headEnd type="none" w="med" len="med"/>
+                      <a:tailEnd type="none" w="med" len="med"/>
+                    </a:lnB>
+                    <a:solidFill>
+                      <a:srgbClr val="FFFFFF"/>
+                    </a:solidFill>
+                  </a:tcPr>
+                </a:tc>
+                <a:tc>
+                  <a:txBody>
+                    <a:bodyPr/>
+                    <a:lstStyle/>
+                    <a:p>
+                      <a:pPr algn="r" rtl="0" fontAlgn="b"/>
+                      <a:r>
+                        <a:rPr lang="en-IN" sz="700">
+                          <a:effectLst/>
+                        </a:rPr>
+                        <a:t>7</a:t>
+                      </a:r>
+                    </a:p>
+                  </a:txBody>
+                  <a:tcPr marL="11887" marR="11887" marT="7925" marB="7925" anchor="b">
+                    <a:lnL w="9525" cap="flat" cmpd="sng" algn="ctr">
+                      <a:solidFill>
+                        <a:srgbClr val="CCCCCC"/>
+                      </a:solidFill>
+                      <a:prstDash val="solid"/>
+                      <a:round/>
+                      <a:headEnd type="none" w="med" len="med"/>
+                      <a:tailEnd type="none" w="med" len="med"/>
+                    </a:lnL>
+                    <a:lnR w="9525" cap="flat" cmpd="sng" algn="ctr">
+                      <a:solidFill>
+                        <a:srgbClr val="CCCCCC"/>
+                      </a:solidFill>
+                      <a:prstDash val="solid"/>
+                      <a:round/>
+                      <a:headEnd type="none" w="med" len="med"/>
+                      <a:tailEnd type="none" w="med" len="med"/>
+                    </a:lnR>
+                    <a:lnT w="9525" cap="flat" cmpd="sng" algn="ctr">
+                      <a:solidFill>
+                        <a:srgbClr val="CCCCCC"/>
+                      </a:solidFill>
+                      <a:prstDash val="solid"/>
+                      <a:round/>
+                      <a:headEnd type="none" w="med" len="med"/>
+                      <a:tailEnd type="none" w="med" len="med"/>
+                    </a:lnT>
+                    <a:lnB w="9525" cap="flat" cmpd="sng" algn="ctr">
+                      <a:solidFill>
+                        <a:srgbClr val="CCCCCC"/>
+                      </a:solidFill>
+                      <a:prstDash val="solid"/>
+                      <a:round/>
+                      <a:headEnd type="none" w="med" len="med"/>
+                      <a:tailEnd type="none" w="med" len="med"/>
+                    </a:lnB>
+                    <a:solidFill>
+                      <a:srgbClr val="FFFFFF"/>
+                    </a:solidFill>
+                  </a:tcPr>
+                </a:tc>
+                <a:tc>
+                  <a:txBody>
+                    <a:bodyPr/>
+                    <a:lstStyle/>
+                    <a:p>
+                      <a:pPr algn="r" rtl="0" fontAlgn="b"/>
+                      <a:r>
+                        <a:rPr lang="en-IN" sz="700">
+                          <a:effectLst/>
+                        </a:rPr>
+                        <a:t>8</a:t>
+                      </a:r>
+                    </a:p>
+                  </a:txBody>
+                  <a:tcPr marL="11887" marR="11887" marT="7925" marB="7925" anchor="b">
+                    <a:lnL w="9525" cap="flat" cmpd="sng" algn="ctr">
+                      <a:solidFill>
+                        <a:srgbClr val="CCCCCC"/>
+                      </a:solidFill>
+                      <a:prstDash val="solid"/>
+                      <a:round/>
+                      <a:headEnd type="none" w="med" len="med"/>
+                      <a:tailEnd type="none" w="med" len="med"/>
+                    </a:lnL>
+                    <a:lnR w="9525" cap="flat" cmpd="sng" algn="ctr">
+                      <a:solidFill>
+                        <a:srgbClr val="CCCCCC"/>
+                      </a:solidFill>
+                      <a:prstDash val="solid"/>
+                      <a:round/>
+                      <a:headEnd type="none" w="med" len="med"/>
+                      <a:tailEnd type="none" w="med" len="med"/>
+                    </a:lnR>
+                    <a:lnT w="9525" cap="flat" cmpd="sng" algn="ctr">
+                      <a:solidFill>
+                        <a:srgbClr val="CCCCCC"/>
+                      </a:solidFill>
+                      <a:prstDash val="solid"/>
+                      <a:round/>
+                      <a:headEnd type="none" w="med" len="med"/>
+                      <a:tailEnd type="none" w="med" len="med"/>
+                    </a:lnT>
+                    <a:lnB w="9525" cap="flat" cmpd="sng" algn="ctr">
+                      <a:solidFill>
+                        <a:srgbClr val="CCCCCC"/>
+                      </a:solidFill>
+                      <a:prstDash val="solid"/>
+                      <a:round/>
+                      <a:headEnd type="none" w="med" len="med"/>
+                      <a:tailEnd type="none" w="med" len="med"/>
+                    </a:lnB>
+                    <a:solidFill>
+                      <a:srgbClr val="FFFFFF"/>
+                    </a:solidFill>
+                  </a:tcPr>
+                </a:tc>
+                <a:tc>
+                  <a:txBody>
+                    <a:bodyPr/>
+                    <a:lstStyle/>
+                    <a:p>
+                      <a:pPr algn="ctr" rtl="0" fontAlgn="b"/>
+                      <a:r>
+                        <a:rPr lang="en-IN" sz="700">
+                          <a:effectLst/>
+                        </a:rPr>
+                        <a:t>6</a:t>
+                      </a:r>
+                    </a:p>
+                  </a:txBody>
+                  <a:tcPr marL="11887" marR="11887" marT="7925" marB="7925" anchor="b">
+                    <a:lnL w="9525" cap="flat" cmpd="sng" algn="ctr">
+                      <a:solidFill>
+                        <a:srgbClr val="CCCCCC"/>
+                      </a:solidFill>
+                      <a:prstDash val="solid"/>
+                      <a:round/>
+                      <a:headEnd type="none" w="med" len="med"/>
+                      <a:tailEnd type="none" w="med" len="med"/>
+                    </a:lnL>
+                    <a:lnR w="9525" cap="flat" cmpd="sng" algn="ctr">
+                      <a:solidFill>
+                        <a:srgbClr val="CCCCCC"/>
+                      </a:solidFill>
+                      <a:prstDash val="solid"/>
+                      <a:round/>
+                      <a:headEnd type="none" w="med" len="med"/>
+                      <a:tailEnd type="none" w="med" len="med"/>
+                    </a:lnR>
+                    <a:lnT w="9525" cap="flat" cmpd="sng" algn="ctr">
+                      <a:solidFill>
+                        <a:srgbClr val="CCCCCC"/>
+                      </a:solidFill>
+                      <a:prstDash val="solid"/>
+                      <a:round/>
+                      <a:headEnd type="none" w="med" len="med"/>
+                      <a:tailEnd type="none" w="med" len="med"/>
+                    </a:lnT>
+                    <a:lnB w="9525" cap="flat" cmpd="sng" algn="ctr">
+                      <a:solidFill>
+                        <a:srgbClr val="CCCCCC"/>
+                      </a:solidFill>
+                      <a:prstDash val="solid"/>
+                      <a:round/>
+                      <a:headEnd type="none" w="med" len="med"/>
+                      <a:tailEnd type="none" w="med" len="med"/>
+                    </a:lnB>
+                    <a:solidFill>
+                      <a:srgbClr val="FFFFFF"/>
+                    </a:solidFill>
+                  </a:tcPr>
+                </a:tc>
+                <a:tc>
+                  <a:txBody>
+                    <a:bodyPr/>
+                    <a:lstStyle/>
+                    <a:p>
+                      <a:pPr rtl="0" fontAlgn="b"/>
+                      <a:r>
+                        <a:rPr lang="en-IN" sz="700" dirty="0">
+                          <a:effectLst/>
+                        </a:rPr>
+                        <a:t>KNOWLEGE UPGRADE</a:t>
+                      </a:r>
+                    </a:p>
+                  </a:txBody>
+                  <a:tcPr marL="11887" marR="11887" marT="7925" marB="7925" anchor="b">
+                    <a:lnL w="9525" cap="flat" cmpd="sng" algn="ctr">
+                      <a:solidFill>
+                        <a:srgbClr val="CCCCCC"/>
+                      </a:solidFill>
+                      <a:prstDash val="solid"/>
+                      <a:round/>
+                      <a:headEnd type="none" w="med" len="med"/>
+                      <a:tailEnd type="none" w="med" len="med"/>
+                    </a:lnL>
+                    <a:lnR w="9525" cap="flat" cmpd="sng" algn="ctr">
+                      <a:solidFill>
+                        <a:srgbClr val="CCCCCC"/>
+                      </a:solidFill>
+                      <a:prstDash val="solid"/>
+                      <a:round/>
+                      <a:headEnd type="none" w="med" len="med"/>
+                      <a:tailEnd type="none" w="med" len="med"/>
+                    </a:lnR>
+                    <a:lnT w="9525" cap="flat" cmpd="sng" algn="ctr">
+                      <a:solidFill>
+                        <a:srgbClr val="CCCCCC"/>
+                      </a:solidFill>
+                      <a:prstDash val="solid"/>
+                      <a:round/>
+                      <a:headEnd type="none" w="med" len="med"/>
+                      <a:tailEnd type="none" w="med" len="med"/>
+                    </a:lnT>
+                    <a:lnB w="9525" cap="flat" cmpd="sng" algn="ctr">
+                      <a:solidFill>
+                        <a:srgbClr val="CCCCCC"/>
+                      </a:solidFill>
+                      <a:prstDash val="solid"/>
+                      <a:round/>
+                      <a:headEnd type="none" w="med" len="med"/>
+                      <a:tailEnd type="none" w="med" len="med"/>
+                    </a:lnB>
+                    <a:solidFill>
+                      <a:srgbClr val="FFFFFF"/>
+                    </a:solidFill>
+                  </a:tcPr>
+                </a:tc>
+                <a:tc>
+                  <a:txBody>
+                    <a:bodyPr/>
+                    <a:lstStyle/>
+                    <a:p>
+                      <a:pPr rtl="0" fontAlgn="b"/>
+                      <a:r>
+                        <a:rPr lang="en-IN" sz="700">
+                          <a:effectLst/>
+                        </a:rPr>
+                        <a:t>COMPONENT SELECTION OF BUCK AND BOOST </a:t>
+                      </a:r>
+                    </a:p>
+                  </a:txBody>
+                  <a:tcPr marL="11887" marR="11887" marT="7925" marB="7925" anchor="b">
+                    <a:lnL w="9525" cap="flat" cmpd="sng" algn="ctr">
+                      <a:solidFill>
+                        <a:srgbClr val="CCCCCC"/>
+                      </a:solidFill>
+                      <a:prstDash val="solid"/>
+                      <a:round/>
+                      <a:headEnd type="none" w="med" len="med"/>
+                      <a:tailEnd type="none" w="med" len="med"/>
+                    </a:lnL>
+                    <a:lnR w="9525" cap="flat" cmpd="sng" algn="ctr">
+                      <a:solidFill>
+                        <a:srgbClr val="CCCCCC"/>
+                      </a:solidFill>
+                      <a:prstDash val="solid"/>
+                      <a:round/>
+                      <a:headEnd type="none" w="med" len="med"/>
+                      <a:tailEnd type="none" w="med" len="med"/>
+                    </a:lnR>
+                    <a:lnT w="9525" cap="flat" cmpd="sng" algn="ctr">
+                      <a:solidFill>
+                        <a:srgbClr val="CCCCCC"/>
+                      </a:solidFill>
+                      <a:prstDash val="solid"/>
+                      <a:round/>
+                      <a:headEnd type="none" w="med" len="med"/>
+                      <a:tailEnd type="none" w="med" len="med"/>
+                    </a:lnT>
+                    <a:lnB w="9525" cap="flat" cmpd="sng" algn="ctr">
+                      <a:solidFill>
+                        <a:srgbClr val="CCCCCC"/>
+                      </a:solidFill>
+                      <a:prstDash val="solid"/>
+                      <a:round/>
+                      <a:headEnd type="none" w="med" len="med"/>
+                      <a:tailEnd type="none" w="med" len="med"/>
+                    </a:lnB>
+                    <a:solidFill>
+                      <a:srgbClr val="FFFFFF"/>
+                    </a:solidFill>
+                  </a:tcPr>
+                </a:tc>
+                <a:tc>
+                  <a:txBody>
+                    <a:bodyPr/>
+                    <a:lstStyle/>
+                    <a:p>
+                      <a:pPr rtl="0" fontAlgn="b"/>
+                      <a:r>
+                        <a:rPr lang="en-IN" sz="700">
+                          <a:effectLst/>
+                        </a:rPr>
+                        <a:t>DESINING CONCEPT OF BUCK AND BOOST UPDATED</a:t>
+                      </a:r>
+                    </a:p>
+                  </a:txBody>
+                  <a:tcPr marL="11887" marR="11887" marT="7925" marB="7925" anchor="b">
+                    <a:lnL w="9525" cap="flat" cmpd="sng" algn="ctr">
+                      <a:solidFill>
+                        <a:srgbClr val="CCCCCC"/>
+                      </a:solidFill>
+                      <a:prstDash val="solid"/>
+                      <a:round/>
+                      <a:headEnd type="none" w="med" len="med"/>
+                      <a:tailEnd type="none" w="med" len="med"/>
+                    </a:lnL>
+                    <a:lnR w="9525" cap="flat" cmpd="sng" algn="ctr">
+                      <a:solidFill>
+                        <a:srgbClr val="CCCCCC"/>
+                      </a:solidFill>
+                      <a:prstDash val="solid"/>
+                      <a:round/>
+                      <a:headEnd type="none" w="med" len="med"/>
+                      <a:tailEnd type="none" w="med" len="med"/>
+                    </a:lnR>
+                    <a:lnT w="9525" cap="flat" cmpd="sng" algn="ctr">
+                      <a:solidFill>
+                        <a:srgbClr val="CCCCCC"/>
+                      </a:solidFill>
+                      <a:prstDash val="solid"/>
+                      <a:round/>
+                      <a:headEnd type="none" w="med" len="med"/>
+                      <a:tailEnd type="none" w="med" len="med"/>
+                    </a:lnT>
+                    <a:lnB w="9525" cap="flat" cmpd="sng" algn="ctr">
+                      <a:solidFill>
+                        <a:srgbClr val="CCCCCC"/>
+                      </a:solidFill>
+                      <a:prstDash val="solid"/>
+                      <a:round/>
+                      <a:headEnd type="none" w="med" len="med"/>
+                      <a:tailEnd type="none" w="med" len="med"/>
+                    </a:lnB>
+                    <a:solidFill>
+                      <a:srgbClr val="FFFFFF"/>
+                    </a:solidFill>
+                  </a:tcPr>
+                </a:tc>
+                <a:tc>
+                  <a:txBody>
+                    <a:bodyPr/>
+                    <a:lstStyle/>
+                    <a:p>
+                      <a:pPr rtl="0" fontAlgn="b"/>
+                      <a:r>
+                        <a:rPr lang="en-IN" sz="700">
+                          <a:effectLst/>
+                        </a:rPr>
+                        <a:t>Ti team</a:t>
+                      </a:r>
+                    </a:p>
+                  </a:txBody>
+                  <a:tcPr marL="11887" marR="11887" marT="7925" marB="7925" anchor="b">
+                    <a:lnL w="9525" cap="flat" cmpd="sng" algn="ctr">
+                      <a:solidFill>
+                        <a:srgbClr val="CCCCCC"/>
+                      </a:solidFill>
+                      <a:prstDash val="solid"/>
+                      <a:round/>
+                      <a:headEnd type="none" w="med" len="med"/>
+                      <a:tailEnd type="none" w="med" len="med"/>
+                    </a:lnL>
+                    <a:lnR w="9525" cap="flat" cmpd="sng" algn="ctr">
+                      <a:solidFill>
+                        <a:srgbClr val="CCCCCC"/>
+                      </a:solidFill>
+                      <a:prstDash val="solid"/>
+                      <a:round/>
+                      <a:headEnd type="none" w="med" len="med"/>
+                      <a:tailEnd type="none" w="med" len="med"/>
+                    </a:lnR>
+                    <a:lnT w="9525" cap="flat" cmpd="sng" algn="ctr">
+                      <a:solidFill>
+                        <a:srgbClr val="CCCCCC"/>
+                      </a:solidFill>
+                      <a:prstDash val="solid"/>
+                      <a:round/>
+                      <a:headEnd type="none" w="med" len="med"/>
+                      <a:tailEnd type="none" w="med" len="med"/>
+                    </a:lnT>
+                    <a:lnB w="9525" cap="flat" cmpd="sng" algn="ctr">
+                      <a:solidFill>
+                        <a:srgbClr val="CCCCCC"/>
+                      </a:solidFill>
+                      <a:prstDash val="solid"/>
+                      <a:round/>
+                      <a:headEnd type="none" w="med" len="med"/>
+                      <a:tailEnd type="none" w="med" len="med"/>
+                    </a:lnB>
+                    <a:solidFill>
+                      <a:srgbClr val="FFFFFF"/>
+                    </a:solidFill>
+                  </a:tcPr>
+                </a:tc>
+                <a:tc>
+                  <a:txBody>
+                    <a:bodyPr/>
+                    <a:lstStyle/>
+                    <a:p>
+                      <a:pPr rtl="0" fontAlgn="b"/>
+                      <a:endParaRPr lang="en-IN" sz="700">
+                        <a:effectLst/>
+                      </a:endParaRPr>
+                    </a:p>
+                  </a:txBody>
+                  <a:tcPr marL="11887" marR="11887" marT="7925" marB="7925" anchor="b">
+                    <a:lnL w="9525" cap="flat" cmpd="sng" algn="ctr">
+                      <a:solidFill>
+                        <a:srgbClr val="CCCCCC"/>
+                      </a:solidFill>
+                      <a:prstDash val="solid"/>
+                      <a:round/>
+                      <a:headEnd type="none" w="med" len="med"/>
+                      <a:tailEnd type="none" w="med" len="med"/>
+                    </a:lnL>
+                    <a:lnR w="9525" cap="flat" cmpd="sng" algn="ctr">
+                      <a:solidFill>
+                        <a:srgbClr val="CCCCCC"/>
+                      </a:solidFill>
+                      <a:prstDash val="solid"/>
+                      <a:round/>
+                      <a:headEnd type="none" w="med" len="med"/>
+                      <a:tailEnd type="none" w="med" len="med"/>
+                    </a:lnR>
+                    <a:lnT w="9525" cap="flat" cmpd="sng" algn="ctr">
+                      <a:solidFill>
+                        <a:srgbClr val="CCCCCC"/>
+                      </a:solidFill>
+                      <a:prstDash val="solid"/>
+                      <a:round/>
+                      <a:headEnd type="none" w="med" len="med"/>
+                      <a:tailEnd type="none" w="med" len="med"/>
+                    </a:lnT>
+                    <a:lnB w="9525" cap="flat" cmpd="sng" algn="ctr">
+                      <a:solidFill>
+                        <a:srgbClr val="CCCCCC"/>
+                      </a:solidFill>
+                      <a:prstDash val="solid"/>
+                      <a:round/>
+                      <a:headEnd type="none" w="med" len="med"/>
+                      <a:tailEnd type="none" w="med" len="med"/>
+                    </a:lnB>
+                    <a:solidFill>
+                      <a:srgbClr val="FFFFFF"/>
+                    </a:solidFill>
+                  </a:tcPr>
+                </a:tc>
+                <a:tc>
+                  <a:txBody>
+                    <a:bodyPr/>
+                    <a:lstStyle/>
+                    <a:p>
+                      <a:pPr rtl="0" fontAlgn="b"/>
+                      <a:r>
+                        <a:rPr lang="en-IN" sz="700" dirty="0">
+                          <a:effectLst/>
+                        </a:rPr>
+                        <a:t>INT</a:t>
+                      </a:r>
+                    </a:p>
+                  </a:txBody>
+                  <a:tcPr marL="11887" marR="11887" marT="7925" marB="7925" anchor="b">
+                    <a:lnL w="9525" cap="flat" cmpd="sng" algn="ctr">
+                      <a:solidFill>
+                        <a:srgbClr val="CCCCCC"/>
+                      </a:solidFill>
+                      <a:prstDash val="solid"/>
+                      <a:round/>
+                      <a:headEnd type="none" w="med" len="med"/>
+                      <a:tailEnd type="none" w="med" len="med"/>
+                    </a:lnL>
+                    <a:lnR w="9525" cap="flat" cmpd="sng" algn="ctr">
+                      <a:solidFill>
+                        <a:srgbClr val="CCCCCC"/>
+                      </a:solidFill>
+                      <a:prstDash val="solid"/>
+                      <a:round/>
+                      <a:headEnd type="none" w="med" len="med"/>
+                      <a:tailEnd type="none" w="med" len="med"/>
+                    </a:lnR>
+                    <a:lnT w="9525" cap="flat" cmpd="sng" algn="ctr">
+                      <a:solidFill>
+                        <a:srgbClr val="CCCCCC"/>
+                      </a:solidFill>
+                      <a:prstDash val="solid"/>
+                      <a:round/>
+                      <a:headEnd type="none" w="med" len="med"/>
+                      <a:tailEnd type="none" w="med" len="med"/>
+                    </a:lnT>
+                    <a:lnB w="9525" cap="flat" cmpd="sng" algn="ctr">
+                      <a:solidFill>
+                        <a:srgbClr val="CCCCCC"/>
+                      </a:solidFill>
+                      <a:prstDash val="solid"/>
+                      <a:round/>
+                      <a:headEnd type="none" w="med" len="med"/>
+                      <a:tailEnd type="none" w="med" len="med"/>
+                    </a:lnB>
+                    <a:solidFill>
+                      <a:srgbClr val="FFFFFF"/>
+                    </a:solidFill>
+                  </a:tcPr>
+                </a:tc>
+              </a:tr>
+              <a:tr h="477736">
+                <a:tc>
+                  <a:txBody>
+                    <a:bodyPr/>
+                    <a:lstStyle/>
+                    <a:p>
+                      <a:pPr algn="r" rtl="0" fontAlgn="b"/>
+                      <a:r>
+                        <a:rPr lang="en-IN" sz="700">
+                          <a:effectLst/>
+                        </a:rPr>
+                        <a:t>5/20/2022 9:23:25</a:t>
+                      </a:r>
+                    </a:p>
+                  </a:txBody>
+                  <a:tcPr marL="11887" marR="11887" marT="7925" marB="7925" anchor="b">
+                    <a:lnL w="9525" cap="flat" cmpd="sng" algn="ctr">
+                      <a:solidFill>
+                        <a:srgbClr val="CCCCCC"/>
+                      </a:solidFill>
+                      <a:prstDash val="solid"/>
+                      <a:round/>
+                      <a:headEnd type="none" w="med" len="med"/>
+                      <a:tailEnd type="none" w="med" len="med"/>
+                    </a:lnL>
+                    <a:lnR w="9525" cap="flat" cmpd="sng" algn="ctr">
+                      <a:solidFill>
+                        <a:srgbClr val="CCCCCC"/>
+                      </a:solidFill>
+                      <a:prstDash val="solid"/>
+                      <a:round/>
+                      <a:headEnd type="none" w="med" len="med"/>
+                      <a:tailEnd type="none" w="med" len="med"/>
+                    </a:lnR>
+                    <a:lnT w="9525" cap="flat" cmpd="sng" algn="ctr">
+                      <a:solidFill>
+                        <a:srgbClr val="CCCCCC"/>
+                      </a:solidFill>
+                      <a:prstDash val="solid"/>
+                      <a:round/>
+                      <a:headEnd type="none" w="med" len="med"/>
+                      <a:tailEnd type="none" w="med" len="med"/>
+                    </a:lnT>
+                    <a:lnB w="9525" cap="flat" cmpd="sng" algn="ctr">
+                      <a:solidFill>
+                        <a:srgbClr val="CCCCCC"/>
+                      </a:solidFill>
+                      <a:prstDash val="solid"/>
+                      <a:round/>
+                      <a:headEnd type="none" w="med" len="med"/>
+                      <a:tailEnd type="none" w="med" len="med"/>
+                    </a:lnB>
+                    <a:solidFill>
+                      <a:srgbClr val="F3F3F3"/>
+                    </a:solidFill>
+                  </a:tcPr>
+                </a:tc>
+                <a:tc>
+                  <a:txBody>
+                    <a:bodyPr/>
+                    <a:lstStyle/>
+                    <a:p>
+                      <a:pPr rtl="0" fontAlgn="b"/>
+                      <a:r>
+                        <a:rPr lang="en-IN" sz="700">
+                          <a:effectLst/>
+                        </a:rPr>
+                        <a:t>deepesh.jain@genusinnovation.com</a:t>
+                      </a:r>
+                    </a:p>
+                  </a:txBody>
+                  <a:tcPr marL="11887" marR="11887" marT="7925" marB="7925" anchor="b">
+                    <a:lnL w="9525" cap="flat" cmpd="sng" algn="ctr">
+                      <a:solidFill>
+                        <a:srgbClr val="CCCCCC"/>
+                      </a:solidFill>
+                      <a:prstDash val="solid"/>
+                      <a:round/>
+                      <a:headEnd type="none" w="med" len="med"/>
+                      <a:tailEnd type="none" w="med" len="med"/>
+                    </a:lnL>
+                    <a:lnR w="9525" cap="flat" cmpd="sng" algn="ctr">
+                      <a:solidFill>
+                        <a:srgbClr val="CCCCCC"/>
+                      </a:solidFill>
+                      <a:prstDash val="solid"/>
+                      <a:round/>
+                      <a:headEnd type="none" w="med" len="med"/>
+                      <a:tailEnd type="none" w="med" len="med"/>
+                    </a:lnR>
+                    <a:lnT w="9525" cap="flat" cmpd="sng" algn="ctr">
+                      <a:solidFill>
+                        <a:srgbClr val="CCCCCC"/>
+                      </a:solidFill>
+                      <a:prstDash val="solid"/>
+                      <a:round/>
+                      <a:headEnd type="none" w="med" len="med"/>
+                      <a:tailEnd type="none" w="med" len="med"/>
+                    </a:lnT>
+                    <a:lnB w="9525" cap="flat" cmpd="sng" algn="ctr">
+                      <a:solidFill>
+                        <a:srgbClr val="CCCCCC"/>
+                      </a:solidFill>
+                      <a:prstDash val="solid"/>
+                      <a:round/>
+                      <a:headEnd type="none" w="med" len="med"/>
+                      <a:tailEnd type="none" w="med" len="med"/>
+                    </a:lnB>
+                    <a:solidFill>
+                      <a:srgbClr val="F3F3F3"/>
+                    </a:solidFill>
+                  </a:tcPr>
+                </a:tc>
+                <a:tc>
+                  <a:txBody>
+                    <a:bodyPr/>
+                    <a:lstStyle/>
+                    <a:p>
+                      <a:pPr rtl="0" fontAlgn="b"/>
+                      <a:r>
+                        <a:rPr lang="en-IN" sz="700">
+                          <a:effectLst/>
+                        </a:rPr>
+                        <a:t>Ext-001 Training on Buck &amp; boost technology by TI</a:t>
+                      </a:r>
+                    </a:p>
+                  </a:txBody>
+                  <a:tcPr marL="11887" marR="11887" marT="7925" marB="7925" anchor="b">
+                    <a:lnL w="9525" cap="flat" cmpd="sng" algn="ctr">
+                      <a:solidFill>
+                        <a:srgbClr val="CCCCCC"/>
+                      </a:solidFill>
+                      <a:prstDash val="solid"/>
+                      <a:round/>
+                      <a:headEnd type="none" w="med" len="med"/>
+                      <a:tailEnd type="none" w="med" len="med"/>
+                    </a:lnL>
+                    <a:lnR w="9525" cap="flat" cmpd="sng" algn="ctr">
+                      <a:solidFill>
+                        <a:srgbClr val="CCCCCC"/>
+                      </a:solidFill>
+                      <a:prstDash val="solid"/>
+                      <a:round/>
+                      <a:headEnd type="none" w="med" len="med"/>
+                      <a:tailEnd type="none" w="med" len="med"/>
+                    </a:lnR>
+                    <a:lnT w="9525" cap="flat" cmpd="sng" algn="ctr">
+                      <a:solidFill>
+                        <a:srgbClr val="CCCCCC"/>
+                      </a:solidFill>
+                      <a:prstDash val="solid"/>
+                      <a:round/>
+                      <a:headEnd type="none" w="med" len="med"/>
+                      <a:tailEnd type="none" w="med" len="med"/>
+                    </a:lnT>
+                    <a:lnB w="9525" cap="flat" cmpd="sng" algn="ctr">
+                      <a:solidFill>
+                        <a:srgbClr val="CCCCCC"/>
+                      </a:solidFill>
+                      <a:prstDash val="solid"/>
+                      <a:round/>
+                      <a:headEnd type="none" w="med" len="med"/>
+                      <a:tailEnd type="none" w="med" len="med"/>
+                    </a:lnB>
+                    <a:solidFill>
+                      <a:srgbClr val="F3F3F3"/>
+                    </a:solidFill>
+                  </a:tcPr>
+                </a:tc>
+                <a:tc>
+                  <a:txBody>
+                    <a:bodyPr/>
+                    <a:lstStyle/>
+                    <a:p>
+                      <a:pPr rtl="0" fontAlgn="b"/>
+                      <a:r>
+                        <a:rPr lang="en-IN" sz="700">
+                          <a:effectLst/>
+                        </a:rPr>
+                        <a:t>deepesh jain</a:t>
+                      </a:r>
+                    </a:p>
+                  </a:txBody>
+                  <a:tcPr marL="11887" marR="11887" marT="7925" marB="7925" anchor="b">
+                    <a:lnL w="9525" cap="flat" cmpd="sng" algn="ctr">
+                      <a:solidFill>
+                        <a:srgbClr val="CCCCCC"/>
+                      </a:solidFill>
+                      <a:prstDash val="solid"/>
+                      <a:round/>
+                      <a:headEnd type="none" w="med" len="med"/>
+                      <a:tailEnd type="none" w="med" len="med"/>
+                    </a:lnL>
+                    <a:lnR w="9525" cap="flat" cmpd="sng" algn="ctr">
+                      <a:solidFill>
+                        <a:srgbClr val="CCCCCC"/>
+                      </a:solidFill>
+                      <a:prstDash val="solid"/>
+                      <a:round/>
+                      <a:headEnd type="none" w="med" len="med"/>
+                      <a:tailEnd type="none" w="med" len="med"/>
+                    </a:lnR>
+                    <a:lnT w="9525" cap="flat" cmpd="sng" algn="ctr">
+                      <a:solidFill>
+                        <a:srgbClr val="CCCCCC"/>
+                      </a:solidFill>
+                      <a:prstDash val="solid"/>
+                      <a:round/>
+                      <a:headEnd type="none" w="med" len="med"/>
+                      <a:tailEnd type="none" w="med" len="med"/>
+                    </a:lnT>
+                    <a:lnB w="9525" cap="flat" cmpd="sng" algn="ctr">
+                      <a:solidFill>
+                        <a:srgbClr val="CCCCCC"/>
+                      </a:solidFill>
+                      <a:prstDash val="solid"/>
+                      <a:round/>
+                      <a:headEnd type="none" w="med" len="med"/>
+                      <a:tailEnd type="none" w="med" len="med"/>
+                    </a:lnB>
+                    <a:solidFill>
+                      <a:srgbClr val="F3F3F3"/>
+                    </a:solidFill>
+                  </a:tcPr>
+                </a:tc>
+                <a:tc>
+                  <a:txBody>
+                    <a:bodyPr/>
+                    <a:lstStyle/>
+                    <a:p>
+                      <a:pPr algn="r" rtl="0" fontAlgn="b"/>
+                      <a:r>
+                        <a:rPr lang="en-IN" sz="700">
+                          <a:effectLst/>
+                        </a:rPr>
+                        <a:t>14191</a:t>
+                      </a:r>
+                    </a:p>
+                  </a:txBody>
+                  <a:tcPr marL="11887" marR="11887" marT="7925" marB="7925" anchor="b">
+                    <a:lnL w="9525" cap="flat" cmpd="sng" algn="ctr">
+                      <a:solidFill>
+                        <a:srgbClr val="CCCCCC"/>
+                      </a:solidFill>
+                      <a:prstDash val="solid"/>
+                      <a:round/>
+                      <a:headEnd type="none" w="med" len="med"/>
+                      <a:tailEnd type="none" w="med" len="med"/>
+                    </a:lnL>
+                    <a:lnR w="9525" cap="flat" cmpd="sng" algn="ctr">
+                      <a:solidFill>
+                        <a:srgbClr val="CCCCCC"/>
+                      </a:solidFill>
+                      <a:prstDash val="solid"/>
+                      <a:round/>
+                      <a:headEnd type="none" w="med" len="med"/>
+                      <a:tailEnd type="none" w="med" len="med"/>
+                    </a:lnR>
+                    <a:lnT w="9525" cap="flat" cmpd="sng" algn="ctr">
+                      <a:solidFill>
+                        <a:srgbClr val="CCCCCC"/>
+                      </a:solidFill>
+                      <a:prstDash val="solid"/>
+                      <a:round/>
+                      <a:headEnd type="none" w="med" len="med"/>
+                      <a:tailEnd type="none" w="med" len="med"/>
+                    </a:lnT>
+                    <a:lnB w="9525" cap="flat" cmpd="sng" algn="ctr">
+                      <a:solidFill>
+                        <a:srgbClr val="CCCCCC"/>
+                      </a:solidFill>
+                      <a:prstDash val="solid"/>
+                      <a:round/>
+                      <a:headEnd type="none" w="med" len="med"/>
+                      <a:tailEnd type="none" w="med" len="med"/>
+                    </a:lnB>
+                    <a:solidFill>
+                      <a:srgbClr val="F3F3F3"/>
+                    </a:solidFill>
+                  </a:tcPr>
+                </a:tc>
+                <a:tc>
+                  <a:txBody>
+                    <a:bodyPr/>
+                    <a:lstStyle/>
+                    <a:p>
+                      <a:pPr rtl="0" fontAlgn="b"/>
+                      <a:r>
+                        <a:rPr lang="en-IN" sz="700">
+                          <a:effectLst/>
+                        </a:rPr>
+                        <a:t>Dy. Manager</a:t>
+                      </a:r>
+                    </a:p>
+                  </a:txBody>
+                  <a:tcPr marL="11887" marR="11887" marT="7925" marB="7925" anchor="b">
+                    <a:lnL w="9525" cap="flat" cmpd="sng" algn="ctr">
+                      <a:solidFill>
+                        <a:srgbClr val="CCCCCC"/>
+                      </a:solidFill>
+                      <a:prstDash val="solid"/>
+                      <a:round/>
+                      <a:headEnd type="none" w="med" len="med"/>
+                      <a:tailEnd type="none" w="med" len="med"/>
+                    </a:lnL>
+                    <a:lnR w="9525" cap="flat" cmpd="sng" algn="ctr">
+                      <a:solidFill>
+                        <a:srgbClr val="CCCCCC"/>
+                      </a:solidFill>
+                      <a:prstDash val="solid"/>
+                      <a:round/>
+                      <a:headEnd type="none" w="med" len="med"/>
+                      <a:tailEnd type="none" w="med" len="med"/>
+                    </a:lnR>
+                    <a:lnT w="9525" cap="flat" cmpd="sng" algn="ctr">
+                      <a:solidFill>
+                        <a:srgbClr val="CCCCCC"/>
+                      </a:solidFill>
+                      <a:prstDash val="solid"/>
+                      <a:round/>
+                      <a:headEnd type="none" w="med" len="med"/>
+                      <a:tailEnd type="none" w="med" len="med"/>
+                    </a:lnT>
+                    <a:lnB w="9525" cap="flat" cmpd="sng" algn="ctr">
+                      <a:solidFill>
+                        <a:srgbClr val="CCCCCC"/>
+                      </a:solidFill>
+                      <a:prstDash val="solid"/>
+                      <a:round/>
+                      <a:headEnd type="none" w="med" len="med"/>
+                      <a:tailEnd type="none" w="med" len="med"/>
+                    </a:lnB>
+                    <a:solidFill>
+                      <a:srgbClr val="F3F3F3"/>
+                    </a:solidFill>
+                  </a:tcPr>
+                </a:tc>
+                <a:tc>
+                  <a:txBody>
+                    <a:bodyPr/>
+                    <a:lstStyle/>
+                    <a:p>
+                      <a:pPr algn="r" rtl="0" fontAlgn="b"/>
+                      <a:r>
+                        <a:rPr lang="en-IN" sz="700">
+                          <a:effectLst/>
+                        </a:rPr>
+                        <a:t>2</a:t>
+                      </a:r>
+                    </a:p>
+                  </a:txBody>
+                  <a:tcPr marL="11887" marR="11887" marT="7925" marB="7925" anchor="b">
+                    <a:lnL w="9525" cap="flat" cmpd="sng" algn="ctr">
+                      <a:solidFill>
+                        <a:srgbClr val="CCCCCC"/>
+                      </a:solidFill>
+                      <a:prstDash val="solid"/>
+                      <a:round/>
+                      <a:headEnd type="none" w="med" len="med"/>
+                      <a:tailEnd type="none" w="med" len="med"/>
+                    </a:lnL>
+                    <a:lnR w="9525" cap="flat" cmpd="sng" algn="ctr">
+                      <a:solidFill>
+                        <a:srgbClr val="CCCCCC"/>
+                      </a:solidFill>
+                      <a:prstDash val="solid"/>
+                      <a:round/>
+                      <a:headEnd type="none" w="med" len="med"/>
+                      <a:tailEnd type="none" w="med" len="med"/>
+                    </a:lnR>
+                    <a:lnT w="9525" cap="flat" cmpd="sng" algn="ctr">
+                      <a:solidFill>
+                        <a:srgbClr val="CCCCCC"/>
+                      </a:solidFill>
+                      <a:prstDash val="solid"/>
+                      <a:round/>
+                      <a:headEnd type="none" w="med" len="med"/>
+                      <a:tailEnd type="none" w="med" len="med"/>
+                    </a:lnT>
+                    <a:lnB w="9525" cap="flat" cmpd="sng" algn="ctr">
+                      <a:solidFill>
+                        <a:srgbClr val="CCCCCC"/>
+                      </a:solidFill>
+                      <a:prstDash val="solid"/>
+                      <a:round/>
+                      <a:headEnd type="none" w="med" len="med"/>
+                      <a:tailEnd type="none" w="med" len="med"/>
+                    </a:lnB>
+                    <a:solidFill>
+                      <a:srgbClr val="F3F3F3"/>
+                    </a:solidFill>
+                  </a:tcPr>
+                </a:tc>
+                <a:tc>
+                  <a:txBody>
+                    <a:bodyPr/>
+                    <a:lstStyle/>
+                    <a:p>
+                      <a:pPr algn="r" rtl="0" fontAlgn="b"/>
+                      <a:r>
+                        <a:rPr lang="en-IN" sz="700">
+                          <a:effectLst/>
+                        </a:rPr>
+                        <a:t>4</a:t>
+                      </a:r>
+                    </a:p>
+                  </a:txBody>
+                  <a:tcPr marL="11887" marR="11887" marT="7925" marB="7925" anchor="b">
+                    <a:lnL w="9525" cap="flat" cmpd="sng" algn="ctr">
+                      <a:solidFill>
+                        <a:srgbClr val="CCCCCC"/>
+                      </a:solidFill>
+                      <a:prstDash val="solid"/>
+                      <a:round/>
+                      <a:headEnd type="none" w="med" len="med"/>
+                      <a:tailEnd type="none" w="med" len="med"/>
+                    </a:lnL>
+                    <a:lnR w="9525" cap="flat" cmpd="sng" algn="ctr">
+                      <a:solidFill>
+                        <a:srgbClr val="CCCCCC"/>
+                      </a:solidFill>
+                      <a:prstDash val="solid"/>
+                      <a:round/>
+                      <a:headEnd type="none" w="med" len="med"/>
+                      <a:tailEnd type="none" w="med" len="med"/>
+                    </a:lnR>
+                    <a:lnT w="9525" cap="flat" cmpd="sng" algn="ctr">
+                      <a:solidFill>
+                        <a:srgbClr val="CCCCCC"/>
+                      </a:solidFill>
+                      <a:prstDash val="solid"/>
+                      <a:round/>
+                      <a:headEnd type="none" w="med" len="med"/>
+                      <a:tailEnd type="none" w="med" len="med"/>
+                    </a:lnT>
+                    <a:lnB w="9525" cap="flat" cmpd="sng" algn="ctr">
+                      <a:solidFill>
+                        <a:srgbClr val="CCCCCC"/>
+                      </a:solidFill>
+                      <a:prstDash val="solid"/>
+                      <a:round/>
+                      <a:headEnd type="none" w="med" len="med"/>
+                      <a:tailEnd type="none" w="med" len="med"/>
+                    </a:lnB>
+                    <a:solidFill>
+                      <a:srgbClr val="F3F3F3"/>
+                    </a:solidFill>
+                  </a:tcPr>
+                </a:tc>
+                <a:tc>
+                  <a:txBody>
+                    <a:bodyPr/>
+                    <a:lstStyle/>
+                    <a:p>
+                      <a:pPr algn="r" rtl="0" fontAlgn="b"/>
+                      <a:r>
+                        <a:rPr lang="en-IN" sz="700">
+                          <a:effectLst/>
+                        </a:rPr>
+                        <a:t>4</a:t>
+                      </a:r>
+                    </a:p>
+                  </a:txBody>
+                  <a:tcPr marL="11887" marR="11887" marT="7925" marB="7925" anchor="b">
+                    <a:lnL w="9525" cap="flat" cmpd="sng" algn="ctr">
+                      <a:solidFill>
+                        <a:srgbClr val="CCCCCC"/>
+                      </a:solidFill>
+                      <a:prstDash val="solid"/>
+                      <a:round/>
+                      <a:headEnd type="none" w="med" len="med"/>
+                      <a:tailEnd type="none" w="med" len="med"/>
+                    </a:lnL>
+                    <a:lnR w="9525" cap="flat" cmpd="sng" algn="ctr">
+                      <a:solidFill>
+                        <a:srgbClr val="CCCCCC"/>
+                      </a:solidFill>
+                      <a:prstDash val="solid"/>
+                      <a:round/>
+                      <a:headEnd type="none" w="med" len="med"/>
+                      <a:tailEnd type="none" w="med" len="med"/>
+                    </a:lnR>
+                    <a:lnT w="9525" cap="flat" cmpd="sng" algn="ctr">
+                      <a:solidFill>
+                        <a:srgbClr val="CCCCCC"/>
+                      </a:solidFill>
+                      <a:prstDash val="solid"/>
+                      <a:round/>
+                      <a:headEnd type="none" w="med" len="med"/>
+                      <a:tailEnd type="none" w="med" len="med"/>
+                    </a:lnT>
+                    <a:lnB w="9525" cap="flat" cmpd="sng" algn="ctr">
+                      <a:solidFill>
+                        <a:srgbClr val="CCCCCC"/>
+                      </a:solidFill>
+                      <a:prstDash val="solid"/>
+                      <a:round/>
+                      <a:headEnd type="none" w="med" len="med"/>
+                      <a:tailEnd type="none" w="med" len="med"/>
+                    </a:lnB>
+                    <a:solidFill>
+                      <a:srgbClr val="F3F3F3"/>
+                    </a:solidFill>
+                  </a:tcPr>
+                </a:tc>
+                <a:tc>
+                  <a:txBody>
+                    <a:bodyPr/>
+                    <a:lstStyle/>
+                    <a:p>
+                      <a:pPr algn="r" rtl="0" fontAlgn="b"/>
+                      <a:r>
+                        <a:rPr lang="en-IN" sz="700">
+                          <a:effectLst/>
+                        </a:rPr>
+                        <a:t>9</a:t>
+                      </a:r>
+                    </a:p>
+                  </a:txBody>
+                  <a:tcPr marL="11887" marR="11887" marT="7925" marB="7925" anchor="b">
+                    <a:lnL w="9525" cap="flat" cmpd="sng" algn="ctr">
+                      <a:solidFill>
+                        <a:srgbClr val="CCCCCC"/>
+                      </a:solidFill>
+                      <a:prstDash val="solid"/>
+                      <a:round/>
+                      <a:headEnd type="none" w="med" len="med"/>
+                      <a:tailEnd type="none" w="med" len="med"/>
+                    </a:lnL>
+                    <a:lnR w="9525" cap="flat" cmpd="sng" algn="ctr">
+                      <a:solidFill>
+                        <a:srgbClr val="CCCCCC"/>
+                      </a:solidFill>
+                      <a:prstDash val="solid"/>
+                      <a:round/>
+                      <a:headEnd type="none" w="med" len="med"/>
+                      <a:tailEnd type="none" w="med" len="med"/>
+                    </a:lnR>
+                    <a:lnT w="9525" cap="flat" cmpd="sng" algn="ctr">
+                      <a:solidFill>
+                        <a:srgbClr val="CCCCCC"/>
+                      </a:solidFill>
+                      <a:prstDash val="solid"/>
+                      <a:round/>
+                      <a:headEnd type="none" w="med" len="med"/>
+                      <a:tailEnd type="none" w="med" len="med"/>
+                    </a:lnT>
+                    <a:lnB w="9525" cap="flat" cmpd="sng" algn="ctr">
+                      <a:solidFill>
+                        <a:srgbClr val="CCCCCC"/>
+                      </a:solidFill>
+                      <a:prstDash val="solid"/>
+                      <a:round/>
+                      <a:headEnd type="none" w="med" len="med"/>
+                      <a:tailEnd type="none" w="med" len="med"/>
+                    </a:lnB>
+                    <a:solidFill>
+                      <a:srgbClr val="F3F3F3"/>
+                    </a:solidFill>
+                  </a:tcPr>
+                </a:tc>
+                <a:tc>
+                  <a:txBody>
+                    <a:bodyPr/>
+                    <a:lstStyle/>
+                    <a:p>
+                      <a:pPr algn="r" rtl="0" fontAlgn="b"/>
+                      <a:r>
+                        <a:rPr lang="en-IN" sz="700" dirty="0">
+                          <a:effectLst/>
+                        </a:rPr>
+                        <a:t>9</a:t>
+                      </a:r>
+                    </a:p>
+                  </a:txBody>
+                  <a:tcPr marL="11887" marR="11887" marT="7925" marB="7925" anchor="b">
+                    <a:lnL w="9525" cap="flat" cmpd="sng" algn="ctr">
+                      <a:solidFill>
+                        <a:srgbClr val="CCCCCC"/>
+                      </a:solidFill>
+                      <a:prstDash val="solid"/>
+                      <a:round/>
+                      <a:headEnd type="none" w="med" len="med"/>
+                      <a:tailEnd type="none" w="med" len="med"/>
+                    </a:lnL>
+                    <a:lnR w="9525" cap="flat" cmpd="sng" algn="ctr">
+                      <a:solidFill>
+                        <a:srgbClr val="CCCCCC"/>
+                      </a:solidFill>
+                      <a:prstDash val="solid"/>
+                      <a:round/>
+                      <a:headEnd type="none" w="med" len="med"/>
+                      <a:tailEnd type="none" w="med" len="med"/>
+                    </a:lnR>
+                    <a:lnT w="9525" cap="flat" cmpd="sng" algn="ctr">
+                      <a:solidFill>
+                        <a:srgbClr val="CCCCCC"/>
+                      </a:solidFill>
+                      <a:prstDash val="solid"/>
+                      <a:round/>
+                      <a:headEnd type="none" w="med" len="med"/>
+                      <a:tailEnd type="none" w="med" len="med"/>
+                    </a:lnT>
+                    <a:lnB w="9525" cap="flat" cmpd="sng" algn="ctr">
+                      <a:solidFill>
+                        <a:srgbClr val="CCCCCC"/>
+                      </a:solidFill>
+                      <a:prstDash val="solid"/>
+                      <a:round/>
+                      <a:headEnd type="none" w="med" len="med"/>
+                      <a:tailEnd type="none" w="med" len="med"/>
+                    </a:lnB>
+                    <a:solidFill>
+                      <a:srgbClr val="F3F3F3"/>
+                    </a:solidFill>
+                  </a:tcPr>
+                </a:tc>
+                <a:tc>
+                  <a:txBody>
+                    <a:bodyPr/>
+                    <a:lstStyle/>
+                    <a:p>
+                      <a:pPr algn="r" rtl="0" fontAlgn="b"/>
+                      <a:r>
+                        <a:rPr lang="en-IN" sz="700">
+                          <a:effectLst/>
+                        </a:rPr>
+                        <a:t>9</a:t>
+                      </a:r>
+                    </a:p>
+                  </a:txBody>
+                  <a:tcPr marL="11887" marR="11887" marT="7925" marB="7925" anchor="b">
+                    <a:lnL w="9525" cap="flat" cmpd="sng" algn="ctr">
+                      <a:solidFill>
+                        <a:srgbClr val="CCCCCC"/>
+                      </a:solidFill>
+                      <a:prstDash val="solid"/>
+                      <a:round/>
+                      <a:headEnd type="none" w="med" len="med"/>
+                      <a:tailEnd type="none" w="med" len="med"/>
+                    </a:lnL>
+                    <a:lnR w="9525" cap="flat" cmpd="sng" algn="ctr">
+                      <a:solidFill>
+                        <a:srgbClr val="CCCCCC"/>
+                      </a:solidFill>
+                      <a:prstDash val="solid"/>
+                      <a:round/>
+                      <a:headEnd type="none" w="med" len="med"/>
+                      <a:tailEnd type="none" w="med" len="med"/>
+                    </a:lnR>
+                    <a:lnT w="9525" cap="flat" cmpd="sng" algn="ctr">
+                      <a:solidFill>
+                        <a:srgbClr val="CCCCCC"/>
+                      </a:solidFill>
+                      <a:prstDash val="solid"/>
+                      <a:round/>
+                      <a:headEnd type="none" w="med" len="med"/>
+                      <a:tailEnd type="none" w="med" len="med"/>
+                    </a:lnT>
+                    <a:lnB w="9525" cap="flat" cmpd="sng" algn="ctr">
+                      <a:solidFill>
+                        <a:srgbClr val="CCCCCC"/>
+                      </a:solidFill>
+                      <a:prstDash val="solid"/>
+                      <a:round/>
+                      <a:headEnd type="none" w="med" len="med"/>
+                      <a:tailEnd type="none" w="med" len="med"/>
+                    </a:lnB>
+                    <a:solidFill>
+                      <a:srgbClr val="F3F3F3"/>
+                    </a:solidFill>
+                  </a:tcPr>
+                </a:tc>
+                <a:tc>
+                  <a:txBody>
+                    <a:bodyPr/>
+                    <a:lstStyle/>
+                    <a:p>
+                      <a:pPr algn="r" rtl="0" fontAlgn="b"/>
+                      <a:r>
+                        <a:rPr lang="en-IN" sz="700">
+                          <a:effectLst/>
+                        </a:rPr>
+                        <a:t>9</a:t>
+                      </a:r>
+                    </a:p>
+                  </a:txBody>
+                  <a:tcPr marL="11887" marR="11887" marT="7925" marB="7925" anchor="b">
+                    <a:lnL w="9525" cap="flat" cmpd="sng" algn="ctr">
+                      <a:solidFill>
+                        <a:srgbClr val="CCCCCC"/>
+                      </a:solidFill>
+                      <a:prstDash val="solid"/>
+                      <a:round/>
+                      <a:headEnd type="none" w="med" len="med"/>
+                      <a:tailEnd type="none" w="med" len="med"/>
+                    </a:lnL>
+                    <a:lnR w="9525" cap="flat" cmpd="sng" algn="ctr">
+                      <a:solidFill>
+                        <a:srgbClr val="CCCCCC"/>
+                      </a:solidFill>
+                      <a:prstDash val="solid"/>
+                      <a:round/>
+                      <a:headEnd type="none" w="med" len="med"/>
+                      <a:tailEnd type="none" w="med" len="med"/>
+                    </a:lnR>
+                    <a:lnT w="9525" cap="flat" cmpd="sng" algn="ctr">
+                      <a:solidFill>
+                        <a:srgbClr val="CCCCCC"/>
+                      </a:solidFill>
+                      <a:prstDash val="solid"/>
+                      <a:round/>
+                      <a:headEnd type="none" w="med" len="med"/>
+                      <a:tailEnd type="none" w="med" len="med"/>
+                    </a:lnT>
+                    <a:lnB w="9525" cap="flat" cmpd="sng" algn="ctr">
+                      <a:solidFill>
+                        <a:srgbClr val="CCCCCC"/>
+                      </a:solidFill>
+                      <a:prstDash val="solid"/>
+                      <a:round/>
+                      <a:headEnd type="none" w="med" len="med"/>
+                      <a:tailEnd type="none" w="med" len="med"/>
+                    </a:lnB>
+                    <a:solidFill>
+                      <a:srgbClr val="F3F3F3"/>
+                    </a:solidFill>
+                  </a:tcPr>
+                </a:tc>
+                <a:tc>
+                  <a:txBody>
+                    <a:bodyPr/>
+                    <a:lstStyle/>
+                    <a:p>
+                      <a:pPr algn="ctr" rtl="0" fontAlgn="b"/>
+                      <a:r>
+                        <a:rPr lang="en-IN" sz="700">
+                          <a:effectLst/>
+                        </a:rPr>
+                        <a:t>7</a:t>
+                      </a:r>
+                    </a:p>
+                  </a:txBody>
+                  <a:tcPr marL="11887" marR="11887" marT="7925" marB="7925" anchor="b">
+                    <a:lnL w="9525" cap="flat" cmpd="sng" algn="ctr">
+                      <a:solidFill>
+                        <a:srgbClr val="CCCCCC"/>
+                      </a:solidFill>
+                      <a:prstDash val="solid"/>
+                      <a:round/>
+                      <a:headEnd type="none" w="med" len="med"/>
+                      <a:tailEnd type="none" w="med" len="med"/>
+                    </a:lnL>
+                    <a:lnR w="9525" cap="flat" cmpd="sng" algn="ctr">
+                      <a:solidFill>
+                        <a:srgbClr val="CCCCCC"/>
+                      </a:solidFill>
+                      <a:prstDash val="solid"/>
+                      <a:round/>
+                      <a:headEnd type="none" w="med" len="med"/>
+                      <a:tailEnd type="none" w="med" len="med"/>
+                    </a:lnR>
+                    <a:lnT w="9525" cap="flat" cmpd="sng" algn="ctr">
+                      <a:solidFill>
+                        <a:srgbClr val="CCCCCC"/>
+                      </a:solidFill>
+                      <a:prstDash val="solid"/>
+                      <a:round/>
+                      <a:headEnd type="none" w="med" len="med"/>
+                      <a:tailEnd type="none" w="med" len="med"/>
+                    </a:lnT>
+                    <a:lnB w="9525" cap="flat" cmpd="sng" algn="ctr">
+                      <a:solidFill>
+                        <a:srgbClr val="CCCCCC"/>
+                      </a:solidFill>
+                      <a:prstDash val="solid"/>
+                      <a:round/>
+                      <a:headEnd type="none" w="med" len="med"/>
+                      <a:tailEnd type="none" w="med" len="med"/>
+                    </a:lnB>
+                    <a:solidFill>
+                      <a:srgbClr val="F3F3F3"/>
+                    </a:solidFill>
+                  </a:tcPr>
+                </a:tc>
+                <a:tc>
+                  <a:txBody>
+                    <a:bodyPr/>
+                    <a:lstStyle/>
+                    <a:p>
+                      <a:pPr rtl="0" fontAlgn="b"/>
+                      <a:r>
+                        <a:rPr lang="en-IN" sz="700">
+                          <a:effectLst/>
+                        </a:rPr>
+                        <a:t>NEW upcoming part knowledge</a:t>
+                      </a:r>
+                    </a:p>
+                  </a:txBody>
+                  <a:tcPr marL="11887" marR="11887" marT="7925" marB="7925" anchor="b">
+                    <a:lnL w="9525" cap="flat" cmpd="sng" algn="ctr">
+                      <a:solidFill>
+                        <a:srgbClr val="CCCCCC"/>
+                      </a:solidFill>
+                      <a:prstDash val="solid"/>
+                      <a:round/>
+                      <a:headEnd type="none" w="med" len="med"/>
+                      <a:tailEnd type="none" w="med" len="med"/>
+                    </a:lnL>
+                    <a:lnR w="9525" cap="flat" cmpd="sng" algn="ctr">
+                      <a:solidFill>
+                        <a:srgbClr val="CCCCCC"/>
+                      </a:solidFill>
+                      <a:prstDash val="solid"/>
+                      <a:round/>
+                      <a:headEnd type="none" w="med" len="med"/>
+                      <a:tailEnd type="none" w="med" len="med"/>
+                    </a:lnR>
+                    <a:lnT w="9525" cap="flat" cmpd="sng" algn="ctr">
+                      <a:solidFill>
+                        <a:srgbClr val="CCCCCC"/>
+                      </a:solidFill>
+                      <a:prstDash val="solid"/>
+                      <a:round/>
+                      <a:headEnd type="none" w="med" len="med"/>
+                      <a:tailEnd type="none" w="med" len="med"/>
+                    </a:lnT>
+                    <a:lnB w="9525" cap="flat" cmpd="sng" algn="ctr">
+                      <a:solidFill>
+                        <a:srgbClr val="CCCCCC"/>
+                      </a:solidFill>
+                      <a:prstDash val="solid"/>
+                      <a:round/>
+                      <a:headEnd type="none" w="med" len="med"/>
+                      <a:tailEnd type="none" w="med" len="med"/>
+                    </a:lnB>
+                    <a:solidFill>
+                      <a:srgbClr val="F3F3F3"/>
+                    </a:solidFill>
+                  </a:tcPr>
+                </a:tc>
+                <a:tc>
+                  <a:txBody>
+                    <a:bodyPr/>
+                    <a:lstStyle/>
+                    <a:p>
+                      <a:pPr rtl="0" fontAlgn="b"/>
+                      <a:r>
+                        <a:rPr lang="en-IN" sz="700">
+                          <a:effectLst/>
+                        </a:rPr>
+                        <a:t>It was Ok </a:t>
+                      </a:r>
+                    </a:p>
+                  </a:txBody>
+                  <a:tcPr marL="11887" marR="11887" marT="7925" marB="7925" anchor="b">
+                    <a:lnL w="9525" cap="flat" cmpd="sng" algn="ctr">
+                      <a:solidFill>
+                        <a:srgbClr val="CCCCCC"/>
+                      </a:solidFill>
+                      <a:prstDash val="solid"/>
+                      <a:round/>
+                      <a:headEnd type="none" w="med" len="med"/>
+                      <a:tailEnd type="none" w="med" len="med"/>
+                    </a:lnL>
+                    <a:lnR w="9525" cap="flat" cmpd="sng" algn="ctr">
+                      <a:solidFill>
+                        <a:srgbClr val="CCCCCC"/>
+                      </a:solidFill>
+                      <a:prstDash val="solid"/>
+                      <a:round/>
+                      <a:headEnd type="none" w="med" len="med"/>
+                      <a:tailEnd type="none" w="med" len="med"/>
+                    </a:lnR>
+                    <a:lnT w="9525" cap="flat" cmpd="sng" algn="ctr">
+                      <a:solidFill>
+                        <a:srgbClr val="CCCCCC"/>
+                      </a:solidFill>
+                      <a:prstDash val="solid"/>
+                      <a:round/>
+                      <a:headEnd type="none" w="med" len="med"/>
+                      <a:tailEnd type="none" w="med" len="med"/>
+                    </a:lnT>
+                    <a:lnB w="9525" cap="flat" cmpd="sng" algn="ctr">
+                      <a:solidFill>
+                        <a:srgbClr val="CCCCCC"/>
+                      </a:solidFill>
+                      <a:prstDash val="solid"/>
+                      <a:round/>
+                      <a:headEnd type="none" w="med" len="med"/>
+                      <a:tailEnd type="none" w="med" len="med"/>
+                    </a:lnB>
+                    <a:solidFill>
+                      <a:srgbClr val="F3F3F3"/>
+                    </a:solidFill>
+                  </a:tcPr>
+                </a:tc>
+                <a:tc>
+                  <a:txBody>
+                    <a:bodyPr/>
+                    <a:lstStyle/>
+                    <a:p>
+                      <a:pPr rtl="0" fontAlgn="b"/>
+                      <a:r>
+                        <a:rPr lang="en-IN" sz="700">
+                          <a:effectLst/>
+                        </a:rPr>
+                        <a:t>new part</a:t>
+                      </a:r>
+                    </a:p>
+                  </a:txBody>
+                  <a:tcPr marL="11887" marR="11887" marT="7925" marB="7925" anchor="b">
+                    <a:lnL w="9525" cap="flat" cmpd="sng" algn="ctr">
+                      <a:solidFill>
+                        <a:srgbClr val="CCCCCC"/>
+                      </a:solidFill>
+                      <a:prstDash val="solid"/>
+                      <a:round/>
+                      <a:headEnd type="none" w="med" len="med"/>
+                      <a:tailEnd type="none" w="med" len="med"/>
+                    </a:lnL>
+                    <a:lnR w="9525" cap="flat" cmpd="sng" algn="ctr">
+                      <a:solidFill>
+                        <a:srgbClr val="CCCCCC"/>
+                      </a:solidFill>
+                      <a:prstDash val="solid"/>
+                      <a:round/>
+                      <a:headEnd type="none" w="med" len="med"/>
+                      <a:tailEnd type="none" w="med" len="med"/>
+                    </a:lnR>
+                    <a:lnT w="9525" cap="flat" cmpd="sng" algn="ctr">
+                      <a:solidFill>
+                        <a:srgbClr val="CCCCCC"/>
+                      </a:solidFill>
+                      <a:prstDash val="solid"/>
+                      <a:round/>
+                      <a:headEnd type="none" w="med" len="med"/>
+                      <a:tailEnd type="none" w="med" len="med"/>
+                    </a:lnT>
+                    <a:lnB w="9525" cap="flat" cmpd="sng" algn="ctr">
+                      <a:solidFill>
+                        <a:srgbClr val="CCCCCC"/>
+                      </a:solidFill>
+                      <a:prstDash val="solid"/>
+                      <a:round/>
+                      <a:headEnd type="none" w="med" len="med"/>
+                      <a:tailEnd type="none" w="med" len="med"/>
+                    </a:lnB>
+                    <a:solidFill>
+                      <a:srgbClr val="F3F3F3"/>
+                    </a:solidFill>
+                  </a:tcPr>
+                </a:tc>
+                <a:tc>
+                  <a:txBody>
+                    <a:bodyPr/>
+                    <a:lstStyle/>
+                    <a:p>
+                      <a:pPr rtl="0" fontAlgn="b"/>
+                      <a:r>
+                        <a:rPr lang="en-IN" sz="700">
+                          <a:effectLst/>
+                        </a:rPr>
+                        <a:t>TI employee</a:t>
+                      </a:r>
+                    </a:p>
+                  </a:txBody>
+                  <a:tcPr marL="11887" marR="11887" marT="7925" marB="7925" anchor="b">
+                    <a:lnL w="9525" cap="flat" cmpd="sng" algn="ctr">
+                      <a:solidFill>
+                        <a:srgbClr val="CCCCCC"/>
+                      </a:solidFill>
+                      <a:prstDash val="solid"/>
+                      <a:round/>
+                      <a:headEnd type="none" w="med" len="med"/>
+                      <a:tailEnd type="none" w="med" len="med"/>
+                    </a:lnL>
+                    <a:lnR w="9525" cap="flat" cmpd="sng" algn="ctr">
+                      <a:solidFill>
+                        <a:srgbClr val="CCCCCC"/>
+                      </a:solidFill>
+                      <a:prstDash val="solid"/>
+                      <a:round/>
+                      <a:headEnd type="none" w="med" len="med"/>
+                      <a:tailEnd type="none" w="med" len="med"/>
+                    </a:lnR>
+                    <a:lnT w="9525" cap="flat" cmpd="sng" algn="ctr">
+                      <a:solidFill>
+                        <a:srgbClr val="CCCCCC"/>
+                      </a:solidFill>
+                      <a:prstDash val="solid"/>
+                      <a:round/>
+                      <a:headEnd type="none" w="med" len="med"/>
+                      <a:tailEnd type="none" w="med" len="med"/>
+                    </a:lnT>
+                    <a:lnB w="9525" cap="flat" cmpd="sng" algn="ctr">
+                      <a:solidFill>
+                        <a:srgbClr val="CCCCCC"/>
+                      </a:solidFill>
+                      <a:prstDash val="solid"/>
+                      <a:round/>
+                      <a:headEnd type="none" w="med" len="med"/>
+                      <a:tailEnd type="none" w="med" len="med"/>
+                    </a:lnB>
+                    <a:solidFill>
+                      <a:srgbClr val="F3F3F3"/>
+                    </a:solidFill>
+                  </a:tcPr>
+                </a:tc>
+                <a:tc>
+                  <a:txBody>
+                    <a:bodyPr/>
+                    <a:lstStyle/>
+                    <a:p>
+                      <a:pPr rtl="0" fontAlgn="b"/>
+                      <a:endParaRPr lang="en-IN" sz="700" dirty="0">
+                        <a:effectLst/>
+                      </a:endParaRPr>
+                    </a:p>
+                  </a:txBody>
+                  <a:tcPr marL="11887" marR="11887" marT="7925" marB="7925" anchor="b">
+                    <a:lnL w="9525" cap="flat" cmpd="sng" algn="ctr">
+                      <a:solidFill>
+                        <a:srgbClr val="CCCCCC"/>
+                      </a:solidFill>
+                      <a:prstDash val="solid"/>
+                      <a:round/>
+                      <a:headEnd type="none" w="med" len="med"/>
+                      <a:tailEnd type="none" w="med" len="med"/>
+                    </a:lnL>
+                    <a:lnR w="9525" cap="flat" cmpd="sng" algn="ctr">
+                      <a:solidFill>
+                        <a:srgbClr val="CCCCCC"/>
+                      </a:solidFill>
+                      <a:prstDash val="solid"/>
+                      <a:round/>
+                      <a:headEnd type="none" w="med" len="med"/>
+                      <a:tailEnd type="none" w="med" len="med"/>
+                    </a:lnR>
+                    <a:lnT w="9525" cap="flat" cmpd="sng" algn="ctr">
+                      <a:solidFill>
+                        <a:srgbClr val="CCCCCC"/>
+                      </a:solidFill>
+                      <a:prstDash val="solid"/>
+                      <a:round/>
+                      <a:headEnd type="none" w="med" len="med"/>
+                      <a:tailEnd type="none" w="med" len="med"/>
+                    </a:lnT>
+                    <a:lnB w="9525" cap="flat" cmpd="sng" algn="ctr">
+                      <a:solidFill>
+                        <a:srgbClr val="CCCCCC"/>
+                      </a:solidFill>
+                      <a:prstDash val="solid"/>
+                      <a:round/>
+                      <a:headEnd type="none" w="med" len="med"/>
+                      <a:tailEnd type="none" w="med" len="med"/>
+                    </a:lnB>
+                    <a:solidFill>
+                      <a:srgbClr val="F3F3F3"/>
+                    </a:solidFill>
+                  </a:tcPr>
+                </a:tc>
+                <a:tc>
+                  <a:txBody>
+                    <a:bodyPr/>
+                    <a:lstStyle/>
+                    <a:p>
+                      <a:pPr rtl="0" fontAlgn="b"/>
+                      <a:r>
+                        <a:rPr lang="en-IN" sz="700" dirty="0">
+                          <a:effectLst/>
+                        </a:rPr>
+                        <a:t>EXT, INT</a:t>
+                      </a:r>
+                    </a:p>
+                  </a:txBody>
+                  <a:tcPr marL="11887" marR="11887" marT="7925" marB="7925" anchor="b">
+                    <a:lnL w="9525" cap="flat" cmpd="sng" algn="ctr">
+                      <a:solidFill>
+                        <a:srgbClr val="CCCCCC"/>
+                      </a:solidFill>
+                      <a:prstDash val="solid"/>
+                      <a:round/>
+                      <a:headEnd type="none" w="med" len="med"/>
+                      <a:tailEnd type="none" w="med" len="med"/>
+                    </a:lnL>
+                    <a:lnR w="9525" cap="flat" cmpd="sng" algn="ctr">
+                      <a:solidFill>
+                        <a:srgbClr val="CCCCCC"/>
+                      </a:solidFill>
+                      <a:prstDash val="solid"/>
+                      <a:round/>
+                      <a:headEnd type="none" w="med" len="med"/>
+                      <a:tailEnd type="none" w="med" len="med"/>
+                    </a:lnR>
+                    <a:lnT w="9525" cap="flat" cmpd="sng" algn="ctr">
+                      <a:solidFill>
+                        <a:srgbClr val="CCCCCC"/>
+                      </a:solidFill>
+                      <a:prstDash val="solid"/>
+                      <a:round/>
+                      <a:headEnd type="none" w="med" len="med"/>
+                      <a:tailEnd type="none" w="med" len="med"/>
+                    </a:lnT>
+                    <a:lnB w="9525" cap="flat" cmpd="sng" algn="ctr">
+                      <a:solidFill>
+                        <a:srgbClr val="CCCCCC"/>
+                      </a:solidFill>
+                      <a:prstDash val="solid"/>
+                      <a:round/>
+                      <a:headEnd type="none" w="med" len="med"/>
+                      <a:tailEnd type="none" w="med" len="med"/>
+                    </a:lnB>
+                    <a:solidFill>
+                      <a:srgbClr val="F3F3F3"/>
+                    </a:solidFill>
+                  </a:tcPr>
+                </a:tc>
+              </a:tr>
+            </a:tbl>
+          </a:graphicData>
+        </a:graphic>
+      </p:graphicFrame>
+      <p:sp>
+        <p:nvSpPr>
+          <p:cNvPr id="6" name="TextBox 5"/>
+          <p:cNvSpPr txBox="1"/>
+          <p:nvPr/>
+        </p:nvSpPr>
+        <p:spPr>
+          <a:xfrm>
+            <a:off x="188903" y="2671406"/>
+            <a:ext cx="3312368" cy="276999"/>
+          </a:xfrm>
+          <a:prstGeom prst="rect">
+            <a:avLst/>
+          </a:prstGeom>
+          <a:solidFill>
+            <a:schemeClr val="tx2">
+              <a:lumMod val="20000"/>
+              <a:lumOff val="80000"/>
+            </a:schemeClr>
+          </a:solidFill>
+        </p:spPr>
+        <p:txBody>
+          <a:bodyPr wrap="square" rtlCol="0">
+            <a:spAutoFit/>
+          </a:bodyPr>
+          <a:lstStyle/>
+          <a:p>
+            <a:r>
+              <a:rPr lang="en-IN" sz="1200" b="1" dirty="0" smtClean="0">
+                <a:latin typeface="+mn-lt"/>
+              </a:rPr>
+              <a:t>G-form:-Feedback Response Sheet</a:t>
+            </a:r>
+            <a:endParaRPr lang="en-IN" sz="1200" b="1" dirty="0">
+              <a:latin typeface="+mn-lt"/>
+            </a:endParaRPr>
+          </a:p>
+        </p:txBody>
+      </p:sp>
+      <p:sp>
+        <p:nvSpPr>
+          <p:cNvPr id="3" name="Slide Number Placeholder 2"/>
+          <p:cNvSpPr>
+            <a:spLocks noGrp="1"/>
+          </p:cNvSpPr>
+          <p:nvPr>
+            <p:ph type="sldNum" sz="quarter" idx="12"/>
+          </p:nvPr>
+        </p:nvSpPr>
+        <p:spPr/>
+        <p:txBody>
+          <a:bodyPr/>
+          <a:lstStyle/>
+          <a:p>
+            <a:pPr>
+              <a:defRPr/>
+            </a:pPr>
+            <a:fld id="{E6AE2B1A-DD0D-4385-B3EF-7FA9FFFD01AF}" type="slidenum">
+              <a:rPr lang="en-US" smtClean="0"/>
+              <a:pPr>
+                <a:defRPr/>
+              </a:pPr>
+              <a:t>4</a:t>
+            </a:fld>
+            <a:endParaRPr lang="en-US"/>
+          </a:p>
+        </p:txBody>
+      </p:sp>
+    </p:spTree>
+    <p:extLst>
+      <p:ext uri="{BB962C8B-B14F-4D97-AF65-F5344CB8AC3E}">
+        <p14:creationId xmlns:p14="http://schemas.microsoft.com/office/powerpoint/2010/main" val="3032326419"/>
+      </p:ext>
+    </p:extLst>
+  </p:cSld>
+  <p:clrMapOvr>
+    <a:masterClrMapping/>
+  </p:clrMapOvr>
+  <p:timing>
+    <p:tnLst>
+      <p:par>
+        <p:cTn id="1" dur="indefinite" restart="never" nodeType="tmRoot"/>
+      </p:par>
+    </p:tnLst>
+  </p:timing>
+</p:sld>
+</file>
+
+<file path=ppt/slides/slide5.xml><?xml version="1.0" encoding="utf-8"?>
+<p:sld xmlns:a="http://schemas.openxmlformats.org/drawingml/2006/main" xmlns:r="http://schemas.openxmlformats.org/officeDocument/2006/relationships" xmlns:p="http://schemas.openxmlformats.org/presentationml/2006/main">
+  <p:cSld>
+    <p:spTree>
+      <p:nvGrpSpPr>
+        <p:cNvPr id="1" name=""/>
+        <p:cNvGrpSpPr/>
+        <p:nvPr/>
+      </p:nvGrpSpPr>
+      <p:grpSpPr>
+        <a:xfrm>
+          <a:off x="0" y="0"/>
+          <a:ext cx="0" cy="0"/>
+          <a:chOff x="0" y="0"/>
+          <a:chExt cx="0" cy="0"/>
+        </a:xfrm>
+      </p:grpSpPr>
+      <p:sp>
+        <p:nvSpPr>
           <p:cNvPr id="15362" name="Title 1"/>
           <p:cNvSpPr>
             <a:spLocks noGrp="1"/>
@@ -5037,8 +9023,8 @@
         </p:nvSpPr>
         <p:spPr>
           <a:xfrm>
-            <a:off x="288847" y="292230"/>
-            <a:ext cx="3178696" cy="349151"/>
+            <a:off x="506443" y="1779662"/>
+            <a:ext cx="2952328" cy="349151"/>
           </a:xfrm>
           <a:solidFill>
             <a:schemeClr val="accent5">
@@ -5077,13 +9063,13 @@
               </a:ext>
             </a:extLst>
           </a:blip>
-          <a:srcRect l="13361" t="12098" r="1651"/>
+          <a:srcRect l="13361" t="12099" r="1651" b="5554"/>
           <a:stretch/>
         </p:blipFill>
         <p:spPr bwMode="auto">
           <a:xfrm>
-            <a:off x="323528" y="627534"/>
-            <a:ext cx="3171211" cy="2019672"/>
+            <a:off x="2844322" y="2924486"/>
+            <a:ext cx="2663782" cy="2062151"/>
           </a:xfrm>
           <a:prstGeom prst="rect">
             <a:avLst/>
@@ -5121,8 +9107,8 @@
         </p:nvSpPr>
         <p:spPr>
           <a:xfrm>
-            <a:off x="3635896" y="425938"/>
-            <a:ext cx="4608512" cy="430887"/>
+            <a:off x="76722" y="244615"/>
+            <a:ext cx="4317585" cy="430887"/>
           </a:xfrm>
           <a:prstGeom prst="rect">
             <a:avLst/>
@@ -5156,8 +9142,8 @@
         </p:nvSpPr>
         <p:spPr>
           <a:xfrm>
-            <a:off x="275204" y="2675192"/>
-            <a:ext cx="3360691" cy="261610"/>
+            <a:off x="68043" y="2647641"/>
+            <a:ext cx="1933334" cy="261610"/>
           </a:xfrm>
           <a:prstGeom prst="rect">
             <a:avLst/>
@@ -5185,58 +9171,6 @@
       </p:sp>
       <p:pic>
         <p:nvPicPr>
-          <p:cNvPr id="1026" name="Picture 2"/>
-          <p:cNvPicPr>
-            <a:picLocks noChangeAspect="1" noChangeArrowheads="1"/>
-          </p:cNvPicPr>
-          <p:nvPr/>
-        </p:nvPicPr>
-        <p:blipFill rotWithShape="1">
-          <a:blip r:embed="rId3">
-            <a:extLst>
-              <a:ext uri="{28A0092B-C50C-407E-A947-70E740481C1C}">
-                <a14:useLocalDpi xmlns:a14="http://schemas.microsoft.com/office/drawing/2010/main" val="0"/>
-              </a:ext>
-            </a:extLst>
-          </a:blip>
-          <a:srcRect l="3192" t="11386" r="24173" b="-183"/>
-          <a:stretch/>
-        </p:blipFill>
-        <p:spPr bwMode="auto">
-          <a:xfrm>
-            <a:off x="275205" y="2894326"/>
-            <a:ext cx="4167888" cy="2126566"/>
-          </a:xfrm>
-          <a:prstGeom prst="rect">
-            <a:avLst/>
-          </a:prstGeom>
-          <a:noFill/>
-          <a:ln>
-            <a:noFill/>
-          </a:ln>
-          <a:extLst>
-            <a:ext uri="{909E8E84-426E-40DD-AFC4-6F175D3DCCD1}">
-              <a14:hiddenFill xmlns:a14="http://schemas.microsoft.com/office/drawing/2010/main">
-                <a:solidFill>
-                  <a:schemeClr val="accent1"/>
-                </a:solidFill>
-              </a14:hiddenFill>
-            </a:ext>
-            <a:ext uri="{91240B29-F687-4F45-9708-019B960494DF}">
-              <a14:hiddenLine xmlns:a14="http://schemas.microsoft.com/office/drawing/2010/main" w="9525">
-                <a:solidFill>
-                  <a:schemeClr val="tx1"/>
-                </a:solidFill>
-                <a:miter lim="800000"/>
-                <a:headEnd/>
-                <a:tailEnd/>
-              </a14:hiddenLine>
-            </a:ext>
-          </a:extLst>
-        </p:spPr>
-      </p:pic>
-      <p:pic>
-        <p:nvPicPr>
           <p:cNvPr id="1027" name="Picture 3"/>
           <p:cNvPicPr>
             <a:picLocks noChangeAspect="1" noChangeArrowheads="1"/>
@@ -5244,7 +9178,7 @@
           <p:nvPr/>
         </p:nvPicPr>
         <p:blipFill>
-          <a:blip r:embed="rId4" cstate="print">
+          <a:blip r:embed="rId3" cstate="print">
             <a:extLst>
               <a:ext uri="{28A0092B-C50C-407E-A947-70E740481C1C}">
                 <a14:useLocalDpi xmlns:a14="http://schemas.microsoft.com/office/drawing/2010/main" val="0"/>
@@ -5258,8 +9192,8 @@
         </p:blipFill>
         <p:spPr bwMode="auto">
           <a:xfrm>
-            <a:off x="3635896" y="899213"/>
-            <a:ext cx="1696821" cy="1815551"/>
+            <a:off x="38391" y="675502"/>
+            <a:ext cx="1944216" cy="1973907"/>
           </a:xfrm>
           <a:prstGeom prst="rect">
             <a:avLst/>
@@ -5298,7 +9232,7 @@
           <p:nvPr/>
         </p:nvPicPr>
         <p:blipFill rotWithShape="1">
-          <a:blip r:embed="rId5" cstate="print">
+          <a:blip r:embed="rId4" cstate="print">
             <a:extLst>
               <a:ext uri="{28A0092B-C50C-407E-A947-70E740481C1C}">
                 <a14:useLocalDpi xmlns:a14="http://schemas.microsoft.com/office/drawing/2010/main" val="0"/>
@@ -5310,8 +9244,8 @@
         </p:blipFill>
         <p:spPr bwMode="auto">
           <a:xfrm>
-            <a:off x="5420987" y="833858"/>
-            <a:ext cx="2886509" cy="1972139"/>
+            <a:off x="2001377" y="675502"/>
+            <a:ext cx="2210583" cy="1973907"/>
           </a:xfrm>
           <a:prstGeom prst="rect">
             <a:avLst/>
@@ -5349,7 +9283,7 @@
         </p:nvSpPr>
         <p:spPr>
           <a:xfrm>
-            <a:off x="4519394" y="2854986"/>
+            <a:off x="4394307" y="229225"/>
             <a:ext cx="4517102" cy="461665"/>
           </a:xfrm>
           <a:prstGeom prst="rect">
@@ -5444,7 +9378,59 @@
       </p:sp>
       <p:pic>
         <p:nvPicPr>
-          <p:cNvPr id="1031" name="Picture 7"/>
+          <p:cNvPr id="5" name="Picture 2"/>
+          <p:cNvPicPr>
+            <a:picLocks noChangeAspect="1" noChangeArrowheads="1"/>
+          </p:cNvPicPr>
+          <p:nvPr/>
+        </p:nvPicPr>
+        <p:blipFill rotWithShape="1">
+          <a:blip r:embed="rId5" cstate="print">
+            <a:extLst>
+              <a:ext uri="{28A0092B-C50C-407E-A947-70E740481C1C}">
+                <a14:useLocalDpi xmlns:a14="http://schemas.microsoft.com/office/drawing/2010/main" val="0"/>
+              </a:ext>
+            </a:extLst>
+          </a:blip>
+          <a:srcRect l="-2575" t="9340" r="23957" b="5535"/>
+          <a:stretch/>
+        </p:blipFill>
+        <p:spPr bwMode="auto">
+          <a:xfrm>
+            <a:off x="-44499" y="2924486"/>
+            <a:ext cx="2888307" cy="2062151"/>
+          </a:xfrm>
+          <a:prstGeom prst="rect">
+            <a:avLst/>
+          </a:prstGeom>
+          <a:noFill/>
+          <a:ln>
+            <a:noFill/>
+          </a:ln>
+          <a:extLst>
+            <a:ext uri="{909E8E84-426E-40DD-AFC4-6F175D3DCCD1}">
+              <a14:hiddenFill xmlns:a14="http://schemas.microsoft.com/office/drawing/2010/main">
+                <a:solidFill>
+                  <a:schemeClr val="accent1"/>
+                </a:solidFill>
+              </a14:hiddenFill>
+            </a:ext>
+            <a:ext uri="{91240B29-F687-4F45-9708-019B960494DF}">
+              <a14:hiddenLine xmlns:a14="http://schemas.microsoft.com/office/drawing/2010/main" w="9525">
+                <a:solidFill>
+                  <a:schemeClr val="tx1"/>
+                </a:solidFill>
+                <a:miter lim="800000"/>
+                <a:headEnd/>
+                <a:tailEnd/>
+              </a14:hiddenLine>
+            </a:ext>
+          </a:extLst>
+        </p:spPr>
+      </p:pic>
+      <p:pic>
+        <p:nvPicPr>
+          <p:cNvPr id="6" name="Picture 3"/>
           <p:cNvPicPr>
             <a:picLocks noChangeAspect="1" noChangeArrowheads="1"/>
           </p:cNvPicPr>
@@ -5458,13 +9444,13 @@
               </a:ext>
             </a:extLst>
           </a:blip>
-          <a:srcRect l="2533" t="38171" r="16712" b="12207"/>
+          <a:srcRect l="4377" t="37533" r="19305" b="5085"/>
           <a:stretch/>
         </p:blipFill>
         <p:spPr bwMode="auto">
           <a:xfrm>
-            <a:off x="4451609" y="3316651"/>
-            <a:ext cx="4584887" cy="1704241"/>
+            <a:off x="4211960" y="679088"/>
+            <a:ext cx="4719172" cy="1812661"/>
           </a:xfrm>
           <a:prstGeom prst="rect">
             <a:avLst/>
@@ -5496,7 +9482,136 @@
       </p:pic>
       <p:sp>
         <p:nvSpPr>
-          <p:cNvPr id="5" name="Slide Number Placeholder 4"/>
+          <p:cNvPr id="13" name="TextBox 12"/>
+          <p:cNvSpPr txBox="1"/>
+          <p:nvPr/>
+        </p:nvSpPr>
+        <p:spPr>
+          <a:xfrm>
+            <a:off x="3245293" y="2647641"/>
+            <a:ext cx="1933334" cy="261610"/>
+          </a:xfrm>
+          <a:prstGeom prst="rect">
+            <a:avLst/>
+          </a:prstGeom>
+          <a:solidFill>
+            <a:schemeClr val="accent5">
+              <a:lumMod val="40000"/>
+              <a:lumOff val="60000"/>
+            </a:schemeClr>
+          </a:solidFill>
+        </p:spPr>
+        <p:txBody>
+          <a:bodyPr wrap="square" rtlCol="0">
+            <a:spAutoFit/>
+          </a:bodyPr>
+          <a:lstStyle/>
+          <a:p>
+            <a:r>
+              <a:rPr lang="en-IN" sz="1050" dirty="0" smtClean="0"/>
+              <a:t>Training Detail Report </a:t>
+            </a:r>
+            <a:endParaRPr lang="en-IN" sz="1050" dirty="0"/>
+          </a:p>
+        </p:txBody>
+      </p:sp>
+      <p:pic>
+        <p:nvPicPr>
+          <p:cNvPr id="1028" name="Picture 4"/>
+          <p:cNvPicPr>
+            <a:picLocks noChangeAspect="1" noChangeArrowheads="1"/>
+          </p:cNvPicPr>
+          <p:nvPr/>
+        </p:nvPicPr>
+        <p:blipFill rotWithShape="1">
+          <a:blip r:embed="rId7" cstate="print">
+            <a:extLst>
+              <a:ext uri="{28A0092B-C50C-407E-A947-70E740481C1C}">
+                <a14:useLocalDpi xmlns:a14="http://schemas.microsoft.com/office/drawing/2010/main" val="0"/>
+              </a:ext>
+            </a:extLst>
+          </a:blip>
+          <a:srcRect l="2994" t="30405" r="8614" b="7015"/>
+          <a:stretch/>
+        </p:blipFill>
+        <p:spPr bwMode="auto">
+          <a:xfrm>
+            <a:off x="5508104" y="2924486"/>
+            <a:ext cx="3528392" cy="2062151"/>
+          </a:xfrm>
+          <a:prstGeom prst="rect">
+            <a:avLst/>
+          </a:prstGeom>
+          <a:noFill/>
+          <a:ln>
+            <a:noFill/>
+          </a:ln>
+          <a:extLst>
+            <a:ext uri="{909E8E84-426E-40DD-AFC4-6F175D3DCCD1}">
+              <a14:hiddenFill xmlns:a14="http://schemas.microsoft.com/office/drawing/2010/main">
+                <a:solidFill>
+                  <a:schemeClr val="accent1"/>
+                </a:solidFill>
+              </a14:hiddenFill>
+            </a:ext>
+            <a:ext uri="{91240B29-F687-4F45-9708-019B960494DF}">
+              <a14:hiddenLine xmlns:a14="http://schemas.microsoft.com/office/drawing/2010/main" w="9525">
+                <a:solidFill>
+                  <a:schemeClr val="tx1"/>
+                </a:solidFill>
+                <a:miter lim="800000"/>
+                <a:headEnd/>
+                <a:tailEnd/>
+              </a14:hiddenLine>
+            </a:ext>
+          </a:extLst>
+        </p:spPr>
+      </p:pic>
+      <p:sp>
+        <p:nvSpPr>
+          <p:cNvPr id="7" name="TextBox 6"/>
+          <p:cNvSpPr txBox="1"/>
+          <p:nvPr/>
+        </p:nvSpPr>
+        <p:spPr>
+          <a:xfrm>
+            <a:off x="5508104" y="2636777"/>
+            <a:ext cx="3403305" cy="253916"/>
+          </a:xfrm>
+          <a:prstGeom prst="rect">
+            <a:avLst/>
+          </a:prstGeom>
+          <a:solidFill>
+            <a:schemeClr val="accent5">
+              <a:lumMod val="40000"/>
+              <a:lumOff val="60000"/>
+            </a:schemeClr>
+          </a:solidFill>
+        </p:spPr>
+        <p:txBody>
+          <a:bodyPr wrap="square" rtlCol="0">
+            <a:spAutoFit/>
+          </a:bodyPr>
+          <a:lstStyle>
+            <a:defPPr>
+              <a:defRPr lang="en-IN"/>
+            </a:defPPr>
+            <a:lvl1pPr>
+              <a:defRPr sz="1050"/>
+            </a:lvl1pPr>
+          </a:lstStyle>
+          <a:p>
+            <a:pPr algn="ctr"/>
+            <a:r>
+              <a:rPr lang="en-IN" dirty="0"/>
+              <a:t>Analysis of Training Data</a:t>
+            </a:r>
+          </a:p>
+        </p:txBody>
+      </p:sp>
+      <p:sp>
+        <p:nvSpPr>
+          <p:cNvPr id="8" name="Slide Number Placeholder 7"/>
           <p:cNvSpPr>
             <a:spLocks noGrp="1"/>
           </p:cNvSpPr>
@@ -5517,13 +9632,18 @@
               <a:pPr>
                 <a:defRPr/>
               </a:pPr>
-              <a:t>4</a:t>
+              <a:t>5</a:t>
             </a:fld>
             <a:endParaRPr lang="en-US"/>
           </a:p>
         </p:txBody>
       </p:sp>
     </p:spTree>
+    <p:extLst>
+      <p:ext uri="{BB962C8B-B14F-4D97-AF65-F5344CB8AC3E}">
+        <p14:creationId xmlns:p14="http://schemas.microsoft.com/office/powerpoint/2010/main" val="2959522157"/>
+      </p:ext>
+    </p:extLst>
   </p:cSld>
   <p:clrMapOvr>
     <a:masterClrMapping/>

</xml_diff>

<commit_message>
ppts pdf files updated.
</commit_message>
<xml_diff>
--- a/Show & Tell/OT-PPT.pptx
+++ b/Show & Tell/OT-PPT.pptx
@@ -5,20 +5,19 @@
     <p:sldMasterId id="2147483648" r:id="rId1"/>
   </p:sldMasterIdLst>
   <p:notesMasterIdLst>
-    <p:notesMasterId r:id="rId7"/>
+    <p:notesMasterId r:id="rId6"/>
   </p:notesMasterIdLst>
   <p:handoutMasterIdLst>
-    <p:handoutMasterId r:id="rId8"/>
+    <p:handoutMasterId r:id="rId7"/>
   </p:handoutMasterIdLst>
   <p:sldIdLst>
-    <p:sldId id="256" r:id="rId2"/>
-    <p:sldId id="260" r:id="rId3"/>
-    <p:sldId id="261" r:id="rId4"/>
-    <p:sldId id="262" r:id="rId5"/>
-    <p:sldId id="263" r:id="rId6"/>
+    <p:sldId id="260" r:id="rId2"/>
+    <p:sldId id="261" r:id="rId3"/>
+    <p:sldId id="262" r:id="rId4"/>
+    <p:sldId id="263" r:id="rId5"/>
   </p:sldIdLst>
   <p:sldSz cx="9144000" cy="5143500" type="screen16x9"/>
-  <p:notesSz cx="6858000" cy="9144000"/>
+  <p:notesSz cx="7315200" cy="9601200"/>
   <p:defaultTextStyle>
     <a:defPPr>
       <a:defRPr lang="en-IN"/>
@@ -182,17 +181,17 @@
         <p:spPr>
           <a:xfrm>
             <a:off x="0" y="0"/>
-            <a:ext cx="2971800" cy="457200"/>
+            <a:ext cx="3169920" cy="480060"/>
           </a:xfrm>
           <a:prstGeom prst="rect">
             <a:avLst/>
           </a:prstGeom>
         </p:spPr>
         <p:txBody>
-          <a:bodyPr vert="horz" lIns="91440" tIns="45720" rIns="91440" bIns="45720" rtlCol="0"/>
+          <a:bodyPr vert="horz" lIns="96661" tIns="48331" rIns="96661" bIns="48331" rtlCol="0"/>
           <a:lstStyle>
             <a:lvl1pPr algn="l">
-              <a:defRPr sz="1200"/>
+              <a:defRPr sz="1300"/>
             </a:lvl1pPr>
           </a:lstStyle>
           <a:p>
@@ -212,24 +211,24 @@
         </p:nvSpPr>
         <p:spPr>
           <a:xfrm>
-            <a:off x="3884613" y="0"/>
-            <a:ext cx="2971800" cy="457200"/>
+            <a:off x="4143587" y="0"/>
+            <a:ext cx="3169920" cy="480060"/>
           </a:xfrm>
           <a:prstGeom prst="rect">
             <a:avLst/>
           </a:prstGeom>
         </p:spPr>
         <p:txBody>
-          <a:bodyPr vert="horz" lIns="91440" tIns="45720" rIns="91440" bIns="45720" rtlCol="0"/>
+          <a:bodyPr vert="horz" lIns="96661" tIns="48331" rIns="96661" bIns="48331" rtlCol="0"/>
           <a:lstStyle>
             <a:lvl1pPr algn="r">
-              <a:defRPr sz="1200"/>
+              <a:defRPr sz="1300"/>
             </a:lvl1pPr>
           </a:lstStyle>
           <a:p>
             <a:fld id="{17EACF00-9743-472F-9927-E03D28C86050}" type="datetimeFigureOut">
               <a:rPr lang="en-IN" smtClean="0"/>
-              <a:t>31-10-2022</a:t>
+              <a:t>01-11-2022</a:t>
             </a:fld>
             <a:endParaRPr lang="en-IN"/>
           </a:p>
@@ -247,18 +246,18 @@
         </p:nvSpPr>
         <p:spPr>
           <a:xfrm>
-            <a:off x="0" y="8685213"/>
-            <a:ext cx="2971800" cy="457200"/>
+            <a:off x="0" y="9119474"/>
+            <a:ext cx="3169920" cy="480060"/>
           </a:xfrm>
           <a:prstGeom prst="rect">
             <a:avLst/>
           </a:prstGeom>
         </p:spPr>
         <p:txBody>
-          <a:bodyPr vert="horz" lIns="91440" tIns="45720" rIns="91440" bIns="45720" rtlCol="0" anchor="b"/>
+          <a:bodyPr vert="horz" lIns="96661" tIns="48331" rIns="96661" bIns="48331" rtlCol="0" anchor="b"/>
           <a:lstStyle>
             <a:lvl1pPr algn="l">
-              <a:defRPr sz="1200"/>
+              <a:defRPr sz="1300"/>
             </a:lvl1pPr>
           </a:lstStyle>
           <a:p>
@@ -278,18 +277,18 @@
         </p:nvSpPr>
         <p:spPr>
           <a:xfrm>
-            <a:off x="3884613" y="8685213"/>
-            <a:ext cx="2971800" cy="457200"/>
+            <a:off x="4143587" y="9119474"/>
+            <a:ext cx="3169920" cy="480060"/>
           </a:xfrm>
           <a:prstGeom prst="rect">
             <a:avLst/>
           </a:prstGeom>
         </p:spPr>
         <p:txBody>
-          <a:bodyPr vert="horz" lIns="91440" tIns="45720" rIns="91440" bIns="45720" rtlCol="0" anchor="b"/>
+          <a:bodyPr vert="horz" lIns="96661" tIns="48331" rIns="96661" bIns="48331" rtlCol="0" anchor="b"/>
           <a:lstStyle>
             <a:lvl1pPr algn="r">
-              <a:defRPr sz="1200"/>
+              <a:defRPr sz="1300"/>
             </a:lvl1pPr>
           </a:lstStyle>
           <a:p>
@@ -347,17 +346,17 @@
         <p:spPr>
           <a:xfrm>
             <a:off x="0" y="0"/>
-            <a:ext cx="2971800" cy="457200"/>
+            <a:ext cx="3169920" cy="480060"/>
           </a:xfrm>
           <a:prstGeom prst="rect">
             <a:avLst/>
           </a:prstGeom>
         </p:spPr>
         <p:txBody>
-          <a:bodyPr vert="horz" lIns="91440" tIns="45720" rIns="91440" bIns="45720" rtlCol="0"/>
+          <a:bodyPr vert="horz" lIns="96661" tIns="48331" rIns="96661" bIns="48331" rtlCol="0"/>
           <a:lstStyle>
             <a:lvl1pPr algn="l">
-              <a:defRPr sz="1200"/>
+              <a:defRPr sz="1300"/>
             </a:lvl1pPr>
           </a:lstStyle>
           <a:p>
@@ -377,24 +376,24 @@
         </p:nvSpPr>
         <p:spPr>
           <a:xfrm>
-            <a:off x="3884613" y="0"/>
-            <a:ext cx="2971800" cy="457200"/>
+            <a:off x="4143587" y="0"/>
+            <a:ext cx="3169920" cy="480060"/>
           </a:xfrm>
           <a:prstGeom prst="rect">
             <a:avLst/>
           </a:prstGeom>
         </p:spPr>
         <p:txBody>
-          <a:bodyPr vert="horz" lIns="91440" tIns="45720" rIns="91440" bIns="45720" rtlCol="0"/>
+          <a:bodyPr vert="horz" lIns="96661" tIns="48331" rIns="96661" bIns="48331" rtlCol="0"/>
           <a:lstStyle>
             <a:lvl1pPr algn="r">
-              <a:defRPr sz="1200"/>
+              <a:defRPr sz="1300"/>
             </a:lvl1pPr>
           </a:lstStyle>
           <a:p>
             <a:fld id="{94C71268-2E63-4FB5-B90B-E31E42DB2EA0}" type="datetimeFigureOut">
               <a:rPr lang="en-IN" smtClean="0"/>
-              <a:t>31-10-2022</a:t>
+              <a:t>01-11-2022</a:t>
             </a:fld>
             <a:endParaRPr lang="en-IN"/>
           </a:p>
@@ -412,8 +411,8 @@
         </p:nvSpPr>
         <p:spPr>
           <a:xfrm>
-            <a:off x="381000" y="685800"/>
-            <a:ext cx="6096000" cy="3429000"/>
+            <a:off x="457200" y="720725"/>
+            <a:ext cx="6400800" cy="3600450"/>
           </a:xfrm>
           <a:prstGeom prst="rect">
             <a:avLst/>
@@ -426,7 +425,7 @@
           </a:ln>
         </p:spPr>
         <p:txBody>
-          <a:bodyPr vert="horz" lIns="91440" tIns="45720" rIns="91440" bIns="45720" rtlCol="0" anchor="ctr"/>
+          <a:bodyPr vert="horz" lIns="96661" tIns="48331" rIns="96661" bIns="48331" rtlCol="0" anchor="ctr"/>
           <a:lstStyle/>
           <a:p>
             <a:endParaRPr lang="en-IN"/>
@@ -445,15 +444,15 @@
         </p:nvSpPr>
         <p:spPr>
           <a:xfrm>
-            <a:off x="685800" y="4343400"/>
-            <a:ext cx="5486400" cy="4114800"/>
+            <a:off x="731520" y="4560570"/>
+            <a:ext cx="5852160" cy="4320540"/>
           </a:xfrm>
           <a:prstGeom prst="rect">
             <a:avLst/>
           </a:prstGeom>
         </p:spPr>
         <p:txBody>
-          <a:bodyPr vert="horz" lIns="91440" tIns="45720" rIns="91440" bIns="45720" rtlCol="0"/>
+          <a:bodyPr vert="horz" lIns="96661" tIns="48331" rIns="96661" bIns="48331" rtlCol="0"/>
           <a:lstStyle/>
           <a:p>
             <a:pPr lvl="0"/>
@@ -505,18 +504,18 @@
         </p:nvSpPr>
         <p:spPr>
           <a:xfrm>
-            <a:off x="0" y="8685213"/>
-            <a:ext cx="2971800" cy="457200"/>
+            <a:off x="0" y="9119474"/>
+            <a:ext cx="3169920" cy="480060"/>
           </a:xfrm>
           <a:prstGeom prst="rect">
             <a:avLst/>
           </a:prstGeom>
         </p:spPr>
         <p:txBody>
-          <a:bodyPr vert="horz" lIns="91440" tIns="45720" rIns="91440" bIns="45720" rtlCol="0" anchor="b"/>
+          <a:bodyPr vert="horz" lIns="96661" tIns="48331" rIns="96661" bIns="48331" rtlCol="0" anchor="b"/>
           <a:lstStyle>
             <a:lvl1pPr algn="l">
-              <a:defRPr sz="1200"/>
+              <a:defRPr sz="1300"/>
             </a:lvl1pPr>
           </a:lstStyle>
           <a:p>
@@ -536,18 +535,18 @@
         </p:nvSpPr>
         <p:spPr>
           <a:xfrm>
-            <a:off x="3884613" y="8685213"/>
-            <a:ext cx="2971800" cy="457200"/>
+            <a:off x="4143587" y="9119474"/>
+            <a:ext cx="3169920" cy="480060"/>
           </a:xfrm>
           <a:prstGeom prst="rect">
             <a:avLst/>
           </a:prstGeom>
         </p:spPr>
         <p:txBody>
-          <a:bodyPr vert="horz" lIns="91440" tIns="45720" rIns="91440" bIns="45720" rtlCol="0" anchor="b"/>
+          <a:bodyPr vert="horz" lIns="96661" tIns="48331" rIns="96661" bIns="48331" rtlCol="0" anchor="b"/>
           <a:lstStyle>
             <a:lvl1pPr algn="r">
-              <a:defRPr sz="1200"/>
+              <a:defRPr sz="1300"/>
             </a:lvl1pPr>
           </a:lstStyle>
           <a:p>
@@ -715,7 +714,7 @@
             </a:pPr>
             <a:fld id="{B4096766-A6D3-4E65-9F31-67ED6BCB3ECC}" type="datetime1">
               <a:rPr lang="en-US" smtClean="0"/>
-              <a:t>10/31/2022</a:t>
+              <a:t>11/1/2022</a:t>
             </a:fld>
             <a:endParaRPr lang="en-US"/>
           </a:p>
@@ -921,7 +920,7 @@
             </a:pPr>
             <a:fld id="{325AA255-3A15-45F3-A830-C47418BC7B3C}" type="datetime1">
               <a:rPr lang="en-US" smtClean="0"/>
-              <a:t>10/31/2022</a:t>
+              <a:t>11/1/2022</a:t>
             </a:fld>
             <a:endParaRPr lang="en-US"/>
           </a:p>
@@ -1137,7 +1136,7 @@
             </a:pPr>
             <a:fld id="{3DB5623C-6929-4187-BD5B-26500F767F8E}" type="datetime1">
               <a:rPr lang="en-US" smtClean="0"/>
-              <a:t>10/31/2022</a:t>
+              <a:t>11/1/2022</a:t>
             </a:fld>
             <a:endParaRPr lang="en-US"/>
           </a:p>
@@ -1343,7 +1342,7 @@
             </a:pPr>
             <a:fld id="{6A526C60-CA8B-48D8-BDE4-D66FCBB10C5F}" type="datetime1">
               <a:rPr lang="en-US" smtClean="0"/>
-              <a:t>10/31/2022</a:t>
+              <a:t>11/1/2022</a:t>
             </a:fld>
             <a:endParaRPr lang="en-US"/>
           </a:p>
@@ -1625,7 +1624,7 @@
             </a:pPr>
             <a:fld id="{A9B41BE4-8996-41ED-B469-DD5242405A28}" type="datetime1">
               <a:rPr lang="en-US" smtClean="0"/>
-              <a:t>10/31/2022</a:t>
+              <a:t>11/1/2022</a:t>
             </a:fld>
             <a:endParaRPr lang="en-US"/>
           </a:p>
@@ -1949,7 +1948,7 @@
             </a:pPr>
             <a:fld id="{CA68C020-0D12-4624-9A07-C42A25353450}" type="datetime1">
               <a:rPr lang="en-US" smtClean="0"/>
-              <a:t>10/31/2022</a:t>
+              <a:t>11/1/2022</a:t>
             </a:fld>
             <a:endParaRPr lang="en-US"/>
           </a:p>
@@ -2407,7 +2406,7 @@
             </a:pPr>
             <a:fld id="{2B3B34F2-5AF7-4B3F-85AC-AC11AF32F6DF}" type="datetime1">
               <a:rPr lang="en-US" smtClean="0"/>
-              <a:t>10/31/2022</a:t>
+              <a:t>11/1/2022</a:t>
             </a:fld>
             <a:endParaRPr lang="en-US"/>
           </a:p>
@@ -2561,7 +2560,7 @@
             </a:pPr>
             <a:fld id="{68D09F5F-DDC2-4BCB-B318-7DC29C3589A8}" type="datetime1">
               <a:rPr lang="en-US" smtClean="0"/>
-              <a:t>10/31/2022</a:t>
+              <a:t>11/1/2022</a:t>
             </a:fld>
             <a:endParaRPr lang="en-US"/>
           </a:p>
@@ -2692,7 +2691,7 @@
             </a:pPr>
             <a:fld id="{87D379BA-CC30-4DF7-A786-13ECC34476B0}" type="datetime1">
               <a:rPr lang="en-US" smtClean="0"/>
-              <a:t>10/31/2022</a:t>
+              <a:t>11/1/2022</a:t>
             </a:fld>
             <a:endParaRPr lang="en-US"/>
           </a:p>
@@ -3005,7 +3004,7 @@
             </a:pPr>
             <a:fld id="{324A113B-F00E-4F36-913D-998038BCCC7D}" type="datetime1">
               <a:rPr lang="en-US" smtClean="0"/>
-              <a:t>10/31/2022</a:t>
+              <a:t>11/1/2022</a:t>
             </a:fld>
             <a:endParaRPr lang="en-US"/>
           </a:p>
@@ -3301,7 +3300,7 @@
             </a:pPr>
             <a:fld id="{142C5081-A737-4B2D-BE0F-5C37DE05C549}" type="datetime1">
               <a:rPr lang="en-US" smtClean="0"/>
-              <a:t>10/31/2022</a:t>
+              <a:t>11/1/2022</a:t>
             </a:fld>
             <a:endParaRPr lang="en-US"/>
           </a:p>
@@ -3596,7 +3595,7 @@
             </a:pPr>
             <a:fld id="{AB3F2C3F-F27F-4B29-AE71-E99E75D16AB7}" type="datetime1">
               <a:rPr lang="en-US" smtClean="0"/>
-              <a:t>10/31/2022</a:t>
+              <a:t>11/1/2022</a:t>
             </a:fld>
             <a:endParaRPr lang="en-US"/>
           </a:p>
@@ -4123,67 +4122,6 @@
       </p:grpSpPr>
       <p:sp>
         <p:nvSpPr>
-          <p:cNvPr id="3" name="Slide Number Placeholder 2"/>
-          <p:cNvSpPr>
-            <a:spLocks noGrp="1"/>
-          </p:cNvSpPr>
-          <p:nvPr>
-            <p:ph type="sldNum" sz="quarter" idx="12"/>
-          </p:nvPr>
-        </p:nvSpPr>
-        <p:spPr/>
-        <p:txBody>
-          <a:bodyPr/>
-          <a:lstStyle/>
-          <a:p>
-            <a:pPr>
-              <a:defRPr/>
-            </a:pPr>
-            <a:fld id="{2482ED7B-B54D-416C-95D3-81078A8F7372}" type="slidenum">
-              <a:rPr lang="en-US" smtClean="0"/>
-              <a:pPr>
-                <a:defRPr/>
-              </a:pPr>
-              <a:t>1</a:t>
-            </a:fld>
-            <a:endParaRPr lang="en-US"/>
-          </a:p>
-        </p:txBody>
-      </p:sp>
-    </p:spTree>
-  </p:cSld>
-  <p:clrMapOvr>
-    <a:masterClrMapping/>
-  </p:clrMapOvr>
-  <p:timing>
-    <p:tnLst>
-      <p:par>
-        <p:cTn id="1" dur="indefinite" restart="never" nodeType="tmRoot"/>
-      </p:par>
-    </p:tnLst>
-  </p:timing>
-</p:sld>
-</file>
-
-<file path=ppt/slides/slide2.xml><?xml version="1.0" encoding="utf-8"?>
-<p:sld xmlns:a="http://schemas.openxmlformats.org/drawingml/2006/main" xmlns:r="http://schemas.openxmlformats.org/officeDocument/2006/relationships" xmlns:p="http://schemas.openxmlformats.org/presentationml/2006/main">
-  <p:cSld>
-    <p:spTree>
-      <p:nvGrpSpPr>
-        <p:cNvPr id="1" name=""/>
-        <p:cNvGrpSpPr/>
-        <p:nvPr/>
-      </p:nvGrpSpPr>
-      <p:grpSpPr>
-        <a:xfrm>
-          <a:off x="0" y="0"/>
-          <a:ext cx="0" cy="0"/>
-          <a:chOff x="0" y="0"/>
-          <a:chExt cx="0" cy="0"/>
-        </a:xfrm>
-      </p:grpSpPr>
-      <p:sp>
-        <p:nvSpPr>
           <p:cNvPr id="13314" name="Title 1"/>
           <p:cNvSpPr>
             <a:spLocks noGrp="1"/>
@@ -4203,12 +4141,12 @@
           <a:lstStyle/>
           <a:p>
             <a:r>
-              <a:rPr lang="en-US" altLang="en-US" dirty="0" err="1" smtClean="0"/>
-              <a:t>Orgnisational</a:t>
+              <a:rPr lang="en-US" altLang="en-US" smtClean="0"/>
+              <a:t>Organizational </a:t>
             </a:r>
             <a:r>
               <a:rPr lang="en-US" altLang="en-US" dirty="0" smtClean="0"/>
-              <a:t> Training </a:t>
+              <a:t>Training </a:t>
             </a:r>
           </a:p>
         </p:txBody>
@@ -4414,7 +4352,7 @@
               <a:pPr>
                 <a:defRPr/>
               </a:pPr>
-              <a:t>2</a:t>
+              <a:t>1</a:t>
             </a:fld>
             <a:endParaRPr lang="en-US"/>
           </a:p>
@@ -4440,7 +4378,7 @@
 </p:sld>
 </file>
 
-<file path=ppt/slides/slide3.xml><?xml version="1.0" encoding="utf-8"?>
+<file path=ppt/slides/slide2.xml><?xml version="1.0" encoding="utf-8"?>
 <p:sld xmlns:a="http://schemas.openxmlformats.org/drawingml/2006/main" xmlns:r="http://schemas.openxmlformats.org/officeDocument/2006/relationships" xmlns:p="http://schemas.openxmlformats.org/presentationml/2006/main">
   <p:cSld>
     <p:spTree>
@@ -5230,7 +5168,7 @@
               <a:pPr>
                 <a:defRPr/>
               </a:pPr>
-              <a:t>3</a:t>
+              <a:t>2</a:t>
             </a:fld>
             <a:endParaRPr lang="en-US"/>
           </a:p>
@@ -5256,7 +5194,7 @@
 </p:sld>
 </file>
 
-<file path=ppt/slides/slide4.xml><?xml version="1.0" encoding="utf-8"?>
+<file path=ppt/slides/slide3.xml><?xml version="1.0" encoding="utf-8"?>
 <p:sld xmlns:a="http://schemas.openxmlformats.org/drawingml/2006/main" xmlns:r="http://schemas.openxmlformats.org/officeDocument/2006/relationships" xmlns:p="http://schemas.openxmlformats.org/presentationml/2006/main">
   <p:cSld>
     <p:spTree>
@@ -8968,7 +8906,7 @@
               <a:pPr>
                 <a:defRPr/>
               </a:pPr>
-              <a:t>4</a:t>
+              <a:t>3</a:t>
             </a:fld>
             <a:endParaRPr lang="en-US"/>
           </a:p>
@@ -8994,7 +8932,7 @@
 </p:sld>
 </file>
 
-<file path=ppt/slides/slide5.xml><?xml version="1.0" encoding="utf-8"?>
+<file path=ppt/slides/slide4.xml><?xml version="1.0" encoding="utf-8"?>
 <p:sld xmlns:a="http://schemas.openxmlformats.org/drawingml/2006/main" xmlns:r="http://schemas.openxmlformats.org/officeDocument/2006/relationships" xmlns:p="http://schemas.openxmlformats.org/presentationml/2006/main">
   <p:cSld>
     <p:spTree>
@@ -9632,7 +9570,7 @@
               <a:pPr>
                 <a:defRPr/>
               </a:pPr>
-              <a:t>5</a:t>
+              <a:t>4</a:t>
             </a:fld>
             <a:endParaRPr lang="en-US"/>
           </a:p>

</xml_diff>